<commit_message>
Deploying to gh-pages from @ survival-org/DL4Survival@e3f637d5d1d6dc61cbb58f90548200737ebea3ad 🚀
</commit_message>
<xml_diff>
--- a/results/diagrams.pptx
+++ b/results/diagrams.pptx
@@ -6,8 +6,6 @@
   </p:sldMasterIdLst>
   <p:sldIdLst>
     <p:sldId id="256" r:id="rId2"/>
-    <p:sldId id="257" r:id="rId3"/>
-    <p:sldId id="258" r:id="rId4"/>
   </p:sldIdLst>
   <p:sldSz cx="12192000" cy="6858000"/>
   <p:notesSz cx="6858000" cy="9144000"/>
@@ -245,7 +243,7 @@
           <a:p>
             <a:fld id="{CD640317-3DF5-4CC8-8749-C335F5F32497}" type="datetimeFigureOut">
               <a:rPr lang="de-DE" smtClean="0"/>
-              <a:t>21.03.2023</a:t>
+              <a:t>22.05.2023</a:t>
             </a:fld>
             <a:endParaRPr lang="de-DE"/>
           </a:p>
@@ -415,7 +413,7 @@
           <a:p>
             <a:fld id="{CD640317-3DF5-4CC8-8749-C335F5F32497}" type="datetimeFigureOut">
               <a:rPr lang="de-DE" smtClean="0"/>
-              <a:t>21.03.2023</a:t>
+              <a:t>22.05.2023</a:t>
             </a:fld>
             <a:endParaRPr lang="de-DE"/>
           </a:p>
@@ -595,7 +593,7 @@
           <a:p>
             <a:fld id="{CD640317-3DF5-4CC8-8749-C335F5F32497}" type="datetimeFigureOut">
               <a:rPr lang="de-DE" smtClean="0"/>
-              <a:t>21.03.2023</a:t>
+              <a:t>22.05.2023</a:t>
             </a:fld>
             <a:endParaRPr lang="de-DE"/>
           </a:p>
@@ -765,7 +763,7 @@
           <a:p>
             <a:fld id="{CD640317-3DF5-4CC8-8749-C335F5F32497}" type="datetimeFigureOut">
               <a:rPr lang="de-DE" smtClean="0"/>
-              <a:t>21.03.2023</a:t>
+              <a:t>22.05.2023</a:t>
             </a:fld>
             <a:endParaRPr lang="de-DE"/>
           </a:p>
@@ -1011,7 +1009,7 @@
           <a:p>
             <a:fld id="{CD640317-3DF5-4CC8-8749-C335F5F32497}" type="datetimeFigureOut">
               <a:rPr lang="de-DE" smtClean="0"/>
-              <a:t>21.03.2023</a:t>
+              <a:t>22.05.2023</a:t>
             </a:fld>
             <a:endParaRPr lang="de-DE"/>
           </a:p>
@@ -1243,7 +1241,7 @@
           <a:p>
             <a:fld id="{CD640317-3DF5-4CC8-8749-C335F5F32497}" type="datetimeFigureOut">
               <a:rPr lang="de-DE" smtClean="0"/>
-              <a:t>21.03.2023</a:t>
+              <a:t>22.05.2023</a:t>
             </a:fld>
             <a:endParaRPr lang="de-DE"/>
           </a:p>
@@ -1610,7 +1608,7 @@
           <a:p>
             <a:fld id="{CD640317-3DF5-4CC8-8749-C335F5F32497}" type="datetimeFigureOut">
               <a:rPr lang="de-DE" smtClean="0"/>
-              <a:t>21.03.2023</a:t>
+              <a:t>22.05.2023</a:t>
             </a:fld>
             <a:endParaRPr lang="de-DE"/>
           </a:p>
@@ -1728,7 +1726,7 @@
           <a:p>
             <a:fld id="{CD640317-3DF5-4CC8-8749-C335F5F32497}" type="datetimeFigureOut">
               <a:rPr lang="de-DE" smtClean="0"/>
-              <a:t>21.03.2023</a:t>
+              <a:t>22.05.2023</a:t>
             </a:fld>
             <a:endParaRPr lang="de-DE"/>
           </a:p>
@@ -1823,7 +1821,7 @@
           <a:p>
             <a:fld id="{CD640317-3DF5-4CC8-8749-C335F5F32497}" type="datetimeFigureOut">
               <a:rPr lang="de-DE" smtClean="0"/>
-              <a:t>21.03.2023</a:t>
+              <a:t>22.05.2023</a:t>
             </a:fld>
             <a:endParaRPr lang="de-DE"/>
           </a:p>
@@ -2100,7 +2098,7 @@
           <a:p>
             <a:fld id="{CD640317-3DF5-4CC8-8749-C335F5F32497}" type="datetimeFigureOut">
               <a:rPr lang="de-DE" smtClean="0"/>
-              <a:t>21.03.2023</a:t>
+              <a:t>22.05.2023</a:t>
             </a:fld>
             <a:endParaRPr lang="de-DE"/>
           </a:p>
@@ -2353,7 +2351,7 @@
           <a:p>
             <a:fld id="{CD640317-3DF5-4CC8-8749-C335F5F32497}" type="datetimeFigureOut">
               <a:rPr lang="de-DE" smtClean="0"/>
-              <a:t>21.03.2023</a:t>
+              <a:t>22.05.2023</a:t>
             </a:fld>
             <a:endParaRPr lang="de-DE"/>
           </a:p>
@@ -2566,7 +2564,7 @@
           <a:p>
             <a:fld id="{CD640317-3DF5-4CC8-8749-C335F5F32497}" type="datetimeFigureOut">
               <a:rPr lang="de-DE" smtClean="0"/>
-              <a:t>21.03.2023</a:t>
+              <a:t>22.05.2023</a:t>
             </a:fld>
             <a:endParaRPr lang="de-DE"/>
           </a:p>
@@ -2979,7 +2977,7 @@
         </p:nvSpPr>
         <p:spPr>
           <a:xfrm>
-            <a:off x="301450" y="117047"/>
+            <a:off x="2039634" y="322993"/>
             <a:ext cx="4378404" cy="1187515"/>
           </a:xfrm>
           <a:prstGeom prst="rect">
@@ -3163,7 +3161,7 @@
         </p:nvSpPr>
         <p:spPr>
           <a:xfrm>
-            <a:off x="4679854" y="5553671"/>
+            <a:off x="6418038" y="5759617"/>
             <a:ext cx="4176001" cy="540000"/>
           </a:xfrm>
           <a:prstGeom prst="rect">
@@ -3339,7 +3337,7 @@
         </p:nvSpPr>
         <p:spPr>
           <a:xfrm>
-            <a:off x="4671793" y="4146086"/>
+            <a:off x="6409977" y="4352032"/>
             <a:ext cx="4184061" cy="1044000"/>
           </a:xfrm>
           <a:prstGeom prst="rect">
@@ -3405,7 +3403,7 @@
                 <a:ea typeface="Calibri" panose="020F0502020204030204" pitchFamily="34" charset="0"/>
                 <a:cs typeface="Times New Roman" panose="02020603050405020304" pitchFamily="18" charset="0"/>
               </a:rPr>
-              <a:t>43)</a:t>
+              <a:t>44)</a:t>
             </a:r>
             <a:endParaRPr lang="en-AU" sz="1000" dirty="0">
               <a:solidFill>
@@ -3577,7 +3575,7 @@
         </p:nvSpPr>
         <p:spPr>
           <a:xfrm>
-            <a:off x="1156977" y="3789407"/>
+            <a:off x="2895161" y="3995353"/>
             <a:ext cx="2664000" cy="360000"/>
           </a:xfrm>
           <a:prstGeom prst="rect">
@@ -3678,7 +3676,7 @@
         </p:nvCxnSpPr>
         <p:spPr>
           <a:xfrm flipH="1">
-            <a:off x="2488977" y="1304562"/>
+            <a:off x="4227161" y="1510508"/>
             <a:ext cx="1675" cy="358762"/>
           </a:xfrm>
           <a:prstGeom prst="straightConnector1">
@@ -3711,7 +3709,7 @@
         </p:nvSpPr>
         <p:spPr>
           <a:xfrm>
-            <a:off x="1156977" y="6092308"/>
+            <a:off x="2895161" y="6298254"/>
             <a:ext cx="2664000" cy="360000"/>
           </a:xfrm>
           <a:prstGeom prst="rect">
@@ -3835,7 +3833,7 @@
         </p:nvCxnSpPr>
         <p:spPr>
           <a:xfrm>
-            <a:off x="2488977" y="4149407"/>
+            <a:off x="4227161" y="4355353"/>
             <a:ext cx="0" cy="1044264"/>
           </a:xfrm>
           <a:prstGeom prst="straightConnector1">
@@ -3868,7 +3866,7 @@
         </p:nvSpPr>
         <p:spPr>
           <a:xfrm>
-            <a:off x="1156977" y="5193671"/>
+            <a:off x="2895161" y="5399617"/>
             <a:ext cx="2664000" cy="360000"/>
           </a:xfrm>
           <a:prstGeom prst="rect">
@@ -3948,19 +3946,7 @@
                 <a:ea typeface="Calibri" panose="020F0502020204030204" pitchFamily="34" charset="0"/>
                 <a:cs typeface="Times New Roman" panose="02020603050405020304" pitchFamily="18" charset="0"/>
               </a:rPr>
-              <a:t>full text screening (n = </a:t>
-            </a:r>
-            <a:r>
-              <a:rPr lang="en-AU" sz="1000" dirty="0" smtClean="0">
-                <a:solidFill>
-                  <a:srgbClr val="000000"/>
-                </a:solidFill>
-                <a:effectLst/>
-                <a:latin typeface="Arial" panose="020B0604020202020204" pitchFamily="34" charset="0"/>
-                <a:ea typeface="Calibri" panose="020F0502020204030204" pitchFamily="34" charset="0"/>
-                <a:cs typeface="Times New Roman" panose="02020603050405020304" pitchFamily="18" charset="0"/>
-              </a:rPr>
-              <a:t>36)</a:t>
+              <a:t>full text screening (n = 36)</a:t>
             </a:r>
             <a:endParaRPr lang="de-DE" sz="1000" dirty="0">
               <a:effectLst/>
@@ -3978,7 +3964,7 @@
         </p:nvSpPr>
         <p:spPr>
           <a:xfrm>
-            <a:off x="1156977" y="1663324"/>
+            <a:off x="2895161" y="1869270"/>
             <a:ext cx="2664000" cy="360000"/>
           </a:xfrm>
           <a:prstGeom prst="rect">
@@ -4102,7 +4088,7 @@
         </p:nvCxnSpPr>
         <p:spPr>
           <a:xfrm>
-            <a:off x="2490652" y="1304562"/>
+            <a:off x="4228836" y="1510508"/>
             <a:ext cx="3086320" cy="269049"/>
           </a:xfrm>
           <a:prstGeom prst="straightConnector1">
@@ -4135,7 +4121,7 @@
         </p:nvSpPr>
         <p:spPr>
           <a:xfrm>
-            <a:off x="5576972" y="1393611"/>
+            <a:off x="7315156" y="1599557"/>
             <a:ext cx="1625763" cy="360000"/>
           </a:xfrm>
           <a:prstGeom prst="rect">
@@ -4212,7 +4198,7 @@
         </p:nvCxnSpPr>
         <p:spPr>
           <a:xfrm flipH="1">
-            <a:off x="2488977" y="5823671"/>
+            <a:off x="4227161" y="6029617"/>
             <a:ext cx="2190877" cy="268637"/>
           </a:xfrm>
           <a:prstGeom prst="straightConnector1">
@@ -4245,7 +4231,7 @@
         </p:nvSpPr>
         <p:spPr>
           <a:xfrm>
-            <a:off x="1156977" y="2385916"/>
+            <a:off x="2895161" y="2591862"/>
             <a:ext cx="2664000" cy="360000"/>
           </a:xfrm>
           <a:prstGeom prst="rect">
@@ -4369,7 +4355,7 @@
         </p:nvCxnSpPr>
         <p:spPr>
           <a:xfrm>
-            <a:off x="2488977" y="2023324"/>
+            <a:off x="4227161" y="2229270"/>
             <a:ext cx="0" cy="360000"/>
           </a:xfrm>
           <a:prstGeom prst="straightConnector1">
@@ -4405,7 +4391,7 @@
         </p:nvCxnSpPr>
         <p:spPr>
           <a:xfrm>
-            <a:off x="2488977" y="2745916"/>
+            <a:off x="4227161" y="2951862"/>
             <a:ext cx="0" cy="1043491"/>
           </a:xfrm>
           <a:prstGeom prst="straightConnector1">
@@ -4441,7 +4427,7 @@
         </p:nvCxnSpPr>
         <p:spPr>
           <a:xfrm>
-            <a:off x="2488977" y="5553671"/>
+            <a:off x="4227161" y="5759617"/>
             <a:ext cx="0" cy="538637"/>
           </a:xfrm>
           <a:prstGeom prst="straightConnector1">
@@ -4474,7 +4460,7 @@
         </p:nvSpPr>
         <p:spPr>
           <a:xfrm>
-            <a:off x="5576972" y="2097074"/>
+            <a:off x="7315156" y="2303020"/>
             <a:ext cx="1625763" cy="360000"/>
           </a:xfrm>
           <a:prstGeom prst="rect">
@@ -4548,7 +4534,7 @@
         </p:nvSpPr>
         <p:spPr>
           <a:xfrm>
-            <a:off x="4679854" y="2745820"/>
+            <a:off x="6418038" y="2951766"/>
             <a:ext cx="4176000" cy="1044000"/>
           </a:xfrm>
           <a:prstGeom prst="rect">
@@ -4732,7 +4718,7 @@
         </p:nvCxnSpPr>
         <p:spPr>
           <a:xfrm>
-            <a:off x="2488977" y="2023324"/>
+            <a:off x="4227161" y="2229270"/>
             <a:ext cx="3087995" cy="253750"/>
           </a:xfrm>
           <a:prstGeom prst="straightConnector1">
@@ -4768,7 +4754,7 @@
         </p:nvCxnSpPr>
         <p:spPr>
           <a:xfrm>
-            <a:off x="2488977" y="2745916"/>
+            <a:off x="4227161" y="2951862"/>
             <a:ext cx="2190877" cy="521904"/>
           </a:xfrm>
           <a:prstGeom prst="straightConnector1">
@@ -4804,7 +4790,7 @@
         </p:nvCxnSpPr>
         <p:spPr>
           <a:xfrm>
-            <a:off x="2488977" y="4149407"/>
+            <a:off x="4227161" y="4355353"/>
             <a:ext cx="2182816" cy="518679"/>
           </a:xfrm>
           <a:prstGeom prst="straightConnector1">
@@ -4833,3884 +4819,6 @@
     <p:extLst>
       <p:ext uri="{BB962C8B-B14F-4D97-AF65-F5344CB8AC3E}">
         <p14:creationId xmlns:p14="http://schemas.microsoft.com/office/powerpoint/2010/main" val="3734900322"/>
-      </p:ext>
-    </p:extLst>
-  </p:cSld>
-  <p:clrMapOvr>
-    <a:masterClrMapping/>
-  </p:clrMapOvr>
-</p:sld>
-</file>
-
-<file path=ppt/slides/slide2.xml><?xml version="1.0" encoding="utf-8"?>
-<p:sld xmlns:a="http://schemas.openxmlformats.org/drawingml/2006/main" xmlns:r="http://schemas.openxmlformats.org/officeDocument/2006/relationships" xmlns:p="http://schemas.openxmlformats.org/presentationml/2006/main">
-  <p:cSld>
-    <p:spTree>
-      <p:nvGrpSpPr>
-        <p:cNvPr id="1" name=""/>
-        <p:cNvGrpSpPr/>
-        <p:nvPr/>
-      </p:nvGrpSpPr>
-      <p:grpSpPr>
-        <a:xfrm>
-          <a:off x="0" y="0"/>
-          <a:ext cx="0" cy="0"/>
-          <a:chOff x="0" y="0"/>
-          <a:chExt cx="0" cy="0"/>
-        </a:xfrm>
-      </p:grpSpPr>
-      <p:sp>
-        <p:nvSpPr>
-          <p:cNvPr id="30" name="Freihandform 29"/>
-          <p:cNvSpPr/>
-          <p:nvPr/>
-        </p:nvSpPr>
-        <p:spPr>
-          <a:xfrm>
-            <a:off x="5402042" y="1431076"/>
-            <a:ext cx="1001210" cy="2764132"/>
-          </a:xfrm>
-          <a:custGeom>
-            <a:avLst/>
-            <a:gdLst>
-              <a:gd name="connsiteX0" fmla="*/ 500605 w 1001210"/>
-              <a:gd name="connsiteY0" fmla="*/ 0 h 2764132"/>
-              <a:gd name="connsiteX1" fmla="*/ 507971 w 1001210"/>
-              <a:gd name="connsiteY1" fmla="*/ 8105 h 2764132"/>
-              <a:gd name="connsiteX2" fmla="*/ 1001210 w 1001210"/>
-              <a:gd name="connsiteY2" fmla="*/ 1382066 h 2764132"/>
-              <a:gd name="connsiteX3" fmla="*/ 507971 w 1001210"/>
-              <a:gd name="connsiteY3" fmla="*/ 2756027 h 2764132"/>
-              <a:gd name="connsiteX4" fmla="*/ 500605 w 1001210"/>
-              <a:gd name="connsiteY4" fmla="*/ 2764132 h 2764132"/>
-              <a:gd name="connsiteX5" fmla="*/ 493239 w 1001210"/>
-              <a:gd name="connsiteY5" fmla="*/ 2756027 h 2764132"/>
-              <a:gd name="connsiteX6" fmla="*/ 0 w 1001210"/>
-              <a:gd name="connsiteY6" fmla="*/ 1382066 h 2764132"/>
-              <a:gd name="connsiteX7" fmla="*/ 493239 w 1001210"/>
-              <a:gd name="connsiteY7" fmla="*/ 8105 h 2764132"/>
-              <a:gd name="connsiteX8" fmla="*/ 500605 w 1001210"/>
-              <a:gd name="connsiteY8" fmla="*/ 0 h 2764132"/>
-            </a:gdLst>
-            <a:ahLst/>
-            <a:cxnLst>
-              <a:cxn ang="0">
-                <a:pos x="connsiteX0" y="connsiteY0"/>
-              </a:cxn>
-              <a:cxn ang="0">
-                <a:pos x="connsiteX1" y="connsiteY1"/>
-              </a:cxn>
-              <a:cxn ang="0">
-                <a:pos x="connsiteX2" y="connsiteY2"/>
-              </a:cxn>
-              <a:cxn ang="0">
-                <a:pos x="connsiteX3" y="connsiteY3"/>
-              </a:cxn>
-              <a:cxn ang="0">
-                <a:pos x="connsiteX4" y="connsiteY4"/>
-              </a:cxn>
-              <a:cxn ang="0">
-                <a:pos x="connsiteX5" y="connsiteY5"/>
-              </a:cxn>
-              <a:cxn ang="0">
-                <a:pos x="connsiteX6" y="connsiteY6"/>
-              </a:cxn>
-              <a:cxn ang="0">
-                <a:pos x="connsiteX7" y="connsiteY7"/>
-              </a:cxn>
-              <a:cxn ang="0">
-                <a:pos x="connsiteX8" y="connsiteY8"/>
-              </a:cxn>
-            </a:cxnLst>
-            <a:rect l="l" t="t" r="r" b="b"/>
-            <a:pathLst>
-              <a:path w="1001210" h="2764132">
-                <a:moveTo>
-                  <a:pt x="500605" y="0"/>
-                </a:moveTo>
-                <a:lnTo>
-                  <a:pt x="507971" y="8105"/>
-                </a:lnTo>
-                <a:cubicBezTo>
-                  <a:pt x="816108" y="381481"/>
-                  <a:pt x="1001210" y="860157"/>
-                  <a:pt x="1001210" y="1382066"/>
-                </a:cubicBezTo>
-                <a:cubicBezTo>
-                  <a:pt x="1001210" y="1903975"/>
-                  <a:pt x="816108" y="2382651"/>
-                  <a:pt x="507971" y="2756027"/>
-                </a:cubicBezTo>
-                <a:lnTo>
-                  <a:pt x="500605" y="2764132"/>
-                </a:lnTo>
-                <a:lnTo>
-                  <a:pt x="493239" y="2756027"/>
-                </a:lnTo>
-                <a:cubicBezTo>
-                  <a:pt x="185103" y="2382651"/>
-                  <a:pt x="0" y="1903975"/>
-                  <a:pt x="0" y="1382066"/>
-                </a:cubicBezTo>
-                <a:cubicBezTo>
-                  <a:pt x="0" y="860157"/>
-                  <a:pt x="185103" y="381481"/>
-                  <a:pt x="493239" y="8105"/>
-                </a:cubicBezTo>
-                <a:lnTo>
-                  <a:pt x="500605" y="0"/>
-                </a:lnTo>
-                <a:close/>
-              </a:path>
-            </a:pathLst>
-          </a:custGeom>
-          <a:solidFill>
-            <a:schemeClr val="bg1">
-              <a:lumMod val="65000"/>
-            </a:schemeClr>
-          </a:solidFill>
-          <a:ln>
-            <a:solidFill>
-              <a:schemeClr val="tx1"/>
-            </a:solidFill>
-          </a:ln>
-        </p:spPr>
-        <p:style>
-          <a:lnRef idx="2">
-            <a:schemeClr val="accent1">
-              <a:shade val="50000"/>
-            </a:schemeClr>
-          </a:lnRef>
-          <a:fillRef idx="1">
-            <a:schemeClr val="accent1"/>
-          </a:fillRef>
-          <a:effectRef idx="0">
-            <a:schemeClr val="accent1"/>
-          </a:effectRef>
-          <a:fontRef idx="minor">
-            <a:schemeClr val="lt1"/>
-          </a:fontRef>
-        </p:style>
-        <p:txBody>
-          <a:bodyPr wrap="square" rtlCol="0" anchor="ctr">
-            <a:noAutofit/>
-          </a:bodyPr>
-          <a:lstStyle/>
-          <a:p>
-            <a:pPr algn="ctr"/>
-            <a:endParaRPr lang="de-DE"/>
-          </a:p>
-        </p:txBody>
-      </p:sp>
-      <p:sp>
-        <p:nvSpPr>
-          <p:cNvPr id="40" name="Freihandform 39"/>
-          <p:cNvSpPr/>
-          <p:nvPr/>
-        </p:nvSpPr>
-        <p:spPr>
-          <a:xfrm>
-            <a:off x="3742647" y="2442064"/>
-            <a:ext cx="2160001" cy="2531078"/>
-          </a:xfrm>
-          <a:custGeom>
-            <a:avLst/>
-            <a:gdLst>
-              <a:gd name="connsiteX0" fmla="*/ 1691629 w 2160001"/>
-              <a:gd name="connsiteY0" fmla="*/ 0 h 2531078"/>
-              <a:gd name="connsiteX1" fmla="*/ 1667951 w 2160001"/>
-              <a:gd name="connsiteY1" fmla="*/ 177510 h 2531078"/>
-              <a:gd name="connsiteX2" fmla="*/ 1659396 w 2160001"/>
-              <a:gd name="connsiteY2" fmla="*/ 371078 h 2531078"/>
-              <a:gd name="connsiteX3" fmla="*/ 2152635 w 2160001"/>
-              <a:gd name="connsiteY3" fmla="*/ 1745039 h 2531078"/>
-              <a:gd name="connsiteX4" fmla="*/ 2160001 w 2160001"/>
-              <a:gd name="connsiteY4" fmla="*/ 1753144 h 2531078"/>
-              <a:gd name="connsiteX5" fmla="*/ 2027957 w 2160001"/>
-              <a:gd name="connsiteY5" fmla="*/ 1898429 h 2531078"/>
-              <a:gd name="connsiteX6" fmla="*/ 500606 w 2160001"/>
-              <a:gd name="connsiteY6" fmla="*/ 2531078 h 2531078"/>
-              <a:gd name="connsiteX7" fmla="*/ 65291 w 2160001"/>
-              <a:gd name="connsiteY7" fmla="*/ 2487194 h 2531078"/>
-              <a:gd name="connsiteX8" fmla="*/ 34156 w 2160001"/>
-              <a:gd name="connsiteY8" fmla="*/ 2479189 h 2531078"/>
-              <a:gd name="connsiteX9" fmla="*/ 11152 w 2160001"/>
-              <a:gd name="connsiteY9" fmla="*/ 2328463 h 2531078"/>
-              <a:gd name="connsiteX10" fmla="*/ 0 w 2160001"/>
-              <a:gd name="connsiteY10" fmla="*/ 2107616 h 2531078"/>
-              <a:gd name="connsiteX11" fmla="*/ 1517682 w 2160001"/>
-              <a:gd name="connsiteY11" fmla="*/ 44725 h 2531078"/>
-              <a:gd name="connsiteX12" fmla="*/ 1691629 w 2160001"/>
-              <a:gd name="connsiteY12" fmla="*/ 0 h 2531078"/>
-            </a:gdLst>
-            <a:ahLst/>
-            <a:cxnLst>
-              <a:cxn ang="0">
-                <a:pos x="connsiteX0" y="connsiteY0"/>
-              </a:cxn>
-              <a:cxn ang="0">
-                <a:pos x="connsiteX1" y="connsiteY1"/>
-              </a:cxn>
-              <a:cxn ang="0">
-                <a:pos x="connsiteX2" y="connsiteY2"/>
-              </a:cxn>
-              <a:cxn ang="0">
-                <a:pos x="connsiteX3" y="connsiteY3"/>
-              </a:cxn>
-              <a:cxn ang="0">
-                <a:pos x="connsiteX4" y="connsiteY4"/>
-              </a:cxn>
-              <a:cxn ang="0">
-                <a:pos x="connsiteX5" y="connsiteY5"/>
-              </a:cxn>
-              <a:cxn ang="0">
-                <a:pos x="connsiteX6" y="connsiteY6"/>
-              </a:cxn>
-              <a:cxn ang="0">
-                <a:pos x="connsiteX7" y="connsiteY7"/>
-              </a:cxn>
-              <a:cxn ang="0">
-                <a:pos x="connsiteX8" y="connsiteY8"/>
-              </a:cxn>
-              <a:cxn ang="0">
-                <a:pos x="connsiteX9" y="connsiteY9"/>
-              </a:cxn>
-              <a:cxn ang="0">
-                <a:pos x="connsiteX10" y="connsiteY10"/>
-              </a:cxn>
-              <a:cxn ang="0">
-                <a:pos x="connsiteX11" y="connsiteY11"/>
-              </a:cxn>
-              <a:cxn ang="0">
-                <a:pos x="connsiteX12" y="connsiteY12"/>
-              </a:cxn>
-            </a:cxnLst>
-            <a:rect l="l" t="t" r="r" b="b"/>
-            <a:pathLst>
-              <a:path w="2160001" h="2531078">
-                <a:moveTo>
-                  <a:pt x="1691629" y="0"/>
-                </a:moveTo>
-                <a:lnTo>
-                  <a:pt x="1667951" y="177510"/>
-                </a:lnTo>
-                <a:cubicBezTo>
-                  <a:pt x="1662288" y="241276"/>
-                  <a:pt x="1659396" y="305840"/>
-                  <a:pt x="1659396" y="371078"/>
-                </a:cubicBezTo>
-                <a:cubicBezTo>
-                  <a:pt x="1659396" y="892987"/>
-                  <a:pt x="1844499" y="1371663"/>
-                  <a:pt x="2152635" y="1745039"/>
-                </a:cubicBezTo>
-                <a:lnTo>
-                  <a:pt x="2160001" y="1753144"/>
-                </a:lnTo>
-                <a:lnTo>
-                  <a:pt x="2027957" y="1898429"/>
-                </a:lnTo>
-                <a:cubicBezTo>
-                  <a:pt x="1637074" y="2289312"/>
-                  <a:pt x="1097074" y="2531078"/>
-                  <a:pt x="500606" y="2531078"/>
-                </a:cubicBezTo>
-                <a:cubicBezTo>
-                  <a:pt x="351489" y="2531078"/>
-                  <a:pt x="205902" y="2515968"/>
-                  <a:pt x="65291" y="2487194"/>
-                </a:cubicBezTo>
-                <a:lnTo>
-                  <a:pt x="34156" y="2479189"/>
-                </a:lnTo>
-                <a:lnTo>
-                  <a:pt x="11152" y="2328463"/>
-                </a:lnTo>
-                <a:cubicBezTo>
-                  <a:pt x="3778" y="2255851"/>
-                  <a:pt x="0" y="2182175"/>
-                  <a:pt x="0" y="2107616"/>
-                </a:cubicBezTo>
-                <a:cubicBezTo>
-                  <a:pt x="0" y="1138356"/>
-                  <a:pt x="638414" y="318206"/>
-                  <a:pt x="1517682" y="44725"/>
-                </a:cubicBezTo>
-                <a:lnTo>
-                  <a:pt x="1691629" y="0"/>
-                </a:lnTo>
-                <a:close/>
-              </a:path>
-            </a:pathLst>
-          </a:custGeom>
-          <a:solidFill>
-            <a:schemeClr val="bg1">
-              <a:lumMod val="85000"/>
-            </a:schemeClr>
-          </a:solidFill>
-          <a:ln>
-            <a:solidFill>
-              <a:schemeClr val="tx1"/>
-            </a:solidFill>
-          </a:ln>
-        </p:spPr>
-        <p:style>
-          <a:lnRef idx="2">
-            <a:schemeClr val="accent1">
-              <a:shade val="50000"/>
-            </a:schemeClr>
-          </a:lnRef>
-          <a:fillRef idx="1">
-            <a:schemeClr val="accent1"/>
-          </a:fillRef>
-          <a:effectRef idx="0">
-            <a:schemeClr val="accent1"/>
-          </a:effectRef>
-          <a:fontRef idx="minor">
-            <a:schemeClr val="lt1"/>
-          </a:fontRef>
-        </p:style>
-        <p:txBody>
-          <a:bodyPr wrap="square" rtlCol="0" anchor="ctr">
-            <a:noAutofit/>
-          </a:bodyPr>
-          <a:lstStyle/>
-          <a:p>
-            <a:pPr algn="ctr"/>
-            <a:endParaRPr lang="de-DE"/>
-          </a:p>
-        </p:txBody>
-      </p:sp>
-      <p:sp>
-        <p:nvSpPr>
-          <p:cNvPr id="37" name="Freihandform 36"/>
-          <p:cNvSpPr/>
-          <p:nvPr/>
-        </p:nvSpPr>
-        <p:spPr>
-          <a:xfrm>
-            <a:off x="3776803" y="4195208"/>
-            <a:ext cx="4251689" cy="2514472"/>
-          </a:xfrm>
-          <a:custGeom>
-            <a:avLst/>
-            <a:gdLst>
-              <a:gd name="connsiteX0" fmla="*/ 2125845 w 4251689"/>
-              <a:gd name="connsiteY0" fmla="*/ 0 h 2514472"/>
-              <a:gd name="connsiteX1" fmla="*/ 2257889 w 4251689"/>
-              <a:gd name="connsiteY1" fmla="*/ 145285 h 2514472"/>
-              <a:gd name="connsiteX2" fmla="*/ 3785240 w 4251689"/>
-              <a:gd name="connsiteY2" fmla="*/ 777934 h 2514472"/>
-              <a:gd name="connsiteX3" fmla="*/ 4220555 w 4251689"/>
-              <a:gd name="connsiteY3" fmla="*/ 734050 h 2514472"/>
-              <a:gd name="connsiteX4" fmla="*/ 4251689 w 4251689"/>
-              <a:gd name="connsiteY4" fmla="*/ 726045 h 2514472"/>
-              <a:gd name="connsiteX5" fmla="*/ 4241960 w 4251689"/>
-              <a:gd name="connsiteY5" fmla="*/ 789787 h 2514472"/>
-              <a:gd name="connsiteX6" fmla="*/ 2125844 w 4251689"/>
-              <a:gd name="connsiteY6" fmla="*/ 2514472 h 2514472"/>
-              <a:gd name="connsiteX7" fmla="*/ 9728 w 4251689"/>
-              <a:gd name="connsiteY7" fmla="*/ 789787 h 2514472"/>
-              <a:gd name="connsiteX8" fmla="*/ 0 w 4251689"/>
-              <a:gd name="connsiteY8" fmla="*/ 726045 h 2514472"/>
-              <a:gd name="connsiteX9" fmla="*/ 31135 w 4251689"/>
-              <a:gd name="connsiteY9" fmla="*/ 734050 h 2514472"/>
-              <a:gd name="connsiteX10" fmla="*/ 466450 w 4251689"/>
-              <a:gd name="connsiteY10" fmla="*/ 777934 h 2514472"/>
-              <a:gd name="connsiteX11" fmla="*/ 1993801 w 4251689"/>
-              <a:gd name="connsiteY11" fmla="*/ 145285 h 2514472"/>
-              <a:gd name="connsiteX12" fmla="*/ 2125845 w 4251689"/>
-              <a:gd name="connsiteY12" fmla="*/ 0 h 2514472"/>
-            </a:gdLst>
-            <a:ahLst/>
-            <a:cxnLst>
-              <a:cxn ang="0">
-                <a:pos x="connsiteX0" y="connsiteY0"/>
-              </a:cxn>
-              <a:cxn ang="0">
-                <a:pos x="connsiteX1" y="connsiteY1"/>
-              </a:cxn>
-              <a:cxn ang="0">
-                <a:pos x="connsiteX2" y="connsiteY2"/>
-              </a:cxn>
-              <a:cxn ang="0">
-                <a:pos x="connsiteX3" y="connsiteY3"/>
-              </a:cxn>
-              <a:cxn ang="0">
-                <a:pos x="connsiteX4" y="connsiteY4"/>
-              </a:cxn>
-              <a:cxn ang="0">
-                <a:pos x="connsiteX5" y="connsiteY5"/>
-              </a:cxn>
-              <a:cxn ang="0">
-                <a:pos x="connsiteX6" y="connsiteY6"/>
-              </a:cxn>
-              <a:cxn ang="0">
-                <a:pos x="connsiteX7" y="connsiteY7"/>
-              </a:cxn>
-              <a:cxn ang="0">
-                <a:pos x="connsiteX8" y="connsiteY8"/>
-              </a:cxn>
-              <a:cxn ang="0">
-                <a:pos x="connsiteX9" y="connsiteY9"/>
-              </a:cxn>
-              <a:cxn ang="0">
-                <a:pos x="connsiteX10" y="connsiteY10"/>
-              </a:cxn>
-              <a:cxn ang="0">
-                <a:pos x="connsiteX11" y="connsiteY11"/>
-              </a:cxn>
-              <a:cxn ang="0">
-                <a:pos x="connsiteX12" y="connsiteY12"/>
-              </a:cxn>
-            </a:cxnLst>
-            <a:rect l="l" t="t" r="r" b="b"/>
-            <a:pathLst>
-              <a:path w="4251689" h="2514472">
-                <a:moveTo>
-                  <a:pt x="2125845" y="0"/>
-                </a:moveTo>
-                <a:lnTo>
-                  <a:pt x="2257889" y="145285"/>
-                </a:lnTo>
-                <a:cubicBezTo>
-                  <a:pt x="2648773" y="536168"/>
-                  <a:pt x="3188773" y="777934"/>
-                  <a:pt x="3785240" y="777934"/>
-                </a:cubicBezTo>
-                <a:cubicBezTo>
-                  <a:pt x="3934357" y="777934"/>
-                  <a:pt x="4079945" y="762824"/>
-                  <a:pt x="4220555" y="734050"/>
-                </a:cubicBezTo>
-                <a:lnTo>
-                  <a:pt x="4251689" y="726045"/>
-                </a:lnTo>
-                <a:lnTo>
-                  <a:pt x="4241960" y="789787"/>
-                </a:lnTo>
-                <a:cubicBezTo>
-                  <a:pt x="4040549" y="1774063"/>
-                  <a:pt x="3169662" y="2514472"/>
-                  <a:pt x="2125844" y="2514472"/>
-                </a:cubicBezTo>
-                <a:cubicBezTo>
-                  <a:pt x="1082026" y="2514472"/>
-                  <a:pt x="211140" y="1774063"/>
-                  <a:pt x="9728" y="789787"/>
-                </a:cubicBezTo>
-                <a:lnTo>
-                  <a:pt x="0" y="726045"/>
-                </a:lnTo>
-                <a:lnTo>
-                  <a:pt x="31135" y="734050"/>
-                </a:lnTo>
-                <a:cubicBezTo>
-                  <a:pt x="171746" y="762824"/>
-                  <a:pt x="317333" y="777934"/>
-                  <a:pt x="466450" y="777934"/>
-                </a:cubicBezTo>
-                <a:cubicBezTo>
-                  <a:pt x="1062918" y="777934"/>
-                  <a:pt x="1602918" y="536168"/>
-                  <a:pt x="1993801" y="145285"/>
-                </a:cubicBezTo>
-                <a:lnTo>
-                  <a:pt x="2125845" y="0"/>
-                </a:lnTo>
-                <a:close/>
-              </a:path>
-            </a:pathLst>
-          </a:custGeom>
-          <a:noFill/>
-          <a:ln>
-            <a:solidFill>
-              <a:schemeClr val="tx1"/>
-            </a:solidFill>
-          </a:ln>
-        </p:spPr>
-        <p:style>
-          <a:lnRef idx="2">
-            <a:schemeClr val="accent1">
-              <a:shade val="50000"/>
-            </a:schemeClr>
-          </a:lnRef>
-          <a:fillRef idx="1">
-            <a:schemeClr val="accent1"/>
-          </a:fillRef>
-          <a:effectRef idx="0">
-            <a:schemeClr val="accent1"/>
-          </a:effectRef>
-          <a:fontRef idx="minor">
-            <a:schemeClr val="lt1"/>
-          </a:fontRef>
-        </p:style>
-        <p:txBody>
-          <a:bodyPr wrap="square" rtlCol="0" anchor="ctr">
-            <a:noAutofit/>
-          </a:bodyPr>
-          <a:lstStyle/>
-          <a:p>
-            <a:pPr algn="ctr"/>
-            <a:endParaRPr lang="de-DE"/>
-          </a:p>
-        </p:txBody>
-      </p:sp>
-      <p:sp>
-        <p:nvSpPr>
-          <p:cNvPr id="33" name="Freihandform 32"/>
-          <p:cNvSpPr/>
-          <p:nvPr/>
-        </p:nvSpPr>
-        <p:spPr>
-          <a:xfrm>
-            <a:off x="5902648" y="2442064"/>
-            <a:ext cx="2159999" cy="2531078"/>
-          </a:xfrm>
-          <a:custGeom>
-            <a:avLst/>
-            <a:gdLst>
-              <a:gd name="connsiteX0" fmla="*/ 468373 w 2159999"/>
-              <a:gd name="connsiteY0" fmla="*/ 0 h 2531078"/>
-              <a:gd name="connsiteX1" fmla="*/ 642317 w 2159999"/>
-              <a:gd name="connsiteY1" fmla="*/ 44725 h 2531078"/>
-              <a:gd name="connsiteX2" fmla="*/ 2159999 w 2159999"/>
-              <a:gd name="connsiteY2" fmla="*/ 2107616 h 2531078"/>
-              <a:gd name="connsiteX3" fmla="*/ 2148847 w 2159999"/>
-              <a:gd name="connsiteY3" fmla="*/ 2328463 h 2531078"/>
-              <a:gd name="connsiteX4" fmla="*/ 2125844 w 2159999"/>
-              <a:gd name="connsiteY4" fmla="*/ 2479189 h 2531078"/>
-              <a:gd name="connsiteX5" fmla="*/ 2094710 w 2159999"/>
-              <a:gd name="connsiteY5" fmla="*/ 2487194 h 2531078"/>
-              <a:gd name="connsiteX6" fmla="*/ 1659395 w 2159999"/>
-              <a:gd name="connsiteY6" fmla="*/ 2531078 h 2531078"/>
-              <a:gd name="connsiteX7" fmla="*/ 132044 w 2159999"/>
-              <a:gd name="connsiteY7" fmla="*/ 1898429 h 2531078"/>
-              <a:gd name="connsiteX8" fmla="*/ 0 w 2159999"/>
-              <a:gd name="connsiteY8" fmla="*/ 1753144 h 2531078"/>
-              <a:gd name="connsiteX9" fmla="*/ 7366 w 2159999"/>
-              <a:gd name="connsiteY9" fmla="*/ 1745039 h 2531078"/>
-              <a:gd name="connsiteX10" fmla="*/ 500605 w 2159999"/>
-              <a:gd name="connsiteY10" fmla="*/ 371078 h 2531078"/>
-              <a:gd name="connsiteX11" fmla="*/ 492050 w 2159999"/>
-              <a:gd name="connsiteY11" fmla="*/ 177510 h 2531078"/>
-              <a:gd name="connsiteX12" fmla="*/ 468373 w 2159999"/>
-              <a:gd name="connsiteY12" fmla="*/ 0 h 2531078"/>
-            </a:gdLst>
-            <a:ahLst/>
-            <a:cxnLst>
-              <a:cxn ang="0">
-                <a:pos x="connsiteX0" y="connsiteY0"/>
-              </a:cxn>
-              <a:cxn ang="0">
-                <a:pos x="connsiteX1" y="connsiteY1"/>
-              </a:cxn>
-              <a:cxn ang="0">
-                <a:pos x="connsiteX2" y="connsiteY2"/>
-              </a:cxn>
-              <a:cxn ang="0">
-                <a:pos x="connsiteX3" y="connsiteY3"/>
-              </a:cxn>
-              <a:cxn ang="0">
-                <a:pos x="connsiteX4" y="connsiteY4"/>
-              </a:cxn>
-              <a:cxn ang="0">
-                <a:pos x="connsiteX5" y="connsiteY5"/>
-              </a:cxn>
-              <a:cxn ang="0">
-                <a:pos x="connsiteX6" y="connsiteY6"/>
-              </a:cxn>
-              <a:cxn ang="0">
-                <a:pos x="connsiteX7" y="connsiteY7"/>
-              </a:cxn>
-              <a:cxn ang="0">
-                <a:pos x="connsiteX8" y="connsiteY8"/>
-              </a:cxn>
-              <a:cxn ang="0">
-                <a:pos x="connsiteX9" y="connsiteY9"/>
-              </a:cxn>
-              <a:cxn ang="0">
-                <a:pos x="connsiteX10" y="connsiteY10"/>
-              </a:cxn>
-              <a:cxn ang="0">
-                <a:pos x="connsiteX11" y="connsiteY11"/>
-              </a:cxn>
-              <a:cxn ang="0">
-                <a:pos x="connsiteX12" y="connsiteY12"/>
-              </a:cxn>
-            </a:cxnLst>
-            <a:rect l="l" t="t" r="r" b="b"/>
-            <a:pathLst>
-              <a:path w="2159999" h="2531078">
-                <a:moveTo>
-                  <a:pt x="468373" y="0"/>
-                </a:moveTo>
-                <a:lnTo>
-                  <a:pt x="642317" y="44725"/>
-                </a:lnTo>
-                <a:cubicBezTo>
-                  <a:pt x="1521585" y="318206"/>
-                  <a:pt x="2159999" y="1138356"/>
-                  <a:pt x="2159999" y="2107616"/>
-                </a:cubicBezTo>
-                <a:cubicBezTo>
-                  <a:pt x="2159999" y="2182175"/>
-                  <a:pt x="2156222" y="2255851"/>
-                  <a:pt x="2148847" y="2328463"/>
-                </a:cubicBezTo>
-                <a:lnTo>
-                  <a:pt x="2125844" y="2479189"/>
-                </a:lnTo>
-                <a:lnTo>
-                  <a:pt x="2094710" y="2487194"/>
-                </a:lnTo>
-                <a:cubicBezTo>
-                  <a:pt x="1954100" y="2515968"/>
-                  <a:pt x="1808512" y="2531078"/>
-                  <a:pt x="1659395" y="2531078"/>
-                </a:cubicBezTo>
-                <a:cubicBezTo>
-                  <a:pt x="1062928" y="2531078"/>
-                  <a:pt x="522928" y="2289312"/>
-                  <a:pt x="132044" y="1898429"/>
-                </a:cubicBezTo>
-                <a:lnTo>
-                  <a:pt x="0" y="1753144"/>
-                </a:lnTo>
-                <a:lnTo>
-                  <a:pt x="7366" y="1745039"/>
-                </a:lnTo>
-                <a:cubicBezTo>
-                  <a:pt x="315503" y="1371663"/>
-                  <a:pt x="500605" y="892987"/>
-                  <a:pt x="500605" y="371078"/>
-                </a:cubicBezTo>
-                <a:cubicBezTo>
-                  <a:pt x="500605" y="305840"/>
-                  <a:pt x="497713" y="241276"/>
-                  <a:pt x="492050" y="177510"/>
-                </a:cubicBezTo>
-                <a:lnTo>
-                  <a:pt x="468373" y="0"/>
-                </a:lnTo>
-                <a:close/>
-              </a:path>
-            </a:pathLst>
-          </a:custGeom>
-          <a:solidFill>
-            <a:schemeClr val="bg1">
-              <a:lumMod val="85000"/>
-            </a:schemeClr>
-          </a:solidFill>
-          <a:ln>
-            <a:solidFill>
-              <a:schemeClr val="tx1"/>
-            </a:solidFill>
-          </a:ln>
-        </p:spPr>
-        <p:style>
-          <a:lnRef idx="2">
-            <a:schemeClr val="accent1">
-              <a:shade val="50000"/>
-            </a:schemeClr>
-          </a:lnRef>
-          <a:fillRef idx="1">
-            <a:schemeClr val="accent1"/>
-          </a:fillRef>
-          <a:effectRef idx="0">
-            <a:schemeClr val="accent1"/>
-          </a:effectRef>
-          <a:fontRef idx="minor">
-            <a:schemeClr val="lt1"/>
-          </a:fontRef>
-        </p:style>
-        <p:txBody>
-          <a:bodyPr wrap="square" rtlCol="0" anchor="ctr">
-            <a:noAutofit/>
-          </a:bodyPr>
-          <a:lstStyle/>
-          <a:p>
-            <a:pPr algn="ctr"/>
-            <a:endParaRPr lang="de-DE"/>
-          </a:p>
-        </p:txBody>
-      </p:sp>
-      <p:sp>
-        <p:nvSpPr>
-          <p:cNvPr id="9" name="Rechteck 8"/>
-          <p:cNvSpPr/>
-          <p:nvPr/>
-        </p:nvSpPr>
-        <p:spPr>
-          <a:xfrm>
-            <a:off x="6603825" y="1300246"/>
-            <a:ext cx="2403566" cy="592183"/>
-          </a:xfrm>
-          <a:prstGeom prst="rect">
-            <a:avLst/>
-          </a:prstGeom>
-          <a:noFill/>
-          <a:ln>
-            <a:solidFill>
-              <a:schemeClr val="tx1"/>
-            </a:solidFill>
-          </a:ln>
-        </p:spPr>
-        <p:style>
-          <a:lnRef idx="2">
-            <a:schemeClr val="accent1">
-              <a:shade val="50000"/>
-            </a:schemeClr>
-          </a:lnRef>
-          <a:fillRef idx="1">
-            <a:schemeClr val="accent1"/>
-          </a:fillRef>
-          <a:effectRef idx="0">
-            <a:schemeClr val="accent1"/>
-          </a:effectRef>
-          <a:fontRef idx="minor">
-            <a:schemeClr val="lt1"/>
-          </a:fontRef>
-        </p:style>
-        <p:txBody>
-          <a:bodyPr rtlCol="0" anchor="ctr"/>
-          <a:lstStyle/>
-          <a:p>
-            <a:pPr algn="ctr"/>
-            <a:r>
-              <a:rPr lang="en-US" sz="1200" dirty="0" smtClean="0">
-                <a:solidFill>
-                  <a:schemeClr val="tx1"/>
-                </a:solidFill>
-              </a:rPr>
-              <a:t>recurrent events</a:t>
-            </a:r>
-            <a:endParaRPr lang="en-US" dirty="0"/>
-          </a:p>
-        </p:txBody>
-      </p:sp>
-      <p:sp>
-        <p:nvSpPr>
-          <p:cNvPr id="14" name="Rechteck 13"/>
-          <p:cNvSpPr/>
-          <p:nvPr/>
-        </p:nvSpPr>
-        <p:spPr>
-          <a:xfrm>
-            <a:off x="3078480" y="1295303"/>
-            <a:ext cx="2403566" cy="592183"/>
-          </a:xfrm>
-          <a:prstGeom prst="rect">
-            <a:avLst/>
-          </a:prstGeom>
-          <a:noFill/>
-          <a:ln>
-            <a:solidFill>
-              <a:schemeClr val="tx1"/>
-            </a:solidFill>
-          </a:ln>
-        </p:spPr>
-        <p:style>
-          <a:lnRef idx="2">
-            <a:schemeClr val="accent1">
-              <a:shade val="50000"/>
-            </a:schemeClr>
-          </a:lnRef>
-          <a:fillRef idx="1">
-            <a:schemeClr val="accent1"/>
-          </a:fillRef>
-          <a:effectRef idx="0">
-            <a:schemeClr val="accent1"/>
-          </a:effectRef>
-          <a:fontRef idx="minor">
-            <a:schemeClr val="lt1"/>
-          </a:fontRef>
-        </p:style>
-        <p:txBody>
-          <a:bodyPr rtlCol="0" anchor="ctr"/>
-          <a:lstStyle/>
-          <a:p>
-            <a:pPr algn="ctr"/>
-            <a:r>
-              <a:rPr lang="en-US" sz="1200" dirty="0" smtClean="0">
-                <a:solidFill>
-                  <a:schemeClr val="tx1"/>
-                </a:solidFill>
-              </a:rPr>
-              <a:t>censoring &amp; truncation </a:t>
-            </a:r>
-          </a:p>
-          <a:p>
-            <a:pPr algn="ctr"/>
-            <a:r>
-              <a:rPr lang="en-US" sz="1200" dirty="0" smtClean="0">
-                <a:solidFill>
-                  <a:schemeClr val="tx1"/>
-                </a:solidFill>
-              </a:rPr>
-              <a:t>(beyond right-censoring)</a:t>
-            </a:r>
-            <a:r>
-              <a:rPr lang="en-US" dirty="0" smtClean="0">
-                <a:solidFill>
-                  <a:schemeClr val="tx1"/>
-                </a:solidFill>
-              </a:rPr>
-              <a:t> </a:t>
-            </a:r>
-            <a:endParaRPr lang="en-US" dirty="0"/>
-          </a:p>
-        </p:txBody>
-      </p:sp>
-      <p:sp>
-        <p:nvSpPr>
-          <p:cNvPr id="15" name="Rechteck 14"/>
-          <p:cNvSpPr/>
-          <p:nvPr/>
-        </p:nvSpPr>
-        <p:spPr>
-          <a:xfrm>
-            <a:off x="4700864" y="5745972"/>
-            <a:ext cx="2403566" cy="592183"/>
-          </a:xfrm>
-          <a:prstGeom prst="rect">
-            <a:avLst/>
-          </a:prstGeom>
-          <a:noFill/>
-          <a:ln>
-            <a:solidFill>
-              <a:schemeClr val="tx1"/>
-            </a:solidFill>
-          </a:ln>
-        </p:spPr>
-        <p:style>
-          <a:lnRef idx="2">
-            <a:schemeClr val="accent1">
-              <a:shade val="50000"/>
-            </a:schemeClr>
-          </a:lnRef>
-          <a:fillRef idx="1">
-            <a:schemeClr val="accent1"/>
-          </a:fillRef>
-          <a:effectRef idx="0">
-            <a:schemeClr val="accent1"/>
-          </a:effectRef>
-          <a:fontRef idx="minor">
-            <a:schemeClr val="lt1"/>
-          </a:fontRef>
-        </p:style>
-        <p:txBody>
-          <a:bodyPr rtlCol="0" anchor="ctr"/>
-          <a:lstStyle/>
-          <a:p>
-            <a:pPr algn="ctr"/>
-            <a:r>
-              <a:rPr lang="en-US" sz="1200" dirty="0" smtClean="0">
-                <a:solidFill>
-                  <a:schemeClr val="tx1"/>
-                </a:solidFill>
-              </a:rPr>
-              <a:t>Competing events</a:t>
-            </a:r>
-            <a:endParaRPr lang="en-US" dirty="0"/>
-          </a:p>
-        </p:txBody>
-      </p:sp>
-      <p:sp>
-        <p:nvSpPr>
-          <p:cNvPr id="16" name="Rechteck 15"/>
-          <p:cNvSpPr/>
-          <p:nvPr/>
-        </p:nvSpPr>
-        <p:spPr>
-          <a:xfrm>
-            <a:off x="6181705" y="3950980"/>
-            <a:ext cx="537616" cy="476230"/>
-          </a:xfrm>
-          <a:prstGeom prst="rect">
-            <a:avLst/>
-          </a:prstGeom>
-          <a:noFill/>
-          <a:ln>
-            <a:solidFill>
-              <a:schemeClr val="tx1"/>
-            </a:solidFill>
-          </a:ln>
-        </p:spPr>
-        <p:style>
-          <a:lnRef idx="2">
-            <a:schemeClr val="accent1">
-              <a:shade val="50000"/>
-            </a:schemeClr>
-          </a:lnRef>
-          <a:fillRef idx="1">
-            <a:schemeClr val="accent1"/>
-          </a:fillRef>
-          <a:effectRef idx="0">
-            <a:schemeClr val="accent1"/>
-          </a:effectRef>
-          <a:fontRef idx="minor">
-            <a:schemeClr val="lt1"/>
-          </a:fontRef>
-        </p:style>
-        <p:txBody>
-          <a:bodyPr rtlCol="0" anchor="ctr"/>
-          <a:lstStyle/>
-          <a:p>
-            <a:pPr algn="ctr"/>
-            <a:r>
-              <a:rPr lang="en-US" sz="1200" dirty="0" smtClean="0">
-                <a:solidFill>
-                  <a:schemeClr val="tx1"/>
-                </a:solidFill>
-              </a:rPr>
-              <a:t>MSM</a:t>
-            </a:r>
-            <a:endParaRPr lang="en-US" dirty="0"/>
-          </a:p>
-        </p:txBody>
-      </p:sp>
-      <p:sp>
-        <p:nvSpPr>
-          <p:cNvPr id="49" name="Freihandform 48"/>
-          <p:cNvSpPr/>
-          <p:nvPr/>
-        </p:nvSpPr>
-        <p:spPr>
-          <a:xfrm>
-            <a:off x="5455883" y="3165768"/>
-            <a:ext cx="893530" cy="1029440"/>
-          </a:xfrm>
-          <a:custGeom>
-            <a:avLst/>
-            <a:gdLst>
-              <a:gd name="connsiteX0" fmla="*/ 446764 w 893530"/>
-              <a:gd name="connsiteY0" fmla="*/ 0 h 1029440"/>
-              <a:gd name="connsiteX1" fmla="*/ 875757 w 893530"/>
-              <a:gd name="connsiteY1" fmla="*/ 108625 h 1029440"/>
-              <a:gd name="connsiteX2" fmla="*/ 893530 w 893530"/>
-              <a:gd name="connsiteY2" fmla="*/ 119422 h 1029440"/>
-              <a:gd name="connsiteX3" fmla="*/ 872553 w 893530"/>
-              <a:gd name="connsiteY3" fmla="*/ 213010 h 1029440"/>
-              <a:gd name="connsiteX4" fmla="*/ 454131 w 893530"/>
-              <a:gd name="connsiteY4" fmla="*/ 1021335 h 1029440"/>
-              <a:gd name="connsiteX5" fmla="*/ 446765 w 893530"/>
-              <a:gd name="connsiteY5" fmla="*/ 1029440 h 1029440"/>
-              <a:gd name="connsiteX6" fmla="*/ 439399 w 893530"/>
-              <a:gd name="connsiteY6" fmla="*/ 1021335 h 1029440"/>
-              <a:gd name="connsiteX7" fmla="*/ 20977 w 893530"/>
-              <a:gd name="connsiteY7" fmla="*/ 213010 h 1029440"/>
-              <a:gd name="connsiteX8" fmla="*/ 0 w 893530"/>
-              <a:gd name="connsiteY8" fmla="*/ 119421 h 1029440"/>
-              <a:gd name="connsiteX9" fmla="*/ 17771 w 893530"/>
-              <a:gd name="connsiteY9" fmla="*/ 108625 h 1029440"/>
-              <a:gd name="connsiteX10" fmla="*/ 446764 w 893530"/>
-              <a:gd name="connsiteY10" fmla="*/ 0 h 1029440"/>
-            </a:gdLst>
-            <a:ahLst/>
-            <a:cxnLst>
-              <a:cxn ang="0">
-                <a:pos x="connsiteX0" y="connsiteY0"/>
-              </a:cxn>
-              <a:cxn ang="0">
-                <a:pos x="connsiteX1" y="connsiteY1"/>
-              </a:cxn>
-              <a:cxn ang="0">
-                <a:pos x="connsiteX2" y="connsiteY2"/>
-              </a:cxn>
-              <a:cxn ang="0">
-                <a:pos x="connsiteX3" y="connsiteY3"/>
-              </a:cxn>
-              <a:cxn ang="0">
-                <a:pos x="connsiteX4" y="connsiteY4"/>
-              </a:cxn>
-              <a:cxn ang="0">
-                <a:pos x="connsiteX5" y="connsiteY5"/>
-              </a:cxn>
-              <a:cxn ang="0">
-                <a:pos x="connsiteX6" y="connsiteY6"/>
-              </a:cxn>
-              <a:cxn ang="0">
-                <a:pos x="connsiteX7" y="connsiteY7"/>
-              </a:cxn>
-              <a:cxn ang="0">
-                <a:pos x="connsiteX8" y="connsiteY8"/>
-              </a:cxn>
-              <a:cxn ang="0">
-                <a:pos x="connsiteX9" y="connsiteY9"/>
-              </a:cxn>
-              <a:cxn ang="0">
-                <a:pos x="connsiteX10" y="connsiteY10"/>
-              </a:cxn>
-            </a:cxnLst>
-            <a:rect l="l" t="t" r="r" b="b"/>
-            <a:pathLst>
-              <a:path w="893530" h="1029440">
-                <a:moveTo>
-                  <a:pt x="446764" y="0"/>
-                </a:moveTo>
-                <a:cubicBezTo>
-                  <a:pt x="602094" y="0"/>
-                  <a:pt x="748234" y="39350"/>
-                  <a:pt x="875757" y="108625"/>
-                </a:cubicBezTo>
-                <a:lnTo>
-                  <a:pt x="893530" y="119422"/>
-                </a:lnTo>
-                <a:lnTo>
-                  <a:pt x="872553" y="213010"/>
-                </a:lnTo>
-                <a:cubicBezTo>
-                  <a:pt x="791242" y="513482"/>
-                  <a:pt x="646717" y="787975"/>
-                  <a:pt x="454131" y="1021335"/>
-                </a:cubicBezTo>
-                <a:lnTo>
-                  <a:pt x="446765" y="1029440"/>
-                </a:lnTo>
-                <a:lnTo>
-                  <a:pt x="439399" y="1021335"/>
-                </a:lnTo>
-                <a:cubicBezTo>
-                  <a:pt x="246814" y="787975"/>
-                  <a:pt x="102289" y="513482"/>
-                  <a:pt x="20977" y="213010"/>
-                </a:cubicBezTo>
-                <a:lnTo>
-                  <a:pt x="0" y="119421"/>
-                </a:lnTo>
-                <a:lnTo>
-                  <a:pt x="17771" y="108625"/>
-                </a:lnTo>
-                <a:cubicBezTo>
-                  <a:pt x="145295" y="39350"/>
-                  <a:pt x="291434" y="0"/>
-                  <a:pt x="446764" y="0"/>
-                </a:cubicBezTo>
-                <a:close/>
-              </a:path>
-            </a:pathLst>
-          </a:custGeom>
-          <a:noFill/>
-          <a:ln>
-            <a:solidFill>
-              <a:schemeClr val="tx1"/>
-            </a:solidFill>
-          </a:ln>
-        </p:spPr>
-        <p:style>
-          <a:lnRef idx="2">
-            <a:schemeClr val="accent1">
-              <a:shade val="50000"/>
-            </a:schemeClr>
-          </a:lnRef>
-          <a:fillRef idx="1">
-            <a:schemeClr val="accent1"/>
-          </a:fillRef>
-          <a:effectRef idx="0">
-            <a:schemeClr val="accent1"/>
-          </a:effectRef>
-          <a:fontRef idx="minor">
-            <a:schemeClr val="lt1"/>
-          </a:fontRef>
-        </p:style>
-        <p:txBody>
-          <a:bodyPr wrap="square" rtlCol="0" anchor="ctr">
-            <a:noAutofit/>
-          </a:bodyPr>
-          <a:lstStyle/>
-          <a:p>
-            <a:pPr algn="ctr"/>
-            <a:endParaRPr lang="de-DE"/>
-          </a:p>
-        </p:txBody>
-      </p:sp>
-      <p:sp>
-        <p:nvSpPr>
-          <p:cNvPr id="48" name="Freihandform 47"/>
-          <p:cNvSpPr/>
-          <p:nvPr/>
-        </p:nvSpPr>
-        <p:spPr>
-          <a:xfrm>
-            <a:off x="5402043" y="2389680"/>
-            <a:ext cx="1001210" cy="895510"/>
-          </a:xfrm>
-          <a:custGeom>
-            <a:avLst/>
-            <a:gdLst>
-              <a:gd name="connsiteX0" fmla="*/ 500604 w 1001210"/>
-              <a:gd name="connsiteY0" fmla="*/ 0 h 895510"/>
-              <a:gd name="connsiteX1" fmla="*/ 935919 w 1001210"/>
-              <a:gd name="connsiteY1" fmla="*/ 43884 h 895510"/>
-              <a:gd name="connsiteX2" fmla="*/ 968978 w 1001210"/>
-              <a:gd name="connsiteY2" fmla="*/ 52384 h 895510"/>
-              <a:gd name="connsiteX3" fmla="*/ 968978 w 1001210"/>
-              <a:gd name="connsiteY3" fmla="*/ 52385 h 895510"/>
-              <a:gd name="connsiteX4" fmla="*/ 992655 w 1001210"/>
-              <a:gd name="connsiteY4" fmla="*/ 229894 h 895510"/>
-              <a:gd name="connsiteX5" fmla="*/ 1001210 w 1001210"/>
-              <a:gd name="connsiteY5" fmla="*/ 423462 h 895510"/>
-              <a:gd name="connsiteX6" fmla="*/ 967473 w 1001210"/>
-              <a:gd name="connsiteY6" fmla="*/ 805818 h 895510"/>
-              <a:gd name="connsiteX7" fmla="*/ 947370 w 1001210"/>
-              <a:gd name="connsiteY7" fmla="*/ 895510 h 895510"/>
-              <a:gd name="connsiteX8" fmla="*/ 929597 w 1001210"/>
-              <a:gd name="connsiteY8" fmla="*/ 884713 h 895510"/>
-              <a:gd name="connsiteX9" fmla="*/ 500604 w 1001210"/>
-              <a:gd name="connsiteY9" fmla="*/ 776088 h 895510"/>
-              <a:gd name="connsiteX10" fmla="*/ 71611 w 1001210"/>
-              <a:gd name="connsiteY10" fmla="*/ 884713 h 895510"/>
-              <a:gd name="connsiteX11" fmla="*/ 53840 w 1001210"/>
-              <a:gd name="connsiteY11" fmla="*/ 895509 h 895510"/>
-              <a:gd name="connsiteX12" fmla="*/ 33737 w 1001210"/>
-              <a:gd name="connsiteY12" fmla="*/ 805818 h 895510"/>
-              <a:gd name="connsiteX13" fmla="*/ 0 w 1001210"/>
-              <a:gd name="connsiteY13" fmla="*/ 423462 h 895510"/>
-              <a:gd name="connsiteX14" fmla="*/ 8555 w 1001210"/>
-              <a:gd name="connsiteY14" fmla="*/ 229894 h 895510"/>
-              <a:gd name="connsiteX15" fmla="*/ 32233 w 1001210"/>
-              <a:gd name="connsiteY15" fmla="*/ 52385 h 895510"/>
-              <a:gd name="connsiteX16" fmla="*/ 32233 w 1001210"/>
-              <a:gd name="connsiteY16" fmla="*/ 52384 h 895510"/>
-              <a:gd name="connsiteX17" fmla="*/ 65289 w 1001210"/>
-              <a:gd name="connsiteY17" fmla="*/ 43884 h 895510"/>
-              <a:gd name="connsiteX18" fmla="*/ 500604 w 1001210"/>
-              <a:gd name="connsiteY18" fmla="*/ 0 h 895510"/>
-            </a:gdLst>
-            <a:ahLst/>
-            <a:cxnLst>
-              <a:cxn ang="0">
-                <a:pos x="connsiteX0" y="connsiteY0"/>
-              </a:cxn>
-              <a:cxn ang="0">
-                <a:pos x="connsiteX1" y="connsiteY1"/>
-              </a:cxn>
-              <a:cxn ang="0">
-                <a:pos x="connsiteX2" y="connsiteY2"/>
-              </a:cxn>
-              <a:cxn ang="0">
-                <a:pos x="connsiteX3" y="connsiteY3"/>
-              </a:cxn>
-              <a:cxn ang="0">
-                <a:pos x="connsiteX4" y="connsiteY4"/>
-              </a:cxn>
-              <a:cxn ang="0">
-                <a:pos x="connsiteX5" y="connsiteY5"/>
-              </a:cxn>
-              <a:cxn ang="0">
-                <a:pos x="connsiteX6" y="connsiteY6"/>
-              </a:cxn>
-              <a:cxn ang="0">
-                <a:pos x="connsiteX7" y="connsiteY7"/>
-              </a:cxn>
-              <a:cxn ang="0">
-                <a:pos x="connsiteX8" y="connsiteY8"/>
-              </a:cxn>
-              <a:cxn ang="0">
-                <a:pos x="connsiteX9" y="connsiteY9"/>
-              </a:cxn>
-              <a:cxn ang="0">
-                <a:pos x="connsiteX10" y="connsiteY10"/>
-              </a:cxn>
-              <a:cxn ang="0">
-                <a:pos x="connsiteX11" y="connsiteY11"/>
-              </a:cxn>
-              <a:cxn ang="0">
-                <a:pos x="connsiteX12" y="connsiteY12"/>
-              </a:cxn>
-              <a:cxn ang="0">
-                <a:pos x="connsiteX13" y="connsiteY13"/>
-              </a:cxn>
-              <a:cxn ang="0">
-                <a:pos x="connsiteX14" y="connsiteY14"/>
-              </a:cxn>
-              <a:cxn ang="0">
-                <a:pos x="connsiteX15" y="connsiteY15"/>
-              </a:cxn>
-              <a:cxn ang="0">
-                <a:pos x="connsiteX16" y="connsiteY16"/>
-              </a:cxn>
-              <a:cxn ang="0">
-                <a:pos x="connsiteX17" y="connsiteY17"/>
-              </a:cxn>
-              <a:cxn ang="0">
-                <a:pos x="connsiteX18" y="connsiteY18"/>
-              </a:cxn>
-            </a:cxnLst>
-            <a:rect l="l" t="t" r="r" b="b"/>
-            <a:pathLst>
-              <a:path w="1001210" h="895510">
-                <a:moveTo>
-                  <a:pt x="500604" y="0"/>
-                </a:moveTo>
-                <a:cubicBezTo>
-                  <a:pt x="649721" y="0"/>
-                  <a:pt x="795309" y="15111"/>
-                  <a:pt x="935919" y="43884"/>
-                </a:cubicBezTo>
-                <a:lnTo>
-                  <a:pt x="968978" y="52384"/>
-                </a:lnTo>
-                <a:lnTo>
-                  <a:pt x="968978" y="52385"/>
-                </a:lnTo>
-                <a:lnTo>
-                  <a:pt x="992655" y="229894"/>
-                </a:lnTo>
-                <a:cubicBezTo>
-                  <a:pt x="998318" y="293660"/>
-                  <a:pt x="1001210" y="358224"/>
-                  <a:pt x="1001210" y="423462"/>
-                </a:cubicBezTo>
-                <a:cubicBezTo>
-                  <a:pt x="1001210" y="553939"/>
-                  <a:pt x="989641" y="681714"/>
-                  <a:pt x="967473" y="805818"/>
-                </a:cubicBezTo>
-                <a:lnTo>
-                  <a:pt x="947370" y="895510"/>
-                </a:lnTo>
-                <a:lnTo>
-                  <a:pt x="929597" y="884713"/>
-                </a:lnTo>
-                <a:cubicBezTo>
-                  <a:pt x="802074" y="815438"/>
-                  <a:pt x="655934" y="776088"/>
-                  <a:pt x="500604" y="776088"/>
-                </a:cubicBezTo>
-                <a:cubicBezTo>
-                  <a:pt x="345274" y="776088"/>
-                  <a:pt x="199135" y="815438"/>
-                  <a:pt x="71611" y="884713"/>
-                </a:cubicBezTo>
-                <a:lnTo>
-                  <a:pt x="53840" y="895509"/>
-                </a:lnTo>
-                <a:lnTo>
-                  <a:pt x="33737" y="805818"/>
-                </a:lnTo>
-                <a:cubicBezTo>
-                  <a:pt x="11569" y="681714"/>
-                  <a:pt x="0" y="553939"/>
-                  <a:pt x="0" y="423462"/>
-                </a:cubicBezTo>
-                <a:cubicBezTo>
-                  <a:pt x="0" y="358224"/>
-                  <a:pt x="2892" y="293660"/>
-                  <a:pt x="8555" y="229894"/>
-                </a:cubicBezTo>
-                <a:lnTo>
-                  <a:pt x="32233" y="52385"/>
-                </a:lnTo>
-                <a:lnTo>
-                  <a:pt x="32233" y="52384"/>
-                </a:lnTo>
-                <a:lnTo>
-                  <a:pt x="65289" y="43884"/>
-                </a:lnTo>
-                <a:cubicBezTo>
-                  <a:pt x="205900" y="15111"/>
-                  <a:pt x="351487" y="0"/>
-                  <a:pt x="500604" y="0"/>
-                </a:cubicBezTo>
-                <a:close/>
-              </a:path>
-            </a:pathLst>
-          </a:custGeom>
-          <a:noFill/>
-          <a:ln>
-            <a:solidFill>
-              <a:schemeClr val="tx1"/>
-            </a:solidFill>
-          </a:ln>
-        </p:spPr>
-        <p:style>
-          <a:lnRef idx="2">
-            <a:schemeClr val="accent1">
-              <a:shade val="50000"/>
-            </a:schemeClr>
-          </a:lnRef>
-          <a:fillRef idx="1">
-            <a:schemeClr val="accent1"/>
-          </a:fillRef>
-          <a:effectRef idx="0">
-            <a:schemeClr val="accent1"/>
-          </a:effectRef>
-          <a:fontRef idx="minor">
-            <a:schemeClr val="lt1"/>
-          </a:fontRef>
-        </p:style>
-        <p:txBody>
-          <a:bodyPr wrap="square" rtlCol="0" anchor="ctr">
-            <a:noAutofit/>
-          </a:bodyPr>
-          <a:lstStyle/>
-          <a:p>
-            <a:pPr algn="ctr"/>
-            <a:endParaRPr lang="de-DE"/>
-          </a:p>
-        </p:txBody>
-      </p:sp>
-      <p:sp>
-        <p:nvSpPr>
-          <p:cNvPr id="47" name="Freihandform 46"/>
-          <p:cNvSpPr/>
-          <p:nvPr/>
-        </p:nvSpPr>
-        <p:spPr>
-          <a:xfrm>
-            <a:off x="5002647" y="3285190"/>
-            <a:ext cx="1800000" cy="1680579"/>
-          </a:xfrm>
-          <a:custGeom>
-            <a:avLst/>
-            <a:gdLst>
-              <a:gd name="connsiteX0" fmla="*/ 453236 w 1800000"/>
-              <a:gd name="connsiteY0" fmla="*/ 0 h 1680579"/>
-              <a:gd name="connsiteX1" fmla="*/ 474213 w 1800000"/>
-              <a:gd name="connsiteY1" fmla="*/ 93589 h 1680579"/>
-              <a:gd name="connsiteX2" fmla="*/ 892635 w 1800000"/>
-              <a:gd name="connsiteY2" fmla="*/ 901914 h 1680579"/>
-              <a:gd name="connsiteX3" fmla="*/ 900001 w 1800000"/>
-              <a:gd name="connsiteY3" fmla="*/ 910019 h 1680579"/>
-              <a:gd name="connsiteX4" fmla="*/ 907367 w 1800000"/>
-              <a:gd name="connsiteY4" fmla="*/ 901914 h 1680579"/>
-              <a:gd name="connsiteX5" fmla="*/ 1325789 w 1800000"/>
-              <a:gd name="connsiteY5" fmla="*/ 93589 h 1680579"/>
-              <a:gd name="connsiteX6" fmla="*/ 1346766 w 1800000"/>
-              <a:gd name="connsiteY6" fmla="*/ 1 h 1680579"/>
-              <a:gd name="connsiteX7" fmla="*/ 1403198 w 1800000"/>
-              <a:gd name="connsiteY7" fmla="*/ 34285 h 1680579"/>
-              <a:gd name="connsiteX8" fmla="*/ 1800000 w 1800000"/>
-              <a:gd name="connsiteY8" fmla="*/ 780579 h 1680579"/>
-              <a:gd name="connsiteX9" fmla="*/ 900000 w 1800000"/>
-              <a:gd name="connsiteY9" fmla="*/ 1680579 h 1680579"/>
-              <a:gd name="connsiteX10" fmla="*/ 0 w 1800000"/>
-              <a:gd name="connsiteY10" fmla="*/ 780579 h 1680579"/>
-              <a:gd name="connsiteX11" fmla="*/ 396802 w 1800000"/>
-              <a:gd name="connsiteY11" fmla="*/ 34285 h 1680579"/>
-              <a:gd name="connsiteX12" fmla="*/ 453236 w 1800000"/>
-              <a:gd name="connsiteY12" fmla="*/ 0 h 1680579"/>
-            </a:gdLst>
-            <a:ahLst/>
-            <a:cxnLst>
-              <a:cxn ang="0">
-                <a:pos x="connsiteX0" y="connsiteY0"/>
-              </a:cxn>
-              <a:cxn ang="0">
-                <a:pos x="connsiteX1" y="connsiteY1"/>
-              </a:cxn>
-              <a:cxn ang="0">
-                <a:pos x="connsiteX2" y="connsiteY2"/>
-              </a:cxn>
-              <a:cxn ang="0">
-                <a:pos x="connsiteX3" y="connsiteY3"/>
-              </a:cxn>
-              <a:cxn ang="0">
-                <a:pos x="connsiteX4" y="connsiteY4"/>
-              </a:cxn>
-              <a:cxn ang="0">
-                <a:pos x="connsiteX5" y="connsiteY5"/>
-              </a:cxn>
-              <a:cxn ang="0">
-                <a:pos x="connsiteX6" y="connsiteY6"/>
-              </a:cxn>
-              <a:cxn ang="0">
-                <a:pos x="connsiteX7" y="connsiteY7"/>
-              </a:cxn>
-              <a:cxn ang="0">
-                <a:pos x="connsiteX8" y="connsiteY8"/>
-              </a:cxn>
-              <a:cxn ang="0">
-                <a:pos x="connsiteX9" y="connsiteY9"/>
-              </a:cxn>
-              <a:cxn ang="0">
-                <a:pos x="connsiteX10" y="connsiteY10"/>
-              </a:cxn>
-              <a:cxn ang="0">
-                <a:pos x="connsiteX11" y="connsiteY11"/>
-              </a:cxn>
-              <a:cxn ang="0">
-                <a:pos x="connsiteX12" y="connsiteY12"/>
-              </a:cxn>
-            </a:cxnLst>
-            <a:rect l="l" t="t" r="r" b="b"/>
-            <a:pathLst>
-              <a:path w="1800000" h="1680579">
-                <a:moveTo>
-                  <a:pt x="453236" y="0"/>
-                </a:moveTo>
-                <a:lnTo>
-                  <a:pt x="474213" y="93589"/>
-                </a:lnTo>
-                <a:cubicBezTo>
-                  <a:pt x="555525" y="394061"/>
-                  <a:pt x="700050" y="668554"/>
-                  <a:pt x="892635" y="901914"/>
-                </a:cubicBezTo>
-                <a:lnTo>
-                  <a:pt x="900001" y="910019"/>
-                </a:lnTo>
-                <a:lnTo>
-                  <a:pt x="907367" y="901914"/>
-                </a:lnTo>
-                <a:cubicBezTo>
-                  <a:pt x="1099953" y="668554"/>
-                  <a:pt x="1244478" y="394061"/>
-                  <a:pt x="1325789" y="93589"/>
-                </a:cubicBezTo>
-                <a:lnTo>
-                  <a:pt x="1346766" y="1"/>
-                </a:lnTo>
-                <a:lnTo>
-                  <a:pt x="1403198" y="34285"/>
-                </a:lnTo>
-                <a:cubicBezTo>
-                  <a:pt x="1642600" y="196022"/>
-                  <a:pt x="1800000" y="469919"/>
-                  <a:pt x="1800000" y="780579"/>
-                </a:cubicBezTo>
-                <a:cubicBezTo>
-                  <a:pt x="1800000" y="1277635"/>
-                  <a:pt x="1397056" y="1680579"/>
-                  <a:pt x="900000" y="1680579"/>
-                </a:cubicBezTo>
-                <a:cubicBezTo>
-                  <a:pt x="402944" y="1680579"/>
-                  <a:pt x="0" y="1277635"/>
-                  <a:pt x="0" y="780579"/>
-                </a:cubicBezTo>
-                <a:cubicBezTo>
-                  <a:pt x="0" y="469919"/>
-                  <a:pt x="157400" y="196022"/>
-                  <a:pt x="396802" y="34285"/>
-                </a:cubicBezTo>
-                <a:lnTo>
-                  <a:pt x="453236" y="0"/>
-                </a:lnTo>
-                <a:close/>
-              </a:path>
-            </a:pathLst>
-          </a:custGeom>
-          <a:noFill/>
-          <a:ln>
-            <a:solidFill>
-              <a:schemeClr val="tx1"/>
-            </a:solidFill>
-          </a:ln>
-        </p:spPr>
-        <p:style>
-          <a:lnRef idx="2">
-            <a:schemeClr val="accent1">
-              <a:shade val="50000"/>
-            </a:schemeClr>
-          </a:lnRef>
-          <a:fillRef idx="1">
-            <a:schemeClr val="accent1"/>
-          </a:fillRef>
-          <a:effectRef idx="0">
-            <a:schemeClr val="accent1"/>
-          </a:effectRef>
-          <a:fontRef idx="minor">
-            <a:schemeClr val="lt1"/>
-          </a:fontRef>
-        </p:style>
-        <p:txBody>
-          <a:bodyPr wrap="square" rtlCol="0" anchor="ctr">
-            <a:noAutofit/>
-          </a:bodyPr>
-          <a:lstStyle/>
-          <a:p>
-            <a:pPr algn="ctr"/>
-            <a:endParaRPr lang="de-DE"/>
-          </a:p>
-        </p:txBody>
-      </p:sp>
-      <p:sp>
-        <p:nvSpPr>
-          <p:cNvPr id="19" name="Abgerundetes Rechteck 18"/>
-          <p:cNvSpPr/>
-          <p:nvPr/>
-        </p:nvSpPr>
-        <p:spPr>
-          <a:xfrm>
-            <a:off x="5032969" y="4040776"/>
-            <a:ext cx="738145" cy="296639"/>
-          </a:xfrm>
-          <a:prstGeom prst="roundRect">
-            <a:avLst/>
-          </a:prstGeom>
-        </p:spPr>
-        <p:style>
-          <a:lnRef idx="2">
-            <a:schemeClr val="accent1">
-              <a:shade val="50000"/>
-            </a:schemeClr>
-          </a:lnRef>
-          <a:fillRef idx="1">
-            <a:schemeClr val="accent1"/>
-          </a:fillRef>
-          <a:effectRef idx="0">
-            <a:schemeClr val="accent1"/>
-          </a:effectRef>
-          <a:fontRef idx="minor">
-            <a:schemeClr val="lt1"/>
-          </a:fontRef>
-        </p:style>
-        <p:txBody>
-          <a:bodyPr rtlCol="0" anchor="ctr"/>
-          <a:lstStyle/>
-          <a:p>
-            <a:pPr algn="ctr"/>
-            <a:r>
-              <a:rPr lang="de-DE" sz="1000" i="1" dirty="0"/>
-              <a:t>survNODE</a:t>
-            </a:r>
-            <a:endParaRPr lang="de-DE" sz="1000" dirty="0"/>
-          </a:p>
-        </p:txBody>
-      </p:sp>
-      <p:sp>
-        <p:nvSpPr>
-          <p:cNvPr id="21" name="Abgerundetes Rechteck 20"/>
-          <p:cNvSpPr/>
-          <p:nvPr/>
-        </p:nvSpPr>
-        <p:spPr>
-          <a:xfrm>
-            <a:off x="5472575" y="4566258"/>
-            <a:ext cx="869678" cy="296639"/>
-          </a:xfrm>
-          <a:prstGeom prst="roundRect">
-            <a:avLst/>
-          </a:prstGeom>
-        </p:spPr>
-        <p:style>
-          <a:lnRef idx="2">
-            <a:schemeClr val="accent1">
-              <a:shade val="50000"/>
-            </a:schemeClr>
-          </a:lnRef>
-          <a:fillRef idx="1">
-            <a:schemeClr val="accent1"/>
-          </a:fillRef>
-          <a:effectRef idx="0">
-            <a:schemeClr val="accent1"/>
-          </a:effectRef>
-          <a:fontRef idx="minor">
-            <a:schemeClr val="lt1"/>
-          </a:fontRef>
-        </p:style>
-        <p:txBody>
-          <a:bodyPr rtlCol="0" anchor="ctr"/>
-          <a:lstStyle/>
-          <a:p>
-            <a:pPr algn="ctr"/>
-            <a:r>
-              <a:rPr lang="de-DE" sz="1000" i="1" dirty="0" smtClean="0"/>
-              <a:t>IDNetwork</a:t>
-            </a:r>
-            <a:endParaRPr lang="de-DE" sz="1000" dirty="0"/>
-          </a:p>
-        </p:txBody>
-      </p:sp>
-      <p:sp>
-        <p:nvSpPr>
-          <p:cNvPr id="22" name="Abgerundetes Rechteck 21"/>
-          <p:cNvSpPr/>
-          <p:nvPr/>
-        </p:nvSpPr>
-        <p:spPr>
-          <a:xfrm>
-            <a:off x="7104430" y="4401361"/>
-            <a:ext cx="738145" cy="296639"/>
-          </a:xfrm>
-          <a:prstGeom prst="roundRect">
-            <a:avLst/>
-          </a:prstGeom>
-        </p:spPr>
-        <p:style>
-          <a:lnRef idx="2">
-            <a:schemeClr val="accent1">
-              <a:shade val="50000"/>
-            </a:schemeClr>
-          </a:lnRef>
-          <a:fillRef idx="1">
-            <a:schemeClr val="accent1"/>
-          </a:fillRef>
-          <a:effectRef idx="0">
-            <a:schemeClr val="accent1"/>
-          </a:effectRef>
-          <a:fontRef idx="minor">
-            <a:schemeClr val="lt1"/>
-          </a:fontRef>
-        </p:style>
-        <p:txBody>
-          <a:bodyPr rtlCol="0" anchor="ctr"/>
-          <a:lstStyle/>
-          <a:p>
-            <a:pPr algn="ctr"/>
-            <a:r>
-              <a:rPr lang="de-DE" sz="1000" i="1" dirty="0" smtClean="0"/>
-              <a:t>CRESA</a:t>
-            </a:r>
-            <a:endParaRPr lang="de-DE" sz="1000" dirty="0"/>
-          </a:p>
-        </p:txBody>
-      </p:sp>
-      <p:sp>
-        <p:nvSpPr>
-          <p:cNvPr id="23" name="Abgerundetes Rechteck 22"/>
-          <p:cNvSpPr/>
-          <p:nvPr/>
-        </p:nvSpPr>
-        <p:spPr>
-          <a:xfrm>
-            <a:off x="6464217" y="4962988"/>
-            <a:ext cx="854259" cy="296639"/>
-          </a:xfrm>
-          <a:prstGeom prst="roundRect">
-            <a:avLst/>
-          </a:prstGeom>
-        </p:spPr>
-        <p:style>
-          <a:lnRef idx="2">
-            <a:schemeClr val="accent1">
-              <a:shade val="50000"/>
-            </a:schemeClr>
-          </a:lnRef>
-          <a:fillRef idx="1">
-            <a:schemeClr val="accent1"/>
-          </a:fillRef>
-          <a:effectRef idx="0">
-            <a:schemeClr val="accent1"/>
-          </a:effectRef>
-          <a:fontRef idx="minor">
-            <a:schemeClr val="lt1"/>
-          </a:fontRef>
-        </p:style>
-        <p:txBody>
-          <a:bodyPr rtlCol="0" anchor="ctr"/>
-          <a:lstStyle/>
-          <a:p>
-            <a:pPr algn="ctr"/>
-            <a:r>
-              <a:rPr lang="de-DE" sz="1000" i="1" dirty="0" smtClean="0"/>
-              <a:t>DeepComp</a:t>
-            </a:r>
-            <a:endParaRPr lang="de-DE" sz="1000" dirty="0"/>
-          </a:p>
-        </p:txBody>
-      </p:sp>
-      <p:sp>
-        <p:nvSpPr>
-          <p:cNvPr id="24" name="Abgerundetes Rechteck 23"/>
-          <p:cNvSpPr/>
-          <p:nvPr/>
-        </p:nvSpPr>
-        <p:spPr>
-          <a:xfrm>
-            <a:off x="5902647" y="5333380"/>
-            <a:ext cx="990245" cy="296639"/>
-          </a:xfrm>
-          <a:prstGeom prst="roundRect">
-            <a:avLst/>
-          </a:prstGeom>
-        </p:spPr>
-        <p:style>
-          <a:lnRef idx="2">
-            <a:schemeClr val="accent1">
-              <a:shade val="50000"/>
-            </a:schemeClr>
-          </a:lnRef>
-          <a:fillRef idx="1">
-            <a:schemeClr val="accent1"/>
-          </a:fillRef>
-          <a:effectRef idx="0">
-            <a:schemeClr val="accent1"/>
-          </a:effectRef>
-          <a:fontRef idx="minor">
-            <a:schemeClr val="lt1"/>
-          </a:fontRef>
-        </p:style>
-        <p:txBody>
-          <a:bodyPr rtlCol="0" anchor="ctr"/>
-          <a:lstStyle/>
-          <a:p>
-            <a:pPr algn="ctr"/>
-            <a:r>
-              <a:rPr lang="de-DE" sz="1000" i="1" dirty="0" smtClean="0"/>
-              <a:t>DeepCompete</a:t>
-            </a:r>
-            <a:endParaRPr lang="de-DE" sz="1000" dirty="0"/>
-          </a:p>
-        </p:txBody>
-      </p:sp>
-      <p:sp>
-        <p:nvSpPr>
-          <p:cNvPr id="25" name="Abgerundetes Rechteck 24"/>
-          <p:cNvSpPr/>
-          <p:nvPr/>
-        </p:nvSpPr>
-        <p:spPr>
-          <a:xfrm>
-            <a:off x="5032968" y="5139377"/>
-            <a:ext cx="738145" cy="296639"/>
-          </a:xfrm>
-          <a:prstGeom prst="roundRect">
-            <a:avLst/>
-          </a:prstGeom>
-        </p:spPr>
-        <p:style>
-          <a:lnRef idx="2">
-            <a:schemeClr val="accent1">
-              <a:shade val="50000"/>
-            </a:schemeClr>
-          </a:lnRef>
-          <a:fillRef idx="1">
-            <a:schemeClr val="accent1"/>
-          </a:fillRef>
-          <a:effectRef idx="0">
-            <a:schemeClr val="accent1"/>
-          </a:effectRef>
-          <a:fontRef idx="minor">
-            <a:schemeClr val="lt1"/>
-          </a:fontRef>
-        </p:style>
-        <p:txBody>
-          <a:bodyPr rtlCol="0" anchor="ctr"/>
-          <a:lstStyle/>
-          <a:p>
-            <a:pPr algn="ctr"/>
-            <a:r>
-              <a:rPr lang="de-DE" sz="1000" i="1" dirty="0" smtClean="0"/>
-              <a:t>SSMTL</a:t>
-            </a:r>
-            <a:endParaRPr lang="de-DE" sz="1000" dirty="0"/>
-          </a:p>
-        </p:txBody>
-      </p:sp>
-      <p:sp>
-        <p:nvSpPr>
-          <p:cNvPr id="26" name="Abgerundetes Rechteck 25"/>
-          <p:cNvSpPr/>
-          <p:nvPr/>
-        </p:nvSpPr>
-        <p:spPr>
-          <a:xfrm>
-            <a:off x="4134807" y="5306810"/>
-            <a:ext cx="738145" cy="296639"/>
-          </a:xfrm>
-          <a:prstGeom prst="roundRect">
-            <a:avLst/>
-          </a:prstGeom>
-        </p:spPr>
-        <p:style>
-          <a:lnRef idx="2">
-            <a:schemeClr val="accent1">
-              <a:shade val="50000"/>
-            </a:schemeClr>
-          </a:lnRef>
-          <a:fillRef idx="1">
-            <a:schemeClr val="accent1"/>
-          </a:fillRef>
-          <a:effectRef idx="0">
-            <a:schemeClr val="accent1"/>
-          </a:effectRef>
-          <a:fontRef idx="minor">
-            <a:schemeClr val="lt1"/>
-          </a:fontRef>
-        </p:style>
-        <p:txBody>
-          <a:bodyPr rtlCol="0" anchor="ctr"/>
-          <a:lstStyle/>
-          <a:p>
-            <a:pPr algn="ctr"/>
-            <a:r>
-              <a:rPr lang="de-DE" sz="1000" i="1" dirty="0" smtClean="0"/>
-              <a:t>DeepHit</a:t>
-            </a:r>
-            <a:endParaRPr lang="de-DE" sz="1000" dirty="0"/>
-          </a:p>
-        </p:txBody>
-      </p:sp>
-      <p:sp>
-        <p:nvSpPr>
-          <p:cNvPr id="27" name="Abgerundetes Rechteck 26"/>
-          <p:cNvSpPr/>
-          <p:nvPr/>
-        </p:nvSpPr>
-        <p:spPr>
-          <a:xfrm>
-            <a:off x="7035438" y="5319471"/>
-            <a:ext cx="738145" cy="296639"/>
-          </a:xfrm>
-          <a:prstGeom prst="roundRect">
-            <a:avLst/>
-          </a:prstGeom>
-        </p:spPr>
-        <p:style>
-          <a:lnRef idx="2">
-            <a:schemeClr val="accent1">
-              <a:shade val="50000"/>
-            </a:schemeClr>
-          </a:lnRef>
-          <a:fillRef idx="1">
-            <a:schemeClr val="accent1"/>
-          </a:fillRef>
-          <a:effectRef idx="0">
-            <a:schemeClr val="accent1"/>
-          </a:effectRef>
-          <a:fontRef idx="minor">
-            <a:schemeClr val="lt1"/>
-          </a:fontRef>
-        </p:style>
-        <p:txBody>
-          <a:bodyPr rtlCol="0" anchor="ctr"/>
-          <a:lstStyle/>
-          <a:p>
-            <a:pPr algn="ctr"/>
-            <a:r>
-              <a:rPr lang="de-DE" sz="1000" i="1" dirty="0" smtClean="0"/>
-              <a:t>DSM</a:t>
-            </a:r>
-            <a:endParaRPr lang="de-DE" sz="1000" dirty="0"/>
-          </a:p>
-        </p:txBody>
-      </p:sp>
-      <p:sp>
-        <p:nvSpPr>
-          <p:cNvPr id="45" name="Freihandform 44"/>
-          <p:cNvSpPr/>
-          <p:nvPr/>
-        </p:nvSpPr>
-        <p:spPr>
-          <a:xfrm>
-            <a:off x="5434276" y="1431077"/>
-            <a:ext cx="936745" cy="1010987"/>
-          </a:xfrm>
-          <a:custGeom>
-            <a:avLst/>
-            <a:gdLst>
-              <a:gd name="connsiteX0" fmla="*/ 468372 w 936745"/>
-              <a:gd name="connsiteY0" fmla="*/ 0 h 1010987"/>
-              <a:gd name="connsiteX1" fmla="*/ 475738 w 936745"/>
-              <a:gd name="connsiteY1" fmla="*/ 8105 h 1010987"/>
-              <a:gd name="connsiteX2" fmla="*/ 935240 w 936745"/>
-              <a:gd name="connsiteY2" fmla="*/ 999710 h 1010987"/>
-              <a:gd name="connsiteX3" fmla="*/ 936745 w 936745"/>
-              <a:gd name="connsiteY3" fmla="*/ 1010987 h 1010987"/>
-              <a:gd name="connsiteX4" fmla="*/ 903686 w 936745"/>
-              <a:gd name="connsiteY4" fmla="*/ 1002487 h 1010987"/>
-              <a:gd name="connsiteX5" fmla="*/ 468371 w 936745"/>
-              <a:gd name="connsiteY5" fmla="*/ 958603 h 1010987"/>
-              <a:gd name="connsiteX6" fmla="*/ 33056 w 936745"/>
-              <a:gd name="connsiteY6" fmla="*/ 1002487 h 1010987"/>
-              <a:gd name="connsiteX7" fmla="*/ 0 w 936745"/>
-              <a:gd name="connsiteY7" fmla="*/ 1010987 h 1010987"/>
-              <a:gd name="connsiteX8" fmla="*/ 1504 w 936745"/>
-              <a:gd name="connsiteY8" fmla="*/ 999710 h 1010987"/>
-              <a:gd name="connsiteX9" fmla="*/ 461006 w 936745"/>
-              <a:gd name="connsiteY9" fmla="*/ 8105 h 1010987"/>
-              <a:gd name="connsiteX10" fmla="*/ 468372 w 936745"/>
-              <a:gd name="connsiteY10" fmla="*/ 0 h 1010987"/>
-            </a:gdLst>
-            <a:ahLst/>
-            <a:cxnLst>
-              <a:cxn ang="0">
-                <a:pos x="connsiteX0" y="connsiteY0"/>
-              </a:cxn>
-              <a:cxn ang="0">
-                <a:pos x="connsiteX1" y="connsiteY1"/>
-              </a:cxn>
-              <a:cxn ang="0">
-                <a:pos x="connsiteX2" y="connsiteY2"/>
-              </a:cxn>
-              <a:cxn ang="0">
-                <a:pos x="connsiteX3" y="connsiteY3"/>
-              </a:cxn>
-              <a:cxn ang="0">
-                <a:pos x="connsiteX4" y="connsiteY4"/>
-              </a:cxn>
-              <a:cxn ang="0">
-                <a:pos x="connsiteX5" y="connsiteY5"/>
-              </a:cxn>
-              <a:cxn ang="0">
-                <a:pos x="connsiteX6" y="connsiteY6"/>
-              </a:cxn>
-              <a:cxn ang="0">
-                <a:pos x="connsiteX7" y="connsiteY7"/>
-              </a:cxn>
-              <a:cxn ang="0">
-                <a:pos x="connsiteX8" y="connsiteY8"/>
-              </a:cxn>
-              <a:cxn ang="0">
-                <a:pos x="connsiteX9" y="connsiteY9"/>
-              </a:cxn>
-              <a:cxn ang="0">
-                <a:pos x="connsiteX10" y="connsiteY10"/>
-              </a:cxn>
-            </a:cxnLst>
-            <a:rect l="l" t="t" r="r" b="b"/>
-            <a:pathLst>
-              <a:path w="936745" h="1010987">
-                <a:moveTo>
-                  <a:pt x="468372" y="0"/>
-                </a:moveTo>
-                <a:lnTo>
-                  <a:pt x="475738" y="8105"/>
-                </a:lnTo>
-                <a:cubicBezTo>
-                  <a:pt x="706841" y="288137"/>
-                  <a:pt x="868737" y="627400"/>
-                  <a:pt x="935240" y="999710"/>
-                </a:cubicBezTo>
-                <a:lnTo>
-                  <a:pt x="936745" y="1010987"/>
-                </a:lnTo>
-                <a:lnTo>
-                  <a:pt x="903686" y="1002487"/>
-                </a:lnTo>
-                <a:cubicBezTo>
-                  <a:pt x="763076" y="973714"/>
-                  <a:pt x="617488" y="958603"/>
-                  <a:pt x="468371" y="958603"/>
-                </a:cubicBezTo>
-                <a:cubicBezTo>
-                  <a:pt x="319254" y="958603"/>
-                  <a:pt x="173667" y="973714"/>
-                  <a:pt x="33056" y="1002487"/>
-                </a:cubicBezTo>
-                <a:lnTo>
-                  <a:pt x="0" y="1010987"/>
-                </a:lnTo>
-                <a:lnTo>
-                  <a:pt x="1504" y="999710"/>
-                </a:lnTo>
-                <a:cubicBezTo>
-                  <a:pt x="68008" y="627400"/>
-                  <a:pt x="229904" y="288137"/>
-                  <a:pt x="461006" y="8105"/>
-                </a:cubicBezTo>
-                <a:lnTo>
-                  <a:pt x="468372" y="0"/>
-                </a:lnTo>
-                <a:close/>
-              </a:path>
-            </a:pathLst>
-          </a:custGeom>
-          <a:solidFill>
-            <a:schemeClr val="bg1">
-              <a:lumMod val="85000"/>
-            </a:schemeClr>
-          </a:solidFill>
-          <a:ln>
-            <a:solidFill>
-              <a:schemeClr val="tx1"/>
-            </a:solidFill>
-          </a:ln>
-        </p:spPr>
-        <p:style>
-          <a:lnRef idx="2">
-            <a:schemeClr val="accent1">
-              <a:shade val="50000"/>
-            </a:schemeClr>
-          </a:lnRef>
-          <a:fillRef idx="1">
-            <a:schemeClr val="accent1"/>
-          </a:fillRef>
-          <a:effectRef idx="0">
-            <a:schemeClr val="accent1"/>
-          </a:effectRef>
-          <a:fontRef idx="minor">
-            <a:schemeClr val="lt1"/>
-          </a:fontRef>
-        </p:style>
-        <p:txBody>
-          <a:bodyPr wrap="square" rtlCol="0" anchor="ctr">
-            <a:noAutofit/>
-          </a:bodyPr>
-          <a:lstStyle/>
-          <a:p>
-            <a:pPr algn="ctr"/>
-            <a:endParaRPr lang="de-DE"/>
-          </a:p>
-        </p:txBody>
-      </p:sp>
-      <p:sp>
-        <p:nvSpPr>
-          <p:cNvPr id="44" name="Freihandform 43"/>
-          <p:cNvSpPr/>
-          <p:nvPr/>
-        </p:nvSpPr>
-        <p:spPr>
-          <a:xfrm>
-            <a:off x="2083253" y="653143"/>
-            <a:ext cx="3819395" cy="4268111"/>
-          </a:xfrm>
-          <a:custGeom>
-            <a:avLst/>
-            <a:gdLst>
-              <a:gd name="connsiteX0" fmla="*/ 2160000 w 3819395"/>
-              <a:gd name="connsiteY0" fmla="*/ 0 h 4268111"/>
-              <a:gd name="connsiteX1" fmla="*/ 3687351 w 3819395"/>
-              <a:gd name="connsiteY1" fmla="*/ 632649 h 4268111"/>
-              <a:gd name="connsiteX2" fmla="*/ 3819395 w 3819395"/>
-              <a:gd name="connsiteY2" fmla="*/ 777934 h 4268111"/>
-              <a:gd name="connsiteX3" fmla="*/ 3812029 w 3819395"/>
-              <a:gd name="connsiteY3" fmla="*/ 786039 h 4268111"/>
-              <a:gd name="connsiteX4" fmla="*/ 3352527 w 3819395"/>
-              <a:gd name="connsiteY4" fmla="*/ 1777644 h 4268111"/>
-              <a:gd name="connsiteX5" fmla="*/ 3351023 w 3819395"/>
-              <a:gd name="connsiteY5" fmla="*/ 1788921 h 4268111"/>
-              <a:gd name="connsiteX6" fmla="*/ 3351023 w 3819395"/>
-              <a:gd name="connsiteY6" fmla="*/ 1788921 h 4268111"/>
-              <a:gd name="connsiteX7" fmla="*/ 3351023 w 3819395"/>
-              <a:gd name="connsiteY7" fmla="*/ 1788922 h 4268111"/>
-              <a:gd name="connsiteX8" fmla="*/ 3177076 w 3819395"/>
-              <a:gd name="connsiteY8" fmla="*/ 1833647 h 4268111"/>
-              <a:gd name="connsiteX9" fmla="*/ 1659394 w 3819395"/>
-              <a:gd name="connsiteY9" fmla="*/ 3896538 h 4268111"/>
-              <a:gd name="connsiteX10" fmla="*/ 1670546 w 3819395"/>
-              <a:gd name="connsiteY10" fmla="*/ 4117385 h 4268111"/>
-              <a:gd name="connsiteX11" fmla="*/ 1693550 w 3819395"/>
-              <a:gd name="connsiteY11" fmla="*/ 4268111 h 4268111"/>
-              <a:gd name="connsiteX12" fmla="*/ 1517682 w 3819395"/>
-              <a:gd name="connsiteY12" fmla="*/ 4222891 h 4268111"/>
-              <a:gd name="connsiteX13" fmla="*/ 0 w 3819395"/>
-              <a:gd name="connsiteY13" fmla="*/ 2160000 h 4268111"/>
-              <a:gd name="connsiteX14" fmla="*/ 2160000 w 3819395"/>
-              <a:gd name="connsiteY14" fmla="*/ 0 h 4268111"/>
-            </a:gdLst>
-            <a:ahLst/>
-            <a:cxnLst>
-              <a:cxn ang="0">
-                <a:pos x="connsiteX0" y="connsiteY0"/>
-              </a:cxn>
-              <a:cxn ang="0">
-                <a:pos x="connsiteX1" y="connsiteY1"/>
-              </a:cxn>
-              <a:cxn ang="0">
-                <a:pos x="connsiteX2" y="connsiteY2"/>
-              </a:cxn>
-              <a:cxn ang="0">
-                <a:pos x="connsiteX3" y="connsiteY3"/>
-              </a:cxn>
-              <a:cxn ang="0">
-                <a:pos x="connsiteX4" y="connsiteY4"/>
-              </a:cxn>
-              <a:cxn ang="0">
-                <a:pos x="connsiteX5" y="connsiteY5"/>
-              </a:cxn>
-              <a:cxn ang="0">
-                <a:pos x="connsiteX6" y="connsiteY6"/>
-              </a:cxn>
-              <a:cxn ang="0">
-                <a:pos x="connsiteX7" y="connsiteY7"/>
-              </a:cxn>
-              <a:cxn ang="0">
-                <a:pos x="connsiteX8" y="connsiteY8"/>
-              </a:cxn>
-              <a:cxn ang="0">
-                <a:pos x="connsiteX9" y="connsiteY9"/>
-              </a:cxn>
-              <a:cxn ang="0">
-                <a:pos x="connsiteX10" y="connsiteY10"/>
-              </a:cxn>
-              <a:cxn ang="0">
-                <a:pos x="connsiteX11" y="connsiteY11"/>
-              </a:cxn>
-              <a:cxn ang="0">
-                <a:pos x="connsiteX12" y="connsiteY12"/>
-              </a:cxn>
-              <a:cxn ang="0">
-                <a:pos x="connsiteX13" y="connsiteY13"/>
-              </a:cxn>
-              <a:cxn ang="0">
-                <a:pos x="connsiteX14" y="connsiteY14"/>
-              </a:cxn>
-            </a:cxnLst>
-            <a:rect l="l" t="t" r="r" b="b"/>
-            <a:pathLst>
-              <a:path w="3819395" h="4268111">
-                <a:moveTo>
-                  <a:pt x="2160000" y="0"/>
-                </a:moveTo>
-                <a:cubicBezTo>
-                  <a:pt x="2756468" y="0"/>
-                  <a:pt x="3296468" y="241766"/>
-                  <a:pt x="3687351" y="632649"/>
-                </a:cubicBezTo>
-                <a:lnTo>
-                  <a:pt x="3819395" y="777934"/>
-                </a:lnTo>
-                <a:lnTo>
-                  <a:pt x="3812029" y="786039"/>
-                </a:lnTo>
-                <a:cubicBezTo>
-                  <a:pt x="3580927" y="1066071"/>
-                  <a:pt x="3419031" y="1405334"/>
-                  <a:pt x="3352527" y="1777644"/>
-                </a:cubicBezTo>
-                <a:lnTo>
-                  <a:pt x="3351023" y="1788921"/>
-                </a:lnTo>
-                <a:lnTo>
-                  <a:pt x="3351023" y="1788921"/>
-                </a:lnTo>
-                <a:lnTo>
-                  <a:pt x="3351023" y="1788922"/>
-                </a:lnTo>
-                <a:lnTo>
-                  <a:pt x="3177076" y="1833647"/>
-                </a:lnTo>
-                <a:cubicBezTo>
-                  <a:pt x="2297808" y="2107128"/>
-                  <a:pt x="1659394" y="2927278"/>
-                  <a:pt x="1659394" y="3896538"/>
-                </a:cubicBezTo>
-                <a:cubicBezTo>
-                  <a:pt x="1659394" y="3971097"/>
-                  <a:pt x="1663172" y="4044773"/>
-                  <a:pt x="1670546" y="4117385"/>
-                </a:cubicBezTo>
-                <a:lnTo>
-                  <a:pt x="1693550" y="4268111"/>
-                </a:lnTo>
-                <a:lnTo>
-                  <a:pt x="1517682" y="4222891"/>
-                </a:lnTo>
-                <a:cubicBezTo>
-                  <a:pt x="638414" y="3949410"/>
-                  <a:pt x="0" y="3129260"/>
-                  <a:pt x="0" y="2160000"/>
-                </a:cubicBezTo>
-                <a:cubicBezTo>
-                  <a:pt x="0" y="967065"/>
-                  <a:pt x="967065" y="0"/>
-                  <a:pt x="2160000" y="0"/>
-                </a:cubicBezTo>
-                <a:close/>
-              </a:path>
-            </a:pathLst>
-          </a:custGeom>
-          <a:noFill/>
-          <a:ln>
-            <a:solidFill>
-              <a:schemeClr val="tx1"/>
-            </a:solidFill>
-          </a:ln>
-        </p:spPr>
-        <p:style>
-          <a:lnRef idx="2">
-            <a:schemeClr val="accent1">
-              <a:shade val="50000"/>
-            </a:schemeClr>
-          </a:lnRef>
-          <a:fillRef idx="1">
-            <a:schemeClr val="accent1"/>
-          </a:fillRef>
-          <a:effectRef idx="0">
-            <a:schemeClr val="accent1"/>
-          </a:effectRef>
-          <a:fontRef idx="minor">
-            <a:schemeClr val="lt1"/>
-          </a:fontRef>
-        </p:style>
-        <p:txBody>
-          <a:bodyPr wrap="square" rtlCol="0" anchor="ctr">
-            <a:noAutofit/>
-          </a:bodyPr>
-          <a:lstStyle/>
-          <a:p>
-            <a:pPr algn="ctr"/>
-            <a:endParaRPr lang="de-DE"/>
-          </a:p>
-        </p:txBody>
-      </p:sp>
-      <p:sp>
-        <p:nvSpPr>
-          <p:cNvPr id="43" name="Freihandform 42"/>
-          <p:cNvSpPr/>
-          <p:nvPr/>
-        </p:nvSpPr>
-        <p:spPr>
-          <a:xfrm>
-            <a:off x="5902648" y="653143"/>
-            <a:ext cx="3819395" cy="4268111"/>
-          </a:xfrm>
-          <a:custGeom>
-            <a:avLst/>
-            <a:gdLst>
-              <a:gd name="connsiteX0" fmla="*/ 1659395 w 3819395"/>
-              <a:gd name="connsiteY0" fmla="*/ 0 h 4268111"/>
-              <a:gd name="connsiteX1" fmla="*/ 3819395 w 3819395"/>
-              <a:gd name="connsiteY1" fmla="*/ 2160000 h 4268111"/>
-              <a:gd name="connsiteX2" fmla="*/ 2301713 w 3819395"/>
-              <a:gd name="connsiteY2" fmla="*/ 4222891 h 4268111"/>
-              <a:gd name="connsiteX3" fmla="*/ 2125844 w 3819395"/>
-              <a:gd name="connsiteY3" fmla="*/ 4268111 h 4268111"/>
-              <a:gd name="connsiteX4" fmla="*/ 2148847 w 3819395"/>
-              <a:gd name="connsiteY4" fmla="*/ 4117385 h 4268111"/>
-              <a:gd name="connsiteX5" fmla="*/ 2159999 w 3819395"/>
-              <a:gd name="connsiteY5" fmla="*/ 3896538 h 4268111"/>
-              <a:gd name="connsiteX6" fmla="*/ 642317 w 3819395"/>
-              <a:gd name="connsiteY6" fmla="*/ 1833647 h 4268111"/>
-              <a:gd name="connsiteX7" fmla="*/ 468373 w 3819395"/>
-              <a:gd name="connsiteY7" fmla="*/ 1788922 h 4268111"/>
-              <a:gd name="connsiteX8" fmla="*/ 468373 w 3819395"/>
-              <a:gd name="connsiteY8" fmla="*/ 1788921 h 4268111"/>
-              <a:gd name="connsiteX9" fmla="*/ 468373 w 3819395"/>
-              <a:gd name="connsiteY9" fmla="*/ 1788921 h 4268111"/>
-              <a:gd name="connsiteX10" fmla="*/ 466868 w 3819395"/>
-              <a:gd name="connsiteY10" fmla="*/ 1777644 h 4268111"/>
-              <a:gd name="connsiteX11" fmla="*/ 7366 w 3819395"/>
-              <a:gd name="connsiteY11" fmla="*/ 786039 h 4268111"/>
-              <a:gd name="connsiteX12" fmla="*/ 0 w 3819395"/>
-              <a:gd name="connsiteY12" fmla="*/ 777934 h 4268111"/>
-              <a:gd name="connsiteX13" fmla="*/ 132044 w 3819395"/>
-              <a:gd name="connsiteY13" fmla="*/ 632649 h 4268111"/>
-              <a:gd name="connsiteX14" fmla="*/ 1659395 w 3819395"/>
-              <a:gd name="connsiteY14" fmla="*/ 0 h 4268111"/>
-            </a:gdLst>
-            <a:ahLst/>
-            <a:cxnLst>
-              <a:cxn ang="0">
-                <a:pos x="connsiteX0" y="connsiteY0"/>
-              </a:cxn>
-              <a:cxn ang="0">
-                <a:pos x="connsiteX1" y="connsiteY1"/>
-              </a:cxn>
-              <a:cxn ang="0">
-                <a:pos x="connsiteX2" y="connsiteY2"/>
-              </a:cxn>
-              <a:cxn ang="0">
-                <a:pos x="connsiteX3" y="connsiteY3"/>
-              </a:cxn>
-              <a:cxn ang="0">
-                <a:pos x="connsiteX4" y="connsiteY4"/>
-              </a:cxn>
-              <a:cxn ang="0">
-                <a:pos x="connsiteX5" y="connsiteY5"/>
-              </a:cxn>
-              <a:cxn ang="0">
-                <a:pos x="connsiteX6" y="connsiteY6"/>
-              </a:cxn>
-              <a:cxn ang="0">
-                <a:pos x="connsiteX7" y="connsiteY7"/>
-              </a:cxn>
-              <a:cxn ang="0">
-                <a:pos x="connsiteX8" y="connsiteY8"/>
-              </a:cxn>
-              <a:cxn ang="0">
-                <a:pos x="connsiteX9" y="connsiteY9"/>
-              </a:cxn>
-              <a:cxn ang="0">
-                <a:pos x="connsiteX10" y="connsiteY10"/>
-              </a:cxn>
-              <a:cxn ang="0">
-                <a:pos x="connsiteX11" y="connsiteY11"/>
-              </a:cxn>
-              <a:cxn ang="0">
-                <a:pos x="connsiteX12" y="connsiteY12"/>
-              </a:cxn>
-              <a:cxn ang="0">
-                <a:pos x="connsiteX13" y="connsiteY13"/>
-              </a:cxn>
-              <a:cxn ang="0">
-                <a:pos x="connsiteX14" y="connsiteY14"/>
-              </a:cxn>
-            </a:cxnLst>
-            <a:rect l="l" t="t" r="r" b="b"/>
-            <a:pathLst>
-              <a:path w="3819395" h="4268111">
-                <a:moveTo>
-                  <a:pt x="1659395" y="0"/>
-                </a:moveTo>
-                <a:cubicBezTo>
-                  <a:pt x="2852330" y="0"/>
-                  <a:pt x="3819395" y="967065"/>
-                  <a:pt x="3819395" y="2160000"/>
-                </a:cubicBezTo>
-                <a:cubicBezTo>
-                  <a:pt x="3819395" y="3129260"/>
-                  <a:pt x="3180981" y="3949410"/>
-                  <a:pt x="2301713" y="4222891"/>
-                </a:cubicBezTo>
-                <a:lnTo>
-                  <a:pt x="2125844" y="4268111"/>
-                </a:lnTo>
-                <a:lnTo>
-                  <a:pt x="2148847" y="4117385"/>
-                </a:lnTo>
-                <a:cubicBezTo>
-                  <a:pt x="2156222" y="4044773"/>
-                  <a:pt x="2159999" y="3971097"/>
-                  <a:pt x="2159999" y="3896538"/>
-                </a:cubicBezTo>
-                <a:cubicBezTo>
-                  <a:pt x="2159999" y="2927278"/>
-                  <a:pt x="1521585" y="2107128"/>
-                  <a:pt x="642317" y="1833647"/>
-                </a:cubicBezTo>
-                <a:lnTo>
-                  <a:pt x="468373" y="1788922"/>
-                </a:lnTo>
-                <a:lnTo>
-                  <a:pt x="468373" y="1788921"/>
-                </a:lnTo>
-                <a:lnTo>
-                  <a:pt x="468373" y="1788921"/>
-                </a:lnTo>
-                <a:lnTo>
-                  <a:pt x="466868" y="1777644"/>
-                </a:lnTo>
-                <a:cubicBezTo>
-                  <a:pt x="400365" y="1405334"/>
-                  <a:pt x="238469" y="1066071"/>
-                  <a:pt x="7366" y="786039"/>
-                </a:cubicBezTo>
-                <a:lnTo>
-                  <a:pt x="0" y="777934"/>
-                </a:lnTo>
-                <a:lnTo>
-                  <a:pt x="132044" y="632649"/>
-                </a:lnTo>
-                <a:cubicBezTo>
-                  <a:pt x="522928" y="241766"/>
-                  <a:pt x="1062928" y="0"/>
-                  <a:pt x="1659395" y="0"/>
-                </a:cubicBezTo>
-                <a:close/>
-              </a:path>
-            </a:pathLst>
-          </a:custGeom>
-          <a:noFill/>
-          <a:ln>
-            <a:solidFill>
-              <a:schemeClr val="tx1"/>
-            </a:solidFill>
-          </a:ln>
-        </p:spPr>
-        <p:style>
-          <a:lnRef idx="2">
-            <a:schemeClr val="accent1">
-              <a:shade val="50000"/>
-            </a:schemeClr>
-          </a:lnRef>
-          <a:fillRef idx="1">
-            <a:schemeClr val="accent1"/>
-          </a:fillRef>
-          <a:effectRef idx="0">
-            <a:schemeClr val="accent1"/>
-          </a:effectRef>
-          <a:fontRef idx="minor">
-            <a:schemeClr val="lt1"/>
-          </a:fontRef>
-        </p:style>
-        <p:txBody>
-          <a:bodyPr wrap="square" rtlCol="0" anchor="ctr">
-            <a:noAutofit/>
-          </a:bodyPr>
-          <a:lstStyle/>
-          <a:p>
-            <a:pPr algn="ctr"/>
-            <a:endParaRPr lang="de-DE"/>
-          </a:p>
-        </p:txBody>
-      </p:sp>
-      <p:sp>
-        <p:nvSpPr>
-          <p:cNvPr id="46" name="Abgerundetes Rechteck 45"/>
-          <p:cNvSpPr/>
-          <p:nvPr/>
-        </p:nvSpPr>
-        <p:spPr>
-          <a:xfrm>
-            <a:off x="5482046" y="3261735"/>
-            <a:ext cx="860207" cy="296639"/>
-          </a:xfrm>
-          <a:prstGeom prst="roundRect">
-            <a:avLst/>
-          </a:prstGeom>
-        </p:spPr>
-        <p:style>
-          <a:lnRef idx="2">
-            <a:schemeClr val="accent1">
-              <a:shade val="50000"/>
-            </a:schemeClr>
-          </a:lnRef>
-          <a:fillRef idx="1">
-            <a:schemeClr val="accent1"/>
-          </a:fillRef>
-          <a:effectRef idx="0">
-            <a:schemeClr val="accent1"/>
-          </a:effectRef>
-          <a:fontRef idx="minor">
-            <a:schemeClr val="lt1"/>
-          </a:fontRef>
-        </p:style>
-        <p:txBody>
-          <a:bodyPr rtlCol="0" anchor="ctr"/>
-          <a:lstStyle/>
-          <a:p>
-            <a:pPr algn="ctr"/>
-            <a:r>
-              <a:rPr lang="de-DE" sz="1000" i="1" dirty="0" smtClean="0"/>
-              <a:t>DeepPAMM</a:t>
-            </a:r>
-            <a:endParaRPr lang="de-DE" sz="1000" dirty="0"/>
-          </a:p>
-        </p:txBody>
-      </p:sp>
-    </p:spTree>
-    <p:extLst>
-      <p:ext uri="{BB962C8B-B14F-4D97-AF65-F5344CB8AC3E}">
-        <p14:creationId xmlns:p14="http://schemas.microsoft.com/office/powerpoint/2010/main" val="1248124254"/>
-      </p:ext>
-    </p:extLst>
-  </p:cSld>
-  <p:clrMapOvr>
-    <a:masterClrMapping/>
-  </p:clrMapOvr>
-</p:sld>
-</file>
-
-<file path=ppt/slides/slide3.xml><?xml version="1.0" encoding="utf-8"?>
-<p:sld xmlns:a="http://schemas.openxmlformats.org/drawingml/2006/main" xmlns:r="http://schemas.openxmlformats.org/officeDocument/2006/relationships" xmlns:p="http://schemas.openxmlformats.org/presentationml/2006/main">
-  <p:cSld>
-    <p:spTree>
-      <p:nvGrpSpPr>
-        <p:cNvPr id="1" name=""/>
-        <p:cNvGrpSpPr/>
-        <p:nvPr/>
-      </p:nvGrpSpPr>
-      <p:grpSpPr>
-        <a:xfrm>
-          <a:off x="0" y="0"/>
-          <a:ext cx="0" cy="0"/>
-          <a:chOff x="0" y="0"/>
-          <a:chExt cx="0" cy="0"/>
-        </a:xfrm>
-      </p:grpSpPr>
-      <p:sp>
-        <p:nvSpPr>
-          <p:cNvPr id="8" name="Ellipse 7"/>
-          <p:cNvSpPr/>
-          <p:nvPr/>
-        </p:nvSpPr>
-        <p:spPr>
-          <a:xfrm>
-            <a:off x="2761577" y="285799"/>
-            <a:ext cx="4320000" cy="4320000"/>
-          </a:xfrm>
-          <a:prstGeom prst="ellipse">
-            <a:avLst/>
-          </a:prstGeom>
-          <a:noFill/>
-          <a:ln>
-            <a:solidFill>
-              <a:schemeClr val="tx1"/>
-            </a:solidFill>
-          </a:ln>
-        </p:spPr>
-        <p:style>
-          <a:lnRef idx="2">
-            <a:schemeClr val="accent1">
-              <a:shade val="50000"/>
-            </a:schemeClr>
-          </a:lnRef>
-          <a:fillRef idx="1">
-            <a:schemeClr val="accent1"/>
-          </a:fillRef>
-          <a:effectRef idx="0">
-            <a:schemeClr val="accent1"/>
-          </a:effectRef>
-          <a:fontRef idx="minor">
-            <a:schemeClr val="lt1"/>
-          </a:fontRef>
-        </p:style>
-        <p:txBody>
-          <a:bodyPr rtlCol="0" anchor="ctr"/>
-          <a:lstStyle/>
-          <a:p>
-            <a:pPr algn="ctr"/>
-            <a:endParaRPr lang="de-DE"/>
-          </a:p>
-        </p:txBody>
-      </p:sp>
-      <p:sp>
-        <p:nvSpPr>
-          <p:cNvPr id="9" name="Rechteck 8"/>
-          <p:cNvSpPr/>
-          <p:nvPr/>
-        </p:nvSpPr>
-        <p:spPr>
-          <a:xfrm>
-            <a:off x="8781318" y="2758071"/>
-            <a:ext cx="1458822" cy="592183"/>
-          </a:xfrm>
-          <a:prstGeom prst="rect">
-            <a:avLst/>
-          </a:prstGeom>
-          <a:noFill/>
-          <a:ln>
-            <a:solidFill>
-              <a:schemeClr val="tx1"/>
-            </a:solidFill>
-          </a:ln>
-        </p:spPr>
-        <p:style>
-          <a:lnRef idx="2">
-            <a:schemeClr val="accent1">
-              <a:shade val="50000"/>
-            </a:schemeClr>
-          </a:lnRef>
-          <a:fillRef idx="1">
-            <a:schemeClr val="accent1"/>
-          </a:fillRef>
-          <a:effectRef idx="0">
-            <a:schemeClr val="accent1"/>
-          </a:effectRef>
-          <a:fontRef idx="minor">
-            <a:schemeClr val="lt1"/>
-          </a:fontRef>
-        </p:style>
-        <p:txBody>
-          <a:bodyPr rtlCol="0" anchor="ctr"/>
-          <a:lstStyle/>
-          <a:p>
-            <a:pPr algn="ctr"/>
-            <a:r>
-              <a:rPr lang="en-US" sz="1200" dirty="0" smtClean="0">
-                <a:solidFill>
-                  <a:schemeClr val="tx1"/>
-                </a:solidFill>
-              </a:rPr>
-              <a:t>high dimensionality</a:t>
-            </a:r>
-            <a:endParaRPr lang="en-US" dirty="0"/>
-          </a:p>
-        </p:txBody>
-      </p:sp>
-      <p:sp>
-        <p:nvSpPr>
-          <p:cNvPr id="12" name="Ellipse 11"/>
-          <p:cNvSpPr/>
-          <p:nvPr/>
-        </p:nvSpPr>
-        <p:spPr>
-          <a:xfrm>
-            <a:off x="3660623" y="2405996"/>
-            <a:ext cx="4320000" cy="4320000"/>
-          </a:xfrm>
-          <a:prstGeom prst="ellipse">
-            <a:avLst/>
-          </a:prstGeom>
-          <a:noFill/>
-          <a:ln>
-            <a:solidFill>
-              <a:schemeClr val="tx1"/>
-            </a:solidFill>
-          </a:ln>
-        </p:spPr>
-        <p:style>
-          <a:lnRef idx="2">
-            <a:schemeClr val="accent1">
-              <a:shade val="50000"/>
-            </a:schemeClr>
-          </a:lnRef>
-          <a:fillRef idx="1">
-            <a:schemeClr val="accent1"/>
-          </a:fillRef>
-          <a:effectRef idx="0">
-            <a:schemeClr val="accent1"/>
-          </a:effectRef>
-          <a:fontRef idx="minor">
-            <a:schemeClr val="lt1"/>
-          </a:fontRef>
-        </p:style>
-        <p:txBody>
-          <a:bodyPr rtlCol="0" anchor="ctr"/>
-          <a:lstStyle/>
-          <a:p>
-            <a:pPr algn="ctr"/>
-            <a:endParaRPr lang="de-DE"/>
-          </a:p>
-        </p:txBody>
-      </p:sp>
-      <p:sp>
-        <p:nvSpPr>
-          <p:cNvPr id="13" name="Ellipse 12"/>
-          <p:cNvSpPr/>
-          <p:nvPr/>
-        </p:nvSpPr>
-        <p:spPr>
-          <a:xfrm>
-            <a:off x="6092930" y="728445"/>
-            <a:ext cx="4320000" cy="4320000"/>
-          </a:xfrm>
-          <a:prstGeom prst="ellipse">
-            <a:avLst/>
-          </a:prstGeom>
-          <a:noFill/>
-          <a:ln>
-            <a:solidFill>
-              <a:schemeClr val="tx1"/>
-            </a:solidFill>
-          </a:ln>
-        </p:spPr>
-        <p:style>
-          <a:lnRef idx="2">
-            <a:schemeClr val="accent1">
-              <a:shade val="50000"/>
-            </a:schemeClr>
-          </a:lnRef>
-          <a:fillRef idx="1">
-            <a:schemeClr val="accent1"/>
-          </a:fillRef>
-          <a:effectRef idx="0">
-            <a:schemeClr val="accent1"/>
-          </a:effectRef>
-          <a:fontRef idx="minor">
-            <a:schemeClr val="lt1"/>
-          </a:fontRef>
-        </p:style>
-        <p:txBody>
-          <a:bodyPr rtlCol="0" anchor="ctr"/>
-          <a:lstStyle/>
-          <a:p>
-            <a:pPr algn="ctr"/>
-            <a:endParaRPr lang="de-DE"/>
-          </a:p>
-        </p:txBody>
-      </p:sp>
-      <p:sp>
-        <p:nvSpPr>
-          <p:cNvPr id="14" name="Rechteck 13"/>
-          <p:cNvSpPr/>
-          <p:nvPr/>
-        </p:nvSpPr>
-        <p:spPr>
-          <a:xfrm>
-            <a:off x="4356636" y="448265"/>
-            <a:ext cx="805543" cy="592183"/>
-          </a:xfrm>
-          <a:prstGeom prst="rect">
-            <a:avLst/>
-          </a:prstGeom>
-          <a:noFill/>
-          <a:ln>
-            <a:solidFill>
-              <a:schemeClr val="tx1"/>
-            </a:solidFill>
-          </a:ln>
-        </p:spPr>
-        <p:style>
-          <a:lnRef idx="2">
-            <a:schemeClr val="accent1">
-              <a:shade val="50000"/>
-            </a:schemeClr>
-          </a:lnRef>
-          <a:fillRef idx="1">
-            <a:schemeClr val="accent1"/>
-          </a:fillRef>
-          <a:effectRef idx="0">
-            <a:schemeClr val="accent1"/>
-          </a:effectRef>
-          <a:fontRef idx="minor">
-            <a:schemeClr val="lt1"/>
-          </a:fontRef>
-        </p:style>
-        <p:txBody>
-          <a:bodyPr rtlCol="0" anchor="ctr"/>
-          <a:lstStyle/>
-          <a:p>
-            <a:pPr algn="ctr"/>
-            <a:r>
-              <a:rPr lang="en-US" sz="1200" dirty="0" smtClean="0">
-                <a:solidFill>
-                  <a:schemeClr val="tx1"/>
-                </a:solidFill>
-              </a:rPr>
-              <a:t>TVE</a:t>
-            </a:r>
-          </a:p>
-        </p:txBody>
-      </p:sp>
-      <p:sp>
-        <p:nvSpPr>
-          <p:cNvPr id="15" name="Rechteck 14"/>
-          <p:cNvSpPr/>
-          <p:nvPr/>
-        </p:nvSpPr>
-        <p:spPr>
-          <a:xfrm>
-            <a:off x="5301755" y="5974005"/>
-            <a:ext cx="1201783" cy="592183"/>
-          </a:xfrm>
-          <a:prstGeom prst="rect">
-            <a:avLst/>
-          </a:prstGeom>
-          <a:noFill/>
-          <a:ln>
-            <a:solidFill>
-              <a:schemeClr val="tx1"/>
-            </a:solidFill>
-          </a:ln>
-        </p:spPr>
-        <p:style>
-          <a:lnRef idx="2">
-            <a:schemeClr val="accent1">
-              <a:shade val="50000"/>
-            </a:schemeClr>
-          </a:lnRef>
-          <a:fillRef idx="1">
-            <a:schemeClr val="accent1"/>
-          </a:fillRef>
-          <a:effectRef idx="0">
-            <a:schemeClr val="accent1"/>
-          </a:effectRef>
-          <a:fontRef idx="minor">
-            <a:schemeClr val="lt1"/>
-          </a:fontRef>
-        </p:style>
-        <p:txBody>
-          <a:bodyPr rtlCol="0" anchor="ctr"/>
-          <a:lstStyle/>
-          <a:p>
-            <a:pPr algn="ctr"/>
-            <a:r>
-              <a:rPr lang="en-US" sz="1200" dirty="0" smtClean="0">
-                <a:solidFill>
-                  <a:schemeClr val="tx1"/>
-                </a:solidFill>
-              </a:rPr>
-              <a:t>multimodality</a:t>
-            </a:r>
-            <a:endParaRPr lang="en-US" dirty="0"/>
-          </a:p>
-        </p:txBody>
-      </p:sp>
-      <p:sp>
-        <p:nvSpPr>
-          <p:cNvPr id="19" name="Abgerundetes Rechteck 18"/>
-          <p:cNvSpPr/>
-          <p:nvPr/>
-        </p:nvSpPr>
-        <p:spPr>
-          <a:xfrm>
-            <a:off x="3761689" y="4724268"/>
-            <a:ext cx="738145" cy="296639"/>
-          </a:xfrm>
-          <a:prstGeom prst="roundRect">
-            <a:avLst/>
-          </a:prstGeom>
-        </p:spPr>
-        <p:style>
-          <a:lnRef idx="2">
-            <a:schemeClr val="accent1">
-              <a:shade val="50000"/>
-            </a:schemeClr>
-          </a:lnRef>
-          <a:fillRef idx="1">
-            <a:schemeClr val="accent1"/>
-          </a:fillRef>
-          <a:effectRef idx="0">
-            <a:schemeClr val="accent1"/>
-          </a:effectRef>
-          <a:fontRef idx="minor">
-            <a:schemeClr val="lt1"/>
-          </a:fontRef>
-        </p:style>
-        <p:txBody>
-          <a:bodyPr rtlCol="0" anchor="ctr"/>
-          <a:lstStyle/>
-          <a:p>
-            <a:pPr algn="ctr"/>
-            <a:r>
-              <a:rPr lang="de-DE" sz="1000" i="1" dirty="0"/>
-              <a:t>survNODE</a:t>
-            </a:r>
-            <a:endParaRPr lang="de-DE" sz="1000" dirty="0"/>
-          </a:p>
-        </p:txBody>
-      </p:sp>
-      <p:sp>
-        <p:nvSpPr>
-          <p:cNvPr id="20" name="Abgerundetes Rechteck 19"/>
-          <p:cNvSpPr/>
-          <p:nvPr/>
-        </p:nvSpPr>
-        <p:spPr>
-          <a:xfrm>
-            <a:off x="3921797" y="3919138"/>
-            <a:ext cx="869678" cy="296639"/>
-          </a:xfrm>
-          <a:prstGeom prst="roundRect">
-            <a:avLst/>
-          </a:prstGeom>
-        </p:spPr>
-        <p:style>
-          <a:lnRef idx="2">
-            <a:schemeClr val="accent1">
-              <a:shade val="50000"/>
-            </a:schemeClr>
-          </a:lnRef>
-          <a:fillRef idx="1">
-            <a:schemeClr val="accent1"/>
-          </a:fillRef>
-          <a:effectRef idx="0">
-            <a:schemeClr val="accent1"/>
-          </a:effectRef>
-          <a:fontRef idx="minor">
-            <a:schemeClr val="lt1"/>
-          </a:fontRef>
-        </p:style>
-        <p:txBody>
-          <a:bodyPr rtlCol="0" anchor="ctr"/>
-          <a:lstStyle/>
-          <a:p>
-            <a:pPr algn="ctr"/>
-            <a:r>
-              <a:rPr lang="de-DE" sz="1000" i="1" dirty="0" smtClean="0"/>
-              <a:t>DeepPAMM</a:t>
-            </a:r>
-            <a:endParaRPr lang="de-DE" sz="1000" dirty="0"/>
-          </a:p>
-        </p:txBody>
-      </p:sp>
-      <p:sp>
-        <p:nvSpPr>
-          <p:cNvPr id="22" name="Abgerundetes Rechteck 21"/>
-          <p:cNvSpPr/>
-          <p:nvPr/>
-        </p:nvSpPr>
-        <p:spPr>
-          <a:xfrm>
-            <a:off x="4354538" y="5583579"/>
-            <a:ext cx="966120" cy="296639"/>
-          </a:xfrm>
-          <a:prstGeom prst="roundRect">
-            <a:avLst/>
-          </a:prstGeom>
-        </p:spPr>
-        <p:style>
-          <a:lnRef idx="2">
-            <a:schemeClr val="accent1">
-              <a:shade val="50000"/>
-            </a:schemeClr>
-          </a:lnRef>
-          <a:fillRef idx="1">
-            <a:schemeClr val="accent1"/>
-          </a:fillRef>
-          <a:effectRef idx="0">
-            <a:schemeClr val="accent1"/>
-          </a:effectRef>
-          <a:fontRef idx="minor">
-            <a:schemeClr val="lt1"/>
-          </a:fontRef>
-        </p:style>
-        <p:txBody>
-          <a:bodyPr rtlCol="0" anchor="ctr"/>
-          <a:lstStyle/>
-          <a:p>
-            <a:pPr algn="ctr"/>
-            <a:r>
-              <a:rPr lang="de-DE" sz="1000" i="1" dirty="0" smtClean="0"/>
-              <a:t>DeepConvSurv</a:t>
-            </a:r>
-            <a:endParaRPr lang="de-DE" sz="1000" dirty="0"/>
-          </a:p>
-        </p:txBody>
-      </p:sp>
-      <p:sp>
-        <p:nvSpPr>
-          <p:cNvPr id="23" name="Abgerundetes Rechteck 22"/>
-          <p:cNvSpPr/>
-          <p:nvPr/>
-        </p:nvSpPr>
-        <p:spPr>
-          <a:xfrm>
-            <a:off x="6464217" y="4962988"/>
-            <a:ext cx="854259" cy="296639"/>
-          </a:xfrm>
-          <a:prstGeom prst="roundRect">
-            <a:avLst/>
-          </a:prstGeom>
-        </p:spPr>
-        <p:style>
-          <a:lnRef idx="2">
-            <a:schemeClr val="accent1">
-              <a:shade val="50000"/>
-            </a:schemeClr>
-          </a:lnRef>
-          <a:fillRef idx="1">
-            <a:schemeClr val="accent1"/>
-          </a:fillRef>
-          <a:effectRef idx="0">
-            <a:schemeClr val="accent1"/>
-          </a:effectRef>
-          <a:fontRef idx="minor">
-            <a:schemeClr val="lt1"/>
-          </a:fontRef>
-        </p:style>
-        <p:txBody>
-          <a:bodyPr rtlCol="0" anchor="ctr"/>
-          <a:lstStyle/>
-          <a:p>
-            <a:pPr algn="ctr"/>
-            <a:r>
-              <a:rPr lang="de-DE" sz="1000" i="1" dirty="0" smtClean="0"/>
-              <a:t>SurvNAM</a:t>
-            </a:r>
-            <a:endParaRPr lang="de-DE" sz="1000" dirty="0"/>
-          </a:p>
-        </p:txBody>
-      </p:sp>
-      <p:sp>
-        <p:nvSpPr>
-          <p:cNvPr id="24" name="Abgerundetes Rechteck 23"/>
-          <p:cNvSpPr/>
-          <p:nvPr/>
-        </p:nvSpPr>
-        <p:spPr>
-          <a:xfrm>
-            <a:off x="5005738" y="2905844"/>
-            <a:ext cx="988929" cy="296639"/>
-          </a:xfrm>
-          <a:prstGeom prst="roundRect">
-            <a:avLst/>
-          </a:prstGeom>
-        </p:spPr>
-        <p:style>
-          <a:lnRef idx="2">
-            <a:schemeClr val="accent1">
-              <a:shade val="50000"/>
-            </a:schemeClr>
-          </a:lnRef>
-          <a:fillRef idx="1">
-            <a:schemeClr val="accent1"/>
-          </a:fillRef>
-          <a:effectRef idx="0">
-            <a:schemeClr val="accent1"/>
-          </a:effectRef>
-          <a:fontRef idx="minor">
-            <a:schemeClr val="lt1"/>
-          </a:fontRef>
-        </p:style>
-        <p:txBody>
-          <a:bodyPr rtlCol="0" anchor="ctr"/>
-          <a:lstStyle/>
-          <a:p>
-            <a:pPr algn="ctr"/>
-            <a:r>
-              <a:rPr lang="de-DE" sz="1000" i="1" dirty="0" smtClean="0"/>
-              <a:t>Nnet-survival</a:t>
-            </a:r>
-          </a:p>
-        </p:txBody>
-      </p:sp>
-      <p:sp>
-        <p:nvSpPr>
-          <p:cNvPr id="27" name="Abgerundetes Rechteck 26"/>
-          <p:cNvSpPr/>
-          <p:nvPr/>
-        </p:nvSpPr>
-        <p:spPr>
-          <a:xfrm>
-            <a:off x="5131129" y="4909616"/>
-            <a:ext cx="961801" cy="296639"/>
-          </a:xfrm>
-          <a:prstGeom prst="roundRect">
-            <a:avLst/>
-          </a:prstGeom>
-        </p:spPr>
-        <p:style>
-          <a:lnRef idx="2">
-            <a:schemeClr val="accent1">
-              <a:shade val="50000"/>
-            </a:schemeClr>
-          </a:lnRef>
-          <a:fillRef idx="1">
-            <a:schemeClr val="accent1"/>
-          </a:fillRef>
-          <a:effectRef idx="0">
-            <a:schemeClr val="accent1"/>
-          </a:effectRef>
-          <a:fontRef idx="minor">
-            <a:schemeClr val="lt1"/>
-          </a:fontRef>
-        </p:style>
-        <p:txBody>
-          <a:bodyPr rtlCol="0" anchor="ctr"/>
-          <a:lstStyle/>
-          <a:p>
-            <a:pPr algn="ctr"/>
-            <a:r>
-              <a:rPr lang="de-DE" sz="1000" i="1" dirty="0" smtClean="0"/>
-              <a:t>WideAndDeep</a:t>
-            </a:r>
-            <a:endParaRPr lang="de-DE" sz="1000" dirty="0"/>
-          </a:p>
-        </p:txBody>
-      </p:sp>
-      <p:sp>
-        <p:nvSpPr>
-          <p:cNvPr id="28" name="Rechteck 27"/>
-          <p:cNvSpPr/>
-          <p:nvPr/>
-        </p:nvSpPr>
-        <p:spPr>
-          <a:xfrm>
-            <a:off x="2442934" y="4781128"/>
-            <a:ext cx="805543" cy="592183"/>
-          </a:xfrm>
-          <a:prstGeom prst="rect">
-            <a:avLst/>
-          </a:prstGeom>
-          <a:noFill/>
-          <a:ln>
-            <a:solidFill>
-              <a:schemeClr val="tx1"/>
-            </a:solidFill>
-          </a:ln>
-        </p:spPr>
-        <p:style>
-          <a:lnRef idx="2">
-            <a:schemeClr val="accent1">
-              <a:shade val="50000"/>
-            </a:schemeClr>
-          </a:lnRef>
-          <a:fillRef idx="1">
-            <a:schemeClr val="accent1"/>
-          </a:fillRef>
-          <a:effectRef idx="0">
-            <a:schemeClr val="accent1"/>
-          </a:effectRef>
-          <a:fontRef idx="minor">
-            <a:schemeClr val="lt1"/>
-          </a:fontRef>
-        </p:style>
-        <p:txBody>
-          <a:bodyPr rtlCol="0" anchor="ctr"/>
-          <a:lstStyle/>
-          <a:p>
-            <a:pPr algn="ctr"/>
-            <a:r>
-              <a:rPr lang="en-US" sz="1200" dirty="0" smtClean="0">
-                <a:solidFill>
-                  <a:schemeClr val="tx1"/>
-                </a:solidFill>
-              </a:rPr>
-              <a:t>TVF</a:t>
-            </a:r>
-          </a:p>
-        </p:txBody>
-      </p:sp>
-      <p:sp>
-        <p:nvSpPr>
-          <p:cNvPr id="29" name="Ellipse 28"/>
-          <p:cNvSpPr/>
-          <p:nvPr/>
-        </p:nvSpPr>
-        <p:spPr>
-          <a:xfrm>
-            <a:off x="506488" y="1783351"/>
-            <a:ext cx="4320000" cy="4320000"/>
-          </a:xfrm>
-          <a:prstGeom prst="ellipse">
-            <a:avLst/>
-          </a:prstGeom>
-          <a:noFill/>
-          <a:ln>
-            <a:solidFill>
-              <a:schemeClr val="tx1"/>
-            </a:solidFill>
-          </a:ln>
-        </p:spPr>
-        <p:style>
-          <a:lnRef idx="2">
-            <a:schemeClr val="accent1">
-              <a:shade val="50000"/>
-            </a:schemeClr>
-          </a:lnRef>
-          <a:fillRef idx="1">
-            <a:schemeClr val="accent1"/>
-          </a:fillRef>
-          <a:effectRef idx="0">
-            <a:schemeClr val="accent1"/>
-          </a:effectRef>
-          <a:fontRef idx="minor">
-            <a:schemeClr val="lt1"/>
-          </a:fontRef>
-        </p:style>
-        <p:txBody>
-          <a:bodyPr rtlCol="0" anchor="ctr"/>
-          <a:lstStyle/>
-          <a:p>
-            <a:pPr algn="ctr"/>
-            <a:endParaRPr lang="de-DE"/>
-          </a:p>
-        </p:txBody>
-      </p:sp>
-      <p:sp>
-        <p:nvSpPr>
-          <p:cNvPr id="30" name="Abgerundetes Rechteck 29"/>
-          <p:cNvSpPr/>
-          <p:nvPr/>
-        </p:nvSpPr>
-        <p:spPr>
-          <a:xfrm>
-            <a:off x="6187273" y="2926386"/>
-            <a:ext cx="738145" cy="296639"/>
-          </a:xfrm>
-          <a:prstGeom prst="roundRect">
-            <a:avLst/>
-          </a:prstGeom>
-        </p:spPr>
-        <p:style>
-          <a:lnRef idx="2">
-            <a:schemeClr val="accent1">
-              <a:shade val="50000"/>
-            </a:schemeClr>
-          </a:lnRef>
-          <a:fillRef idx="1">
-            <a:schemeClr val="accent1"/>
-          </a:fillRef>
-          <a:effectRef idx="0">
-            <a:schemeClr val="accent1"/>
-          </a:effectRef>
-          <a:fontRef idx="minor">
-            <a:schemeClr val="lt1"/>
-          </a:fontRef>
-        </p:style>
-        <p:txBody>
-          <a:bodyPr rtlCol="0" anchor="ctr"/>
-          <a:lstStyle/>
-          <a:p>
-            <a:pPr algn="ctr"/>
-            <a:r>
-              <a:rPr lang="de-DE" sz="1000" i="1" dirty="0" smtClean="0"/>
-              <a:t>MultiSurv</a:t>
-            </a:r>
-            <a:endParaRPr lang="de-DE" sz="1000" dirty="0"/>
-          </a:p>
-        </p:txBody>
-      </p:sp>
-      <p:sp>
-        <p:nvSpPr>
-          <p:cNvPr id="31" name="Abgerundetes Rechteck 30"/>
-          <p:cNvSpPr/>
-          <p:nvPr/>
-        </p:nvSpPr>
-        <p:spPr>
-          <a:xfrm>
-            <a:off x="6766262" y="3830767"/>
-            <a:ext cx="988929" cy="296639"/>
-          </a:xfrm>
-          <a:prstGeom prst="roundRect">
-            <a:avLst/>
-          </a:prstGeom>
-        </p:spPr>
-        <p:style>
-          <a:lnRef idx="2">
-            <a:schemeClr val="accent1">
-              <a:shade val="50000"/>
-            </a:schemeClr>
-          </a:lnRef>
-          <a:fillRef idx="1">
-            <a:schemeClr val="accent1"/>
-          </a:fillRef>
-          <a:effectRef idx="0">
-            <a:schemeClr val="accent1"/>
-          </a:effectRef>
-          <a:fontRef idx="minor">
-            <a:schemeClr val="lt1"/>
-          </a:fontRef>
-        </p:style>
-        <p:txBody>
-          <a:bodyPr rtlCol="0" anchor="ctr"/>
-          <a:lstStyle/>
-          <a:p>
-            <a:pPr algn="ctr"/>
-            <a:r>
-              <a:rPr lang="de-DE" sz="1000" i="1" dirty="0" smtClean="0"/>
-              <a:t>ConcatAE/</a:t>
-            </a:r>
-          </a:p>
-          <a:p>
-            <a:pPr algn="ctr"/>
-            <a:r>
-              <a:rPr lang="de-DE" sz="1000" i="1" dirty="0" smtClean="0"/>
-              <a:t>CrossAE</a:t>
-            </a:r>
-          </a:p>
-        </p:txBody>
-      </p:sp>
-      <p:sp>
-        <p:nvSpPr>
-          <p:cNvPr id="32" name="Abgerundetes Rechteck 31"/>
-          <p:cNvSpPr/>
-          <p:nvPr/>
-        </p:nvSpPr>
-        <p:spPr>
-          <a:xfrm>
-            <a:off x="7081577" y="4319133"/>
-            <a:ext cx="854259" cy="296639"/>
-          </a:xfrm>
-          <a:prstGeom prst="roundRect">
-            <a:avLst/>
-          </a:prstGeom>
-        </p:spPr>
-        <p:style>
-          <a:lnRef idx="2">
-            <a:schemeClr val="accent1">
-              <a:shade val="50000"/>
-            </a:schemeClr>
-          </a:lnRef>
-          <a:fillRef idx="1">
-            <a:schemeClr val="accent1"/>
-          </a:fillRef>
-          <a:effectRef idx="0">
-            <a:schemeClr val="accent1"/>
-          </a:effectRef>
-          <a:fontRef idx="minor">
-            <a:schemeClr val="lt1"/>
-          </a:fontRef>
-        </p:style>
-        <p:txBody>
-          <a:bodyPr rtlCol="0" anchor="ctr"/>
-          <a:lstStyle/>
-          <a:p>
-            <a:pPr algn="ctr"/>
-            <a:r>
-              <a:rPr lang="de-DE" sz="1000" i="1" dirty="0" smtClean="0"/>
-              <a:t>Haa2019</a:t>
-            </a:r>
-            <a:endParaRPr lang="de-DE" sz="1000" dirty="0"/>
-          </a:p>
-        </p:txBody>
-      </p:sp>
-      <p:sp>
-        <p:nvSpPr>
-          <p:cNvPr id="34" name="Abgerundetes Rechteck 33"/>
-          <p:cNvSpPr/>
-          <p:nvPr/>
-        </p:nvSpPr>
-        <p:spPr>
-          <a:xfrm>
-            <a:off x="6556345" y="5507867"/>
-            <a:ext cx="854259" cy="296639"/>
-          </a:xfrm>
-          <a:prstGeom prst="roundRect">
-            <a:avLst/>
-          </a:prstGeom>
-        </p:spPr>
-        <p:style>
-          <a:lnRef idx="2">
-            <a:schemeClr val="accent1">
-              <a:shade val="50000"/>
-            </a:schemeClr>
-          </a:lnRef>
-          <a:fillRef idx="1">
-            <a:schemeClr val="accent1"/>
-          </a:fillRef>
-          <a:effectRef idx="0">
-            <a:schemeClr val="accent1"/>
-          </a:effectRef>
-          <a:fontRef idx="minor">
-            <a:schemeClr val="lt1"/>
-          </a:fontRef>
-        </p:style>
-        <p:txBody>
-          <a:bodyPr rtlCol="0" anchor="ctr"/>
-          <a:lstStyle/>
-          <a:p>
-            <a:pPr algn="ctr"/>
-            <a:r>
-              <a:rPr lang="de-DE" sz="1000" i="1" dirty="0" smtClean="0"/>
-              <a:t>CapSurv</a:t>
-            </a:r>
-            <a:endParaRPr lang="de-DE" sz="1000" dirty="0"/>
-          </a:p>
-        </p:txBody>
-      </p:sp>
-      <p:sp>
-        <p:nvSpPr>
-          <p:cNvPr id="35" name="Abgerundetes Rechteck 34"/>
-          <p:cNvSpPr/>
-          <p:nvPr/>
-        </p:nvSpPr>
-        <p:spPr>
-          <a:xfrm>
-            <a:off x="5438379" y="5368068"/>
-            <a:ext cx="961801" cy="296639"/>
-          </a:xfrm>
-          <a:prstGeom prst="roundRect">
-            <a:avLst/>
-          </a:prstGeom>
-        </p:spPr>
-        <p:style>
-          <a:lnRef idx="2">
-            <a:schemeClr val="accent1">
-              <a:shade val="50000"/>
-            </a:schemeClr>
-          </a:lnRef>
-          <a:fillRef idx="1">
-            <a:schemeClr val="accent1"/>
-          </a:fillRef>
-          <a:effectRef idx="0">
-            <a:schemeClr val="accent1"/>
-          </a:effectRef>
-          <a:fontRef idx="minor">
-            <a:schemeClr val="lt1"/>
-          </a:fontRef>
-        </p:style>
-        <p:txBody>
-          <a:bodyPr rtlCol="0" anchor="ctr"/>
-          <a:lstStyle/>
-          <a:p>
-            <a:pPr algn="ctr"/>
-            <a:r>
-              <a:rPr lang="de-DE" sz="1000" i="1" dirty="0" smtClean="0"/>
-              <a:t>Hua2018</a:t>
-            </a:r>
-            <a:endParaRPr lang="de-DE" sz="1000" dirty="0"/>
-          </a:p>
-        </p:txBody>
-      </p:sp>
-      <p:sp>
-        <p:nvSpPr>
-          <p:cNvPr id="36" name="Abgerundetes Rechteck 35"/>
-          <p:cNvSpPr/>
-          <p:nvPr/>
-        </p:nvSpPr>
-        <p:spPr>
-          <a:xfrm>
-            <a:off x="8172702" y="4215777"/>
-            <a:ext cx="1292032" cy="296639"/>
-          </a:xfrm>
-          <a:prstGeom prst="roundRect">
-            <a:avLst/>
-          </a:prstGeom>
-        </p:spPr>
-        <p:style>
-          <a:lnRef idx="2">
-            <a:schemeClr val="accent1">
-              <a:shade val="50000"/>
-            </a:schemeClr>
-          </a:lnRef>
-          <a:fillRef idx="1">
-            <a:schemeClr val="accent1"/>
-          </a:fillRef>
-          <a:effectRef idx="0">
-            <a:schemeClr val="accent1"/>
-          </a:effectRef>
-          <a:fontRef idx="minor">
-            <a:schemeClr val="lt1"/>
-          </a:fontRef>
-        </p:style>
-        <p:txBody>
-          <a:bodyPr rtlCol="0" anchor="ctr"/>
-          <a:lstStyle/>
-          <a:p>
-            <a:pPr algn="ctr"/>
-            <a:r>
-              <a:rPr lang="de-DE" sz="1000" i="1" dirty="0" smtClean="0"/>
-              <a:t>DNNSurv_Sun2022</a:t>
-            </a:r>
-          </a:p>
-        </p:txBody>
-      </p:sp>
-      <p:sp>
-        <p:nvSpPr>
-          <p:cNvPr id="37" name="Abgerundetes Rechteck 36"/>
-          <p:cNvSpPr/>
-          <p:nvPr/>
-        </p:nvSpPr>
-        <p:spPr>
-          <a:xfrm>
-            <a:off x="7347680" y="2440051"/>
-            <a:ext cx="1155885" cy="296639"/>
-          </a:xfrm>
-          <a:prstGeom prst="roundRect">
-            <a:avLst/>
-          </a:prstGeom>
-        </p:spPr>
-        <p:style>
-          <a:lnRef idx="2">
-            <a:schemeClr val="accent1">
-              <a:shade val="50000"/>
-            </a:schemeClr>
-          </a:lnRef>
-          <a:fillRef idx="1">
-            <a:schemeClr val="accent1"/>
-          </a:fillRef>
-          <a:effectRef idx="0">
-            <a:schemeClr val="accent1"/>
-          </a:effectRef>
-          <a:fontRef idx="minor">
-            <a:schemeClr val="lt1"/>
-          </a:fontRef>
-        </p:style>
-        <p:txBody>
-          <a:bodyPr rtlCol="0" anchor="ctr"/>
-          <a:lstStyle/>
-          <a:p>
-            <a:pPr algn="ctr"/>
-            <a:r>
-              <a:rPr lang="de-DE" sz="1000" i="1" dirty="0" smtClean="0"/>
-              <a:t>FuzzyDeepCoxPH</a:t>
-            </a:r>
-            <a:endParaRPr lang="de-DE" sz="1000" dirty="0"/>
-          </a:p>
-        </p:txBody>
-      </p:sp>
-      <p:sp>
-        <p:nvSpPr>
-          <p:cNvPr id="38" name="Abgerundetes Rechteck 37"/>
-          <p:cNvSpPr/>
-          <p:nvPr/>
-        </p:nvSpPr>
-        <p:spPr>
-          <a:xfrm>
-            <a:off x="8847171" y="2002010"/>
-            <a:ext cx="854259" cy="296639"/>
-          </a:xfrm>
-          <a:prstGeom prst="roundRect">
-            <a:avLst/>
-          </a:prstGeom>
-        </p:spPr>
-        <p:style>
-          <a:lnRef idx="2">
-            <a:schemeClr val="accent1">
-              <a:shade val="50000"/>
-            </a:schemeClr>
-          </a:lnRef>
-          <a:fillRef idx="1">
-            <a:schemeClr val="accent1"/>
-          </a:fillRef>
-          <a:effectRef idx="0">
-            <a:schemeClr val="accent1"/>
-          </a:effectRef>
-          <a:fontRef idx="minor">
-            <a:schemeClr val="lt1"/>
-          </a:fontRef>
-        </p:style>
-        <p:txBody>
-          <a:bodyPr rtlCol="0" anchor="ctr"/>
-          <a:lstStyle/>
-          <a:p>
-            <a:pPr algn="ctr"/>
-            <a:r>
-              <a:rPr lang="de-DE" sz="1000" i="1" dirty="0" smtClean="0"/>
-              <a:t>DeepOmix</a:t>
-            </a:r>
-            <a:endParaRPr lang="de-DE" sz="1000" dirty="0"/>
-          </a:p>
-        </p:txBody>
-      </p:sp>
-      <p:sp>
-        <p:nvSpPr>
-          <p:cNvPr id="39" name="Abgerundetes Rechteck 38"/>
-          <p:cNvSpPr/>
-          <p:nvPr/>
-        </p:nvSpPr>
-        <p:spPr>
-          <a:xfrm>
-            <a:off x="8610475" y="1484506"/>
-            <a:ext cx="854259" cy="296639"/>
-          </a:xfrm>
-          <a:prstGeom prst="roundRect">
-            <a:avLst/>
-          </a:prstGeom>
-        </p:spPr>
-        <p:style>
-          <a:lnRef idx="2">
-            <a:schemeClr val="accent1">
-              <a:shade val="50000"/>
-            </a:schemeClr>
-          </a:lnRef>
-          <a:fillRef idx="1">
-            <a:schemeClr val="accent1"/>
-          </a:fillRef>
-          <a:effectRef idx="0">
-            <a:schemeClr val="accent1"/>
-          </a:effectRef>
-          <a:fontRef idx="minor">
-            <a:schemeClr val="lt1"/>
-          </a:fontRef>
-        </p:style>
-        <p:txBody>
-          <a:bodyPr rtlCol="0" anchor="ctr"/>
-          <a:lstStyle/>
-          <a:p>
-            <a:pPr algn="ctr"/>
-            <a:r>
-              <a:rPr lang="de-DE" sz="1000" i="1" dirty="0"/>
-              <a:t>Cox-nnet</a:t>
-            </a:r>
-            <a:endParaRPr lang="de-DE" sz="1000" dirty="0"/>
-          </a:p>
-        </p:txBody>
-      </p:sp>
-      <p:sp>
-        <p:nvSpPr>
-          <p:cNvPr id="40" name="Abgerundetes Rechteck 39"/>
-          <p:cNvSpPr/>
-          <p:nvPr/>
-        </p:nvSpPr>
-        <p:spPr>
-          <a:xfrm>
-            <a:off x="8206894" y="3595928"/>
-            <a:ext cx="854259" cy="296639"/>
-          </a:xfrm>
-          <a:prstGeom prst="roundRect">
-            <a:avLst/>
-          </a:prstGeom>
-        </p:spPr>
-        <p:style>
-          <a:lnRef idx="2">
-            <a:schemeClr val="accent1">
-              <a:shade val="50000"/>
-            </a:schemeClr>
-          </a:lnRef>
-          <a:fillRef idx="1">
-            <a:schemeClr val="accent1"/>
-          </a:fillRef>
-          <a:effectRef idx="0">
-            <a:schemeClr val="accent1"/>
-          </a:effectRef>
-          <a:fontRef idx="minor">
-            <a:schemeClr val="lt1"/>
-          </a:fontRef>
-        </p:style>
-        <p:txBody>
-          <a:bodyPr rtlCol="0" anchor="ctr"/>
-          <a:lstStyle/>
-          <a:p>
-            <a:pPr algn="ctr"/>
-            <a:r>
-              <a:rPr lang="de-DE" sz="1000" i="1" dirty="0" smtClean="0"/>
-              <a:t>Cox-PASNet</a:t>
-            </a:r>
-            <a:endParaRPr lang="de-DE" sz="1000" dirty="0"/>
-          </a:p>
-        </p:txBody>
-      </p:sp>
-      <p:sp>
-        <p:nvSpPr>
-          <p:cNvPr id="41" name="Abgerundetes Rechteck 40"/>
-          <p:cNvSpPr/>
-          <p:nvPr/>
-        </p:nvSpPr>
-        <p:spPr>
-          <a:xfrm>
-            <a:off x="7410604" y="1187867"/>
-            <a:ext cx="854259" cy="296639"/>
-          </a:xfrm>
-          <a:prstGeom prst="roundRect">
-            <a:avLst/>
-          </a:prstGeom>
-        </p:spPr>
-        <p:style>
-          <a:lnRef idx="2">
-            <a:schemeClr val="accent1">
-              <a:shade val="50000"/>
-            </a:schemeClr>
-          </a:lnRef>
-          <a:fillRef idx="1">
-            <a:schemeClr val="accent1"/>
-          </a:fillRef>
-          <a:effectRef idx="0">
-            <a:schemeClr val="accent1"/>
-          </a:effectRef>
-          <a:fontRef idx="minor">
-            <a:schemeClr val="lt1"/>
-          </a:fontRef>
-        </p:style>
-        <p:txBody>
-          <a:bodyPr rtlCol="0" anchor="ctr"/>
-          <a:lstStyle/>
-          <a:p>
-            <a:pPr algn="ctr"/>
-            <a:r>
-              <a:rPr lang="de-DE" sz="1000" i="1" dirty="0" smtClean="0"/>
-              <a:t>VAECox</a:t>
-            </a:r>
-          </a:p>
-        </p:txBody>
-      </p:sp>
-      <p:sp>
-        <p:nvSpPr>
-          <p:cNvPr id="42" name="Abgerundetes Rechteck 41"/>
-          <p:cNvSpPr/>
-          <p:nvPr/>
-        </p:nvSpPr>
-        <p:spPr>
-          <a:xfrm>
-            <a:off x="1157677" y="4307142"/>
-            <a:ext cx="738145" cy="296639"/>
-          </a:xfrm>
-          <a:prstGeom prst="roundRect">
-            <a:avLst/>
-          </a:prstGeom>
-        </p:spPr>
-        <p:style>
-          <a:lnRef idx="2">
-            <a:schemeClr val="accent1">
-              <a:shade val="50000"/>
-            </a:schemeClr>
-          </a:lnRef>
-          <a:fillRef idx="1">
-            <a:schemeClr val="accent1"/>
-          </a:fillRef>
-          <a:effectRef idx="0">
-            <a:schemeClr val="accent1"/>
-          </a:effectRef>
-          <a:fontRef idx="minor">
-            <a:schemeClr val="lt1"/>
-          </a:fontRef>
-        </p:style>
-        <p:txBody>
-          <a:bodyPr rtlCol="0" anchor="ctr"/>
-          <a:lstStyle/>
-          <a:p>
-            <a:pPr algn="ctr"/>
-            <a:r>
-              <a:rPr lang="de-DE" sz="1000" i="1" dirty="0" smtClean="0"/>
-              <a:t>Dynamic DeepHit</a:t>
-            </a:r>
-            <a:endParaRPr lang="de-DE" sz="1000" dirty="0"/>
-          </a:p>
-        </p:txBody>
-      </p:sp>
-      <p:sp>
-        <p:nvSpPr>
-          <p:cNvPr id="43" name="Abgerundetes Rechteck 42"/>
-          <p:cNvSpPr/>
-          <p:nvPr/>
-        </p:nvSpPr>
-        <p:spPr>
-          <a:xfrm>
-            <a:off x="1590554" y="3583006"/>
-            <a:ext cx="738145" cy="296639"/>
-          </a:xfrm>
-          <a:prstGeom prst="roundRect">
-            <a:avLst/>
-          </a:prstGeom>
-        </p:spPr>
-        <p:style>
-          <a:lnRef idx="2">
-            <a:schemeClr val="accent1">
-              <a:shade val="50000"/>
-            </a:schemeClr>
-          </a:lnRef>
-          <a:fillRef idx="1">
-            <a:schemeClr val="accent1"/>
-          </a:fillRef>
-          <a:effectRef idx="0">
-            <a:schemeClr val="accent1"/>
-          </a:effectRef>
-          <a:fontRef idx="minor">
-            <a:schemeClr val="lt1"/>
-          </a:fontRef>
-        </p:style>
-        <p:txBody>
-          <a:bodyPr rtlCol="0" anchor="ctr"/>
-          <a:lstStyle/>
-          <a:p>
-            <a:pPr algn="ctr"/>
-            <a:r>
-              <a:rPr lang="de-DE" sz="1000" i="1" dirty="0" smtClean="0"/>
-              <a:t>CRESA</a:t>
-            </a:r>
-            <a:endParaRPr lang="de-DE" sz="1000" dirty="0"/>
-          </a:p>
-        </p:txBody>
-      </p:sp>
-      <p:sp>
-        <p:nvSpPr>
-          <p:cNvPr id="44" name="Abgerundetes Rechteck 43"/>
-          <p:cNvSpPr/>
-          <p:nvPr/>
-        </p:nvSpPr>
-        <p:spPr>
-          <a:xfrm>
-            <a:off x="3023544" y="2289502"/>
-            <a:ext cx="738145" cy="296639"/>
-          </a:xfrm>
-          <a:prstGeom prst="roundRect">
-            <a:avLst/>
-          </a:prstGeom>
-        </p:spPr>
-        <p:style>
-          <a:lnRef idx="2">
-            <a:schemeClr val="accent1">
-              <a:shade val="50000"/>
-            </a:schemeClr>
-          </a:lnRef>
-          <a:fillRef idx="1">
-            <a:schemeClr val="accent1"/>
-          </a:fillRef>
-          <a:effectRef idx="0">
-            <a:schemeClr val="accent1"/>
-          </a:effectRef>
-          <a:fontRef idx="minor">
-            <a:schemeClr val="lt1"/>
-          </a:fontRef>
-        </p:style>
-        <p:txBody>
-          <a:bodyPr rtlCol="0" anchor="ctr"/>
-          <a:lstStyle/>
-          <a:p>
-            <a:pPr algn="ctr"/>
-            <a:r>
-              <a:rPr lang="de-DE" sz="1000" i="1" dirty="0" smtClean="0"/>
-              <a:t>RDSM</a:t>
-            </a:r>
-            <a:endParaRPr lang="de-DE" sz="1000" dirty="0"/>
-          </a:p>
-        </p:txBody>
-      </p:sp>
-      <p:sp>
-        <p:nvSpPr>
-          <p:cNvPr id="45" name="Abgerundetes Rechteck 44"/>
-          <p:cNvSpPr/>
-          <p:nvPr/>
-        </p:nvSpPr>
-        <p:spPr>
-          <a:xfrm>
-            <a:off x="3919216" y="1353696"/>
-            <a:ext cx="738145" cy="296639"/>
-          </a:xfrm>
-          <a:prstGeom prst="roundRect">
-            <a:avLst/>
-          </a:prstGeom>
-        </p:spPr>
-        <p:style>
-          <a:lnRef idx="2">
-            <a:schemeClr val="accent1">
-              <a:shade val="50000"/>
-            </a:schemeClr>
-          </a:lnRef>
-          <a:fillRef idx="1">
-            <a:schemeClr val="accent1"/>
-          </a:fillRef>
-          <a:effectRef idx="0">
-            <a:schemeClr val="accent1"/>
-          </a:effectRef>
-          <a:fontRef idx="minor">
-            <a:schemeClr val="lt1"/>
-          </a:fontRef>
-        </p:style>
-        <p:txBody>
-          <a:bodyPr rtlCol="0" anchor="ctr"/>
-          <a:lstStyle/>
-          <a:p>
-            <a:pPr algn="ctr"/>
-            <a:r>
-              <a:rPr lang="de-DE" sz="1000" i="1" dirty="0" smtClean="0"/>
-              <a:t>Cox-Time</a:t>
-            </a:r>
-            <a:endParaRPr lang="de-DE" sz="1000" dirty="0"/>
-          </a:p>
-        </p:txBody>
-      </p:sp>
-      <p:sp>
-        <p:nvSpPr>
-          <p:cNvPr id="46" name="Abgerundetes Rechteck 45"/>
-          <p:cNvSpPr/>
-          <p:nvPr/>
-        </p:nvSpPr>
-        <p:spPr>
-          <a:xfrm>
-            <a:off x="4927788" y="1824807"/>
-            <a:ext cx="738145" cy="296639"/>
-          </a:xfrm>
-          <a:prstGeom prst="roundRect">
-            <a:avLst/>
-          </a:prstGeom>
-        </p:spPr>
-        <p:style>
-          <a:lnRef idx="2">
-            <a:schemeClr val="accent1">
-              <a:shade val="50000"/>
-            </a:schemeClr>
-          </a:lnRef>
-          <a:fillRef idx="1">
-            <a:schemeClr val="accent1"/>
-          </a:fillRef>
-          <a:effectRef idx="0">
-            <a:schemeClr val="accent1"/>
-          </a:effectRef>
-          <a:fontRef idx="minor">
-            <a:schemeClr val="lt1"/>
-          </a:fontRef>
-        </p:style>
-        <p:txBody>
-          <a:bodyPr rtlCol="0" anchor="ctr"/>
-          <a:lstStyle/>
-          <a:p>
-            <a:pPr algn="ctr"/>
-            <a:r>
-              <a:rPr lang="de-DE" sz="1000" i="1" dirty="0" smtClean="0"/>
-              <a:t>SSMTL</a:t>
-            </a:r>
-            <a:endParaRPr lang="de-DE" sz="1000" dirty="0"/>
-          </a:p>
-        </p:txBody>
-      </p:sp>
-      <p:sp>
-        <p:nvSpPr>
-          <p:cNvPr id="47" name="Abgerundetes Rechteck 46"/>
-          <p:cNvSpPr/>
-          <p:nvPr/>
-        </p:nvSpPr>
-        <p:spPr>
-          <a:xfrm>
-            <a:off x="5397799" y="1057057"/>
-            <a:ext cx="738145" cy="296639"/>
-          </a:xfrm>
-          <a:prstGeom prst="roundRect">
-            <a:avLst/>
-          </a:prstGeom>
-        </p:spPr>
-        <p:style>
-          <a:lnRef idx="2">
-            <a:schemeClr val="accent1">
-              <a:shade val="50000"/>
-            </a:schemeClr>
-          </a:lnRef>
-          <a:fillRef idx="1">
-            <a:schemeClr val="accent1"/>
-          </a:fillRef>
-          <a:effectRef idx="0">
-            <a:schemeClr val="accent1"/>
-          </a:effectRef>
-          <a:fontRef idx="minor">
-            <a:schemeClr val="lt1"/>
-          </a:fontRef>
-        </p:style>
-        <p:txBody>
-          <a:bodyPr rtlCol="0" anchor="ctr"/>
-          <a:lstStyle/>
-          <a:p>
-            <a:pPr algn="ctr"/>
-            <a:r>
-              <a:rPr lang="de-DE" sz="1000" i="1" dirty="0" smtClean="0"/>
-              <a:t>RNN-Surv</a:t>
-            </a:r>
-            <a:endParaRPr lang="de-DE" sz="1000" dirty="0"/>
-          </a:p>
-        </p:txBody>
-      </p:sp>
-    </p:spTree>
-    <p:extLst>
-      <p:ext uri="{BB962C8B-B14F-4D97-AF65-F5344CB8AC3E}">
-        <p14:creationId xmlns:p14="http://schemas.microsoft.com/office/powerpoint/2010/main" val="1723512454"/>
       </p:ext>
     </p:extLst>
   </p:cSld>

</xml_diff>

<commit_message>
added min dataset size column and three methods
</commit_message>
<xml_diff>
--- a/results/diagrams.pptx
+++ b/results/diagrams.pptx
@@ -243,7 +243,7 @@
           <a:p>
             <a:fld id="{CD640317-3DF5-4CC8-8749-C335F5F32497}" type="datetimeFigureOut">
               <a:rPr lang="de-DE" smtClean="0"/>
-              <a:t>22.05.2023</a:t>
+              <a:t>20.09.2023</a:t>
             </a:fld>
             <a:endParaRPr lang="de-DE"/>
           </a:p>
@@ -413,7 +413,7 @@
           <a:p>
             <a:fld id="{CD640317-3DF5-4CC8-8749-C335F5F32497}" type="datetimeFigureOut">
               <a:rPr lang="de-DE" smtClean="0"/>
-              <a:t>22.05.2023</a:t>
+              <a:t>20.09.2023</a:t>
             </a:fld>
             <a:endParaRPr lang="de-DE"/>
           </a:p>
@@ -593,7 +593,7 @@
           <a:p>
             <a:fld id="{CD640317-3DF5-4CC8-8749-C335F5F32497}" type="datetimeFigureOut">
               <a:rPr lang="de-DE" smtClean="0"/>
-              <a:t>22.05.2023</a:t>
+              <a:t>20.09.2023</a:t>
             </a:fld>
             <a:endParaRPr lang="de-DE"/>
           </a:p>
@@ -763,7 +763,7 @@
           <a:p>
             <a:fld id="{CD640317-3DF5-4CC8-8749-C335F5F32497}" type="datetimeFigureOut">
               <a:rPr lang="de-DE" smtClean="0"/>
-              <a:t>22.05.2023</a:t>
+              <a:t>20.09.2023</a:t>
             </a:fld>
             <a:endParaRPr lang="de-DE"/>
           </a:p>
@@ -1009,7 +1009,7 @@
           <a:p>
             <a:fld id="{CD640317-3DF5-4CC8-8749-C335F5F32497}" type="datetimeFigureOut">
               <a:rPr lang="de-DE" smtClean="0"/>
-              <a:t>22.05.2023</a:t>
+              <a:t>20.09.2023</a:t>
             </a:fld>
             <a:endParaRPr lang="de-DE"/>
           </a:p>
@@ -1241,7 +1241,7 @@
           <a:p>
             <a:fld id="{CD640317-3DF5-4CC8-8749-C335F5F32497}" type="datetimeFigureOut">
               <a:rPr lang="de-DE" smtClean="0"/>
-              <a:t>22.05.2023</a:t>
+              <a:t>20.09.2023</a:t>
             </a:fld>
             <a:endParaRPr lang="de-DE"/>
           </a:p>
@@ -1608,7 +1608,7 @@
           <a:p>
             <a:fld id="{CD640317-3DF5-4CC8-8749-C335F5F32497}" type="datetimeFigureOut">
               <a:rPr lang="de-DE" smtClean="0"/>
-              <a:t>22.05.2023</a:t>
+              <a:t>20.09.2023</a:t>
             </a:fld>
             <a:endParaRPr lang="de-DE"/>
           </a:p>
@@ -1726,7 +1726,7 @@
           <a:p>
             <a:fld id="{CD640317-3DF5-4CC8-8749-C335F5F32497}" type="datetimeFigureOut">
               <a:rPr lang="de-DE" smtClean="0"/>
-              <a:t>22.05.2023</a:t>
+              <a:t>20.09.2023</a:t>
             </a:fld>
             <a:endParaRPr lang="de-DE"/>
           </a:p>
@@ -1821,7 +1821,7 @@
           <a:p>
             <a:fld id="{CD640317-3DF5-4CC8-8749-C335F5F32497}" type="datetimeFigureOut">
               <a:rPr lang="de-DE" smtClean="0"/>
-              <a:t>22.05.2023</a:t>
+              <a:t>20.09.2023</a:t>
             </a:fld>
             <a:endParaRPr lang="de-DE"/>
           </a:p>
@@ -2098,7 +2098,7 @@
           <a:p>
             <a:fld id="{CD640317-3DF5-4CC8-8749-C335F5F32497}" type="datetimeFigureOut">
               <a:rPr lang="de-DE" smtClean="0"/>
-              <a:t>22.05.2023</a:t>
+              <a:t>20.09.2023</a:t>
             </a:fld>
             <a:endParaRPr lang="de-DE"/>
           </a:p>
@@ -2351,7 +2351,7 @@
           <a:p>
             <a:fld id="{CD640317-3DF5-4CC8-8749-C335F5F32497}" type="datetimeFigureOut">
               <a:rPr lang="de-DE" smtClean="0"/>
-              <a:t>22.05.2023</a:t>
+              <a:t>20.09.2023</a:t>
             </a:fld>
             <a:endParaRPr lang="de-DE"/>
           </a:p>
@@ -2564,7 +2564,7 @@
           <a:p>
             <a:fld id="{CD640317-3DF5-4CC8-8749-C335F5F32497}" type="datetimeFigureOut">
               <a:rPr lang="de-DE" smtClean="0"/>
-              <a:t>22.05.2023</a:t>
+              <a:t>20.09.2023</a:t>
             </a:fld>
             <a:endParaRPr lang="de-DE"/>
           </a:p>
@@ -3251,7 +3251,7 @@
                 <a:ea typeface="Calibri" panose="020F0502020204030204" pitchFamily="34" charset="0"/>
                 <a:cs typeface="Times New Roman" panose="02020603050405020304" pitchFamily="18" charset="0"/>
               </a:rPr>
-              <a:t>22) </a:t>
+              <a:t>24) </a:t>
             </a:r>
             <a:r>
               <a:rPr lang="en-US" sz="1000" dirty="0">
@@ -3460,7 +3460,7 @@
                 <a:ea typeface="Calibri" panose="020F0502020204030204" pitchFamily="34" charset="0"/>
                 <a:cs typeface="Times New Roman" panose="02020603050405020304" pitchFamily="18" charset="0"/>
               </a:rPr>
-              <a:t>15)</a:t>
+              <a:t>16)</a:t>
             </a:r>
             <a:endParaRPr lang="en-US" sz="1000" dirty="0">
               <a:solidFill>
@@ -3527,8 +3527,27 @@
                 <a:ea typeface="Calibri" panose="020F0502020204030204" pitchFamily="34" charset="0"/>
                 <a:cs typeface="Times New Roman" panose="02020603050405020304" pitchFamily="18" charset="0"/>
               </a:rPr>
-              <a:t>No development of a new method (n = 12)</a:t>
-            </a:r>
+              <a:t>No development of a new method (n = </a:t>
+            </a:r>
+            <a:r>
+              <a:rPr lang="en-AU" sz="1000" dirty="0" smtClean="0">
+                <a:solidFill>
+                  <a:srgbClr val="000000"/>
+                </a:solidFill>
+                <a:latin typeface="Arial" panose="020B0604020202020204" pitchFamily="34" charset="0"/>
+                <a:ea typeface="Calibri" panose="020F0502020204030204" pitchFamily="34" charset="0"/>
+                <a:cs typeface="Times New Roman" panose="02020603050405020304" pitchFamily="18" charset="0"/>
+              </a:rPr>
+              <a:t>11)</a:t>
+            </a:r>
+            <a:endParaRPr lang="en-AU" sz="1000" dirty="0">
+              <a:solidFill>
+                <a:srgbClr val="000000"/>
+              </a:solidFill>
+              <a:latin typeface="Arial" panose="020B0604020202020204" pitchFamily="34" charset="0"/>
+              <a:ea typeface="Calibri" panose="020F0502020204030204" pitchFamily="34" charset="0"/>
+              <a:cs typeface="Times New Roman" panose="02020603050405020304" pitchFamily="18" charset="0"/>
+            </a:endParaRPr>
           </a:p>
           <a:p>
             <a:pPr marL="171450" indent="-171450">
@@ -3655,7 +3674,19 @@
                 <a:ea typeface="Calibri" panose="020F0502020204030204" pitchFamily="34" charset="0"/>
                 <a:cs typeface="Times New Roman" panose="02020603050405020304" pitchFamily="18" charset="0"/>
               </a:rPr>
-              <a:t>abstract screening (n = 80)</a:t>
+              <a:t>abstract screening (n = </a:t>
+            </a:r>
+            <a:r>
+              <a:rPr lang="en-AU" sz="1000" dirty="0" smtClean="0">
+                <a:solidFill>
+                  <a:srgbClr val="000000"/>
+                </a:solidFill>
+                <a:effectLst/>
+                <a:latin typeface="Arial" panose="020B0604020202020204" pitchFamily="34" charset="0"/>
+                <a:ea typeface="Calibri" panose="020F0502020204030204" pitchFamily="34" charset="0"/>
+                <a:cs typeface="Times New Roman" panose="02020603050405020304" pitchFamily="18" charset="0"/>
+              </a:rPr>
+              <a:t>81)</a:t>
             </a:r>
             <a:endParaRPr lang="de-DE" sz="1000" dirty="0">
               <a:effectLst/>
@@ -3800,7 +3831,7 @@
                 <a:ea typeface="Calibri" panose="020F0502020204030204" pitchFamily="34" charset="0"/>
                 <a:cs typeface="Times New Roman" panose="02020603050405020304" pitchFamily="18" charset="0"/>
               </a:rPr>
-              <a:t>58</a:t>
+              <a:t>61</a:t>
             </a:r>
             <a:r>
               <a:rPr lang="en-AU" sz="1000" dirty="0" smtClean="0">
@@ -3946,7 +3977,19 @@
                 <a:ea typeface="Calibri" panose="020F0502020204030204" pitchFamily="34" charset="0"/>
                 <a:cs typeface="Times New Roman" panose="02020603050405020304" pitchFamily="18" charset="0"/>
               </a:rPr>
-              <a:t>full text screening (n = 36)</a:t>
+              <a:t>full text screening (n = </a:t>
+            </a:r>
+            <a:r>
+              <a:rPr lang="en-AU" sz="1000" dirty="0" smtClean="0">
+                <a:solidFill>
+                  <a:srgbClr val="000000"/>
+                </a:solidFill>
+                <a:effectLst/>
+                <a:latin typeface="Arial" panose="020B0604020202020204" pitchFamily="34" charset="0"/>
+                <a:ea typeface="Calibri" panose="020F0502020204030204" pitchFamily="34" charset="0"/>
+                <a:cs typeface="Times New Roman" panose="02020603050405020304" pitchFamily="18" charset="0"/>
+              </a:rPr>
+              <a:t>37)</a:t>
             </a:r>
             <a:endParaRPr lang="de-DE" sz="1000" dirty="0">
               <a:effectLst/>
@@ -4600,8 +4643,27 @@
                 <a:ea typeface="Calibri" panose="020F0502020204030204" pitchFamily="34" charset="0"/>
                 <a:cs typeface="Times New Roman" panose="02020603050405020304" pitchFamily="18" charset="0"/>
               </a:rPr>
-              <a:t>excluded through abstract screening (n = 113)</a:t>
-            </a:r>
+              <a:t>excluded through abstract screening (n = </a:t>
+            </a:r>
+            <a:r>
+              <a:rPr lang="en-AU" sz="1000" dirty="0" smtClean="0">
+                <a:solidFill>
+                  <a:srgbClr val="000000"/>
+                </a:solidFill>
+                <a:latin typeface="Arial" panose="020B0604020202020204" pitchFamily="34" charset="0"/>
+                <a:ea typeface="Calibri" panose="020F0502020204030204" pitchFamily="34" charset="0"/>
+                <a:cs typeface="Times New Roman" panose="02020603050405020304" pitchFamily="18" charset="0"/>
+              </a:rPr>
+              <a:t>112)</a:t>
+            </a:r>
+            <a:endParaRPr lang="en-AU" sz="1000" dirty="0">
+              <a:solidFill>
+                <a:srgbClr val="000000"/>
+              </a:solidFill>
+              <a:latin typeface="Arial" panose="020B0604020202020204" pitchFamily="34" charset="0"/>
+              <a:ea typeface="Calibri" panose="020F0502020204030204" pitchFamily="34" charset="0"/>
+              <a:cs typeface="Times New Roman" panose="02020603050405020304" pitchFamily="18" charset="0"/>
+            </a:endParaRPr>
           </a:p>
           <a:p>
             <a:pPr>
@@ -4638,8 +4700,27 @@
                 <a:ea typeface="Calibri" panose="020F0502020204030204" pitchFamily="34" charset="0"/>
                 <a:cs typeface="Times New Roman" panose="02020603050405020304" pitchFamily="18" charset="0"/>
               </a:rPr>
-              <a:t>No genuine deep survival modeling (n = 84)</a:t>
-            </a:r>
+              <a:t>No genuine deep survival modeling (n = </a:t>
+            </a:r>
+            <a:r>
+              <a:rPr lang="en-US" sz="1000" dirty="0" smtClean="0">
+                <a:solidFill>
+                  <a:srgbClr val="000000"/>
+                </a:solidFill>
+                <a:latin typeface="Arial" panose="020B0604020202020204" pitchFamily="34" charset="0"/>
+                <a:ea typeface="Calibri" panose="020F0502020204030204" pitchFamily="34" charset="0"/>
+                <a:cs typeface="Times New Roman" panose="02020603050405020304" pitchFamily="18" charset="0"/>
+              </a:rPr>
+              <a:t>83)</a:t>
+            </a:r>
+            <a:endParaRPr lang="en-US" sz="1000" dirty="0">
+              <a:solidFill>
+                <a:srgbClr val="000000"/>
+              </a:solidFill>
+              <a:latin typeface="Arial" panose="020B0604020202020204" pitchFamily="34" charset="0"/>
+              <a:ea typeface="Calibri" panose="020F0502020204030204" pitchFamily="34" charset="0"/>
+              <a:cs typeface="Times New Roman" panose="02020603050405020304" pitchFamily="18" charset="0"/>
+            </a:endParaRPr>
           </a:p>
           <a:p>
             <a:pPr marL="171450" indent="-171450">
@@ -4658,8 +4739,27 @@
                 <a:ea typeface="Calibri" panose="020F0502020204030204" pitchFamily="34" charset="0"/>
                 <a:cs typeface="Times New Roman" panose="02020603050405020304" pitchFamily="18" charset="0"/>
               </a:rPr>
-              <a:t>No performance evaluation using survival metrics (n = 1)</a:t>
-            </a:r>
+              <a:t>No performance evaluation using survival metrics (n = </a:t>
+            </a:r>
+            <a:r>
+              <a:rPr lang="en-US" sz="1000" dirty="0" smtClean="0">
+                <a:solidFill>
+                  <a:srgbClr val="000000"/>
+                </a:solidFill>
+                <a:latin typeface="Arial" panose="020B0604020202020204" pitchFamily="34" charset="0"/>
+                <a:ea typeface="Calibri" panose="020F0502020204030204" pitchFamily="34" charset="0"/>
+                <a:cs typeface="Times New Roman" panose="02020603050405020304" pitchFamily="18" charset="0"/>
+              </a:rPr>
+              <a:t>2)</a:t>
+            </a:r>
+            <a:endParaRPr lang="en-US" sz="1000" dirty="0">
+              <a:solidFill>
+                <a:srgbClr val="000000"/>
+              </a:solidFill>
+              <a:latin typeface="Arial" panose="020B0604020202020204" pitchFamily="34" charset="0"/>
+              <a:ea typeface="Calibri" panose="020F0502020204030204" pitchFamily="34" charset="0"/>
+              <a:cs typeface="Times New Roman" panose="02020603050405020304" pitchFamily="18" charset="0"/>
+            </a:endParaRPr>
           </a:p>
           <a:p>
             <a:pPr marL="171450" indent="-171450">
@@ -4678,8 +4778,27 @@
                 <a:ea typeface="Calibri" panose="020F0502020204030204" pitchFamily="34" charset="0"/>
                 <a:cs typeface="Times New Roman" panose="02020603050405020304" pitchFamily="18" charset="0"/>
               </a:rPr>
-              <a:t>No development of a new method (n = 19)</a:t>
-            </a:r>
+              <a:t>No development of a new method (n = </a:t>
+            </a:r>
+            <a:r>
+              <a:rPr lang="en-AU" sz="1000" dirty="0" smtClean="0">
+                <a:solidFill>
+                  <a:srgbClr val="000000"/>
+                </a:solidFill>
+                <a:latin typeface="Arial" panose="020B0604020202020204" pitchFamily="34" charset="0"/>
+                <a:ea typeface="Calibri" panose="020F0502020204030204" pitchFamily="34" charset="0"/>
+                <a:cs typeface="Times New Roman" panose="02020603050405020304" pitchFamily="18" charset="0"/>
+              </a:rPr>
+              <a:t>18)</a:t>
+            </a:r>
+            <a:endParaRPr lang="en-AU" sz="1000" dirty="0">
+              <a:solidFill>
+                <a:srgbClr val="000000"/>
+              </a:solidFill>
+              <a:latin typeface="Arial" panose="020B0604020202020204" pitchFamily="34" charset="0"/>
+              <a:ea typeface="Calibri" panose="020F0502020204030204" pitchFamily="34" charset="0"/>
+              <a:cs typeface="Times New Roman" panose="02020603050405020304" pitchFamily="18" charset="0"/>
+            </a:endParaRPr>
           </a:p>
           <a:p>
             <a:pPr marL="171450" indent="-171450">

</xml_diff>

<commit_message>
Deploying to gh-pages from @ survival-org/DL4Survival@e23b33c1c6cb46f552bf04965d19032efe515bb8 🚀
</commit_message>
<xml_diff>
--- a/results/diagrams.pptx
+++ b/results/diagrams.pptx
@@ -243,7 +243,7 @@
           <a:p>
             <a:fld id="{CD640317-3DF5-4CC8-8749-C335F5F32497}" type="datetimeFigureOut">
               <a:rPr lang="de-DE" smtClean="0"/>
-              <a:t>22.05.2023</a:t>
+              <a:t>20.09.2023</a:t>
             </a:fld>
             <a:endParaRPr lang="de-DE"/>
           </a:p>
@@ -413,7 +413,7 @@
           <a:p>
             <a:fld id="{CD640317-3DF5-4CC8-8749-C335F5F32497}" type="datetimeFigureOut">
               <a:rPr lang="de-DE" smtClean="0"/>
-              <a:t>22.05.2023</a:t>
+              <a:t>20.09.2023</a:t>
             </a:fld>
             <a:endParaRPr lang="de-DE"/>
           </a:p>
@@ -593,7 +593,7 @@
           <a:p>
             <a:fld id="{CD640317-3DF5-4CC8-8749-C335F5F32497}" type="datetimeFigureOut">
               <a:rPr lang="de-DE" smtClean="0"/>
-              <a:t>22.05.2023</a:t>
+              <a:t>20.09.2023</a:t>
             </a:fld>
             <a:endParaRPr lang="de-DE"/>
           </a:p>
@@ -763,7 +763,7 @@
           <a:p>
             <a:fld id="{CD640317-3DF5-4CC8-8749-C335F5F32497}" type="datetimeFigureOut">
               <a:rPr lang="de-DE" smtClean="0"/>
-              <a:t>22.05.2023</a:t>
+              <a:t>20.09.2023</a:t>
             </a:fld>
             <a:endParaRPr lang="de-DE"/>
           </a:p>
@@ -1009,7 +1009,7 @@
           <a:p>
             <a:fld id="{CD640317-3DF5-4CC8-8749-C335F5F32497}" type="datetimeFigureOut">
               <a:rPr lang="de-DE" smtClean="0"/>
-              <a:t>22.05.2023</a:t>
+              <a:t>20.09.2023</a:t>
             </a:fld>
             <a:endParaRPr lang="de-DE"/>
           </a:p>
@@ -1241,7 +1241,7 @@
           <a:p>
             <a:fld id="{CD640317-3DF5-4CC8-8749-C335F5F32497}" type="datetimeFigureOut">
               <a:rPr lang="de-DE" smtClean="0"/>
-              <a:t>22.05.2023</a:t>
+              <a:t>20.09.2023</a:t>
             </a:fld>
             <a:endParaRPr lang="de-DE"/>
           </a:p>
@@ -1608,7 +1608,7 @@
           <a:p>
             <a:fld id="{CD640317-3DF5-4CC8-8749-C335F5F32497}" type="datetimeFigureOut">
               <a:rPr lang="de-DE" smtClean="0"/>
-              <a:t>22.05.2023</a:t>
+              <a:t>20.09.2023</a:t>
             </a:fld>
             <a:endParaRPr lang="de-DE"/>
           </a:p>
@@ -1726,7 +1726,7 @@
           <a:p>
             <a:fld id="{CD640317-3DF5-4CC8-8749-C335F5F32497}" type="datetimeFigureOut">
               <a:rPr lang="de-DE" smtClean="0"/>
-              <a:t>22.05.2023</a:t>
+              <a:t>20.09.2023</a:t>
             </a:fld>
             <a:endParaRPr lang="de-DE"/>
           </a:p>
@@ -1821,7 +1821,7 @@
           <a:p>
             <a:fld id="{CD640317-3DF5-4CC8-8749-C335F5F32497}" type="datetimeFigureOut">
               <a:rPr lang="de-DE" smtClean="0"/>
-              <a:t>22.05.2023</a:t>
+              <a:t>20.09.2023</a:t>
             </a:fld>
             <a:endParaRPr lang="de-DE"/>
           </a:p>
@@ -2098,7 +2098,7 @@
           <a:p>
             <a:fld id="{CD640317-3DF5-4CC8-8749-C335F5F32497}" type="datetimeFigureOut">
               <a:rPr lang="de-DE" smtClean="0"/>
-              <a:t>22.05.2023</a:t>
+              <a:t>20.09.2023</a:t>
             </a:fld>
             <a:endParaRPr lang="de-DE"/>
           </a:p>
@@ -2351,7 +2351,7 @@
           <a:p>
             <a:fld id="{CD640317-3DF5-4CC8-8749-C335F5F32497}" type="datetimeFigureOut">
               <a:rPr lang="de-DE" smtClean="0"/>
-              <a:t>22.05.2023</a:t>
+              <a:t>20.09.2023</a:t>
             </a:fld>
             <a:endParaRPr lang="de-DE"/>
           </a:p>
@@ -2564,7 +2564,7 @@
           <a:p>
             <a:fld id="{CD640317-3DF5-4CC8-8749-C335F5F32497}" type="datetimeFigureOut">
               <a:rPr lang="de-DE" smtClean="0"/>
-              <a:t>22.05.2023</a:t>
+              <a:t>20.09.2023</a:t>
             </a:fld>
             <a:endParaRPr lang="de-DE"/>
           </a:p>
@@ -3251,7 +3251,7 @@
                 <a:ea typeface="Calibri" panose="020F0502020204030204" pitchFamily="34" charset="0"/>
                 <a:cs typeface="Times New Roman" panose="02020603050405020304" pitchFamily="18" charset="0"/>
               </a:rPr>
-              <a:t>22) </a:t>
+              <a:t>24) </a:t>
             </a:r>
             <a:r>
               <a:rPr lang="en-US" sz="1000" dirty="0">
@@ -3460,7 +3460,7 @@
                 <a:ea typeface="Calibri" panose="020F0502020204030204" pitchFamily="34" charset="0"/>
                 <a:cs typeface="Times New Roman" panose="02020603050405020304" pitchFamily="18" charset="0"/>
               </a:rPr>
-              <a:t>15)</a:t>
+              <a:t>16)</a:t>
             </a:r>
             <a:endParaRPr lang="en-US" sz="1000" dirty="0">
               <a:solidFill>
@@ -3527,8 +3527,27 @@
                 <a:ea typeface="Calibri" panose="020F0502020204030204" pitchFamily="34" charset="0"/>
                 <a:cs typeface="Times New Roman" panose="02020603050405020304" pitchFamily="18" charset="0"/>
               </a:rPr>
-              <a:t>No development of a new method (n = 12)</a:t>
-            </a:r>
+              <a:t>No development of a new method (n = </a:t>
+            </a:r>
+            <a:r>
+              <a:rPr lang="en-AU" sz="1000" dirty="0" smtClean="0">
+                <a:solidFill>
+                  <a:srgbClr val="000000"/>
+                </a:solidFill>
+                <a:latin typeface="Arial" panose="020B0604020202020204" pitchFamily="34" charset="0"/>
+                <a:ea typeface="Calibri" panose="020F0502020204030204" pitchFamily="34" charset="0"/>
+                <a:cs typeface="Times New Roman" panose="02020603050405020304" pitchFamily="18" charset="0"/>
+              </a:rPr>
+              <a:t>11)</a:t>
+            </a:r>
+            <a:endParaRPr lang="en-AU" sz="1000" dirty="0">
+              <a:solidFill>
+                <a:srgbClr val="000000"/>
+              </a:solidFill>
+              <a:latin typeface="Arial" panose="020B0604020202020204" pitchFamily="34" charset="0"/>
+              <a:ea typeface="Calibri" panose="020F0502020204030204" pitchFamily="34" charset="0"/>
+              <a:cs typeface="Times New Roman" panose="02020603050405020304" pitchFamily="18" charset="0"/>
+            </a:endParaRPr>
           </a:p>
           <a:p>
             <a:pPr marL="171450" indent="-171450">
@@ -3655,7 +3674,19 @@
                 <a:ea typeface="Calibri" panose="020F0502020204030204" pitchFamily="34" charset="0"/>
                 <a:cs typeface="Times New Roman" panose="02020603050405020304" pitchFamily="18" charset="0"/>
               </a:rPr>
-              <a:t>abstract screening (n = 80)</a:t>
+              <a:t>abstract screening (n = </a:t>
+            </a:r>
+            <a:r>
+              <a:rPr lang="en-AU" sz="1000" dirty="0" smtClean="0">
+                <a:solidFill>
+                  <a:srgbClr val="000000"/>
+                </a:solidFill>
+                <a:effectLst/>
+                <a:latin typeface="Arial" panose="020B0604020202020204" pitchFamily="34" charset="0"/>
+                <a:ea typeface="Calibri" panose="020F0502020204030204" pitchFamily="34" charset="0"/>
+                <a:cs typeface="Times New Roman" panose="02020603050405020304" pitchFamily="18" charset="0"/>
+              </a:rPr>
+              <a:t>81)</a:t>
             </a:r>
             <a:endParaRPr lang="de-DE" sz="1000" dirty="0">
               <a:effectLst/>
@@ -3800,7 +3831,7 @@
                 <a:ea typeface="Calibri" panose="020F0502020204030204" pitchFamily="34" charset="0"/>
                 <a:cs typeface="Times New Roman" panose="02020603050405020304" pitchFamily="18" charset="0"/>
               </a:rPr>
-              <a:t>58</a:t>
+              <a:t>61</a:t>
             </a:r>
             <a:r>
               <a:rPr lang="en-AU" sz="1000" dirty="0" smtClean="0">
@@ -3946,7 +3977,19 @@
                 <a:ea typeface="Calibri" panose="020F0502020204030204" pitchFamily="34" charset="0"/>
                 <a:cs typeface="Times New Roman" panose="02020603050405020304" pitchFamily="18" charset="0"/>
               </a:rPr>
-              <a:t>full text screening (n = 36)</a:t>
+              <a:t>full text screening (n = </a:t>
+            </a:r>
+            <a:r>
+              <a:rPr lang="en-AU" sz="1000" dirty="0" smtClean="0">
+                <a:solidFill>
+                  <a:srgbClr val="000000"/>
+                </a:solidFill>
+                <a:effectLst/>
+                <a:latin typeface="Arial" panose="020B0604020202020204" pitchFamily="34" charset="0"/>
+                <a:ea typeface="Calibri" panose="020F0502020204030204" pitchFamily="34" charset="0"/>
+                <a:cs typeface="Times New Roman" panose="02020603050405020304" pitchFamily="18" charset="0"/>
+              </a:rPr>
+              <a:t>37)</a:t>
             </a:r>
             <a:endParaRPr lang="de-DE" sz="1000" dirty="0">
               <a:effectLst/>
@@ -4600,8 +4643,27 @@
                 <a:ea typeface="Calibri" panose="020F0502020204030204" pitchFamily="34" charset="0"/>
                 <a:cs typeface="Times New Roman" panose="02020603050405020304" pitchFamily="18" charset="0"/>
               </a:rPr>
-              <a:t>excluded through abstract screening (n = 113)</a:t>
-            </a:r>
+              <a:t>excluded through abstract screening (n = </a:t>
+            </a:r>
+            <a:r>
+              <a:rPr lang="en-AU" sz="1000" dirty="0" smtClean="0">
+                <a:solidFill>
+                  <a:srgbClr val="000000"/>
+                </a:solidFill>
+                <a:latin typeface="Arial" panose="020B0604020202020204" pitchFamily="34" charset="0"/>
+                <a:ea typeface="Calibri" panose="020F0502020204030204" pitchFamily="34" charset="0"/>
+                <a:cs typeface="Times New Roman" panose="02020603050405020304" pitchFamily="18" charset="0"/>
+              </a:rPr>
+              <a:t>112)</a:t>
+            </a:r>
+            <a:endParaRPr lang="en-AU" sz="1000" dirty="0">
+              <a:solidFill>
+                <a:srgbClr val="000000"/>
+              </a:solidFill>
+              <a:latin typeface="Arial" panose="020B0604020202020204" pitchFamily="34" charset="0"/>
+              <a:ea typeface="Calibri" panose="020F0502020204030204" pitchFamily="34" charset="0"/>
+              <a:cs typeface="Times New Roman" panose="02020603050405020304" pitchFamily="18" charset="0"/>
+            </a:endParaRPr>
           </a:p>
           <a:p>
             <a:pPr>
@@ -4638,8 +4700,27 @@
                 <a:ea typeface="Calibri" panose="020F0502020204030204" pitchFamily="34" charset="0"/>
                 <a:cs typeface="Times New Roman" panose="02020603050405020304" pitchFamily="18" charset="0"/>
               </a:rPr>
-              <a:t>No genuine deep survival modeling (n = 84)</a:t>
-            </a:r>
+              <a:t>No genuine deep survival modeling (n = </a:t>
+            </a:r>
+            <a:r>
+              <a:rPr lang="en-US" sz="1000" dirty="0" smtClean="0">
+                <a:solidFill>
+                  <a:srgbClr val="000000"/>
+                </a:solidFill>
+                <a:latin typeface="Arial" panose="020B0604020202020204" pitchFamily="34" charset="0"/>
+                <a:ea typeface="Calibri" panose="020F0502020204030204" pitchFamily="34" charset="0"/>
+                <a:cs typeface="Times New Roman" panose="02020603050405020304" pitchFamily="18" charset="0"/>
+              </a:rPr>
+              <a:t>83)</a:t>
+            </a:r>
+            <a:endParaRPr lang="en-US" sz="1000" dirty="0">
+              <a:solidFill>
+                <a:srgbClr val="000000"/>
+              </a:solidFill>
+              <a:latin typeface="Arial" panose="020B0604020202020204" pitchFamily="34" charset="0"/>
+              <a:ea typeface="Calibri" panose="020F0502020204030204" pitchFamily="34" charset="0"/>
+              <a:cs typeface="Times New Roman" panose="02020603050405020304" pitchFamily="18" charset="0"/>
+            </a:endParaRPr>
           </a:p>
           <a:p>
             <a:pPr marL="171450" indent="-171450">
@@ -4658,8 +4739,27 @@
                 <a:ea typeface="Calibri" panose="020F0502020204030204" pitchFamily="34" charset="0"/>
                 <a:cs typeface="Times New Roman" panose="02020603050405020304" pitchFamily="18" charset="0"/>
               </a:rPr>
-              <a:t>No performance evaluation using survival metrics (n = 1)</a:t>
-            </a:r>
+              <a:t>No performance evaluation using survival metrics (n = </a:t>
+            </a:r>
+            <a:r>
+              <a:rPr lang="en-US" sz="1000" dirty="0" smtClean="0">
+                <a:solidFill>
+                  <a:srgbClr val="000000"/>
+                </a:solidFill>
+                <a:latin typeface="Arial" panose="020B0604020202020204" pitchFamily="34" charset="0"/>
+                <a:ea typeface="Calibri" panose="020F0502020204030204" pitchFamily="34" charset="0"/>
+                <a:cs typeface="Times New Roman" panose="02020603050405020304" pitchFamily="18" charset="0"/>
+              </a:rPr>
+              <a:t>2)</a:t>
+            </a:r>
+            <a:endParaRPr lang="en-US" sz="1000" dirty="0">
+              <a:solidFill>
+                <a:srgbClr val="000000"/>
+              </a:solidFill>
+              <a:latin typeface="Arial" panose="020B0604020202020204" pitchFamily="34" charset="0"/>
+              <a:ea typeface="Calibri" panose="020F0502020204030204" pitchFamily="34" charset="0"/>
+              <a:cs typeface="Times New Roman" panose="02020603050405020304" pitchFamily="18" charset="0"/>
+            </a:endParaRPr>
           </a:p>
           <a:p>
             <a:pPr marL="171450" indent="-171450">
@@ -4678,8 +4778,27 @@
                 <a:ea typeface="Calibri" panose="020F0502020204030204" pitchFamily="34" charset="0"/>
                 <a:cs typeface="Times New Roman" panose="02020603050405020304" pitchFamily="18" charset="0"/>
               </a:rPr>
-              <a:t>No development of a new method (n = 19)</a:t>
-            </a:r>
+              <a:t>No development of a new method (n = </a:t>
+            </a:r>
+            <a:r>
+              <a:rPr lang="en-AU" sz="1000" dirty="0" smtClean="0">
+                <a:solidFill>
+                  <a:srgbClr val="000000"/>
+                </a:solidFill>
+                <a:latin typeface="Arial" panose="020B0604020202020204" pitchFamily="34" charset="0"/>
+                <a:ea typeface="Calibri" panose="020F0502020204030204" pitchFamily="34" charset="0"/>
+                <a:cs typeface="Times New Roman" panose="02020603050405020304" pitchFamily="18" charset="0"/>
+              </a:rPr>
+              <a:t>18)</a:t>
+            </a:r>
+            <a:endParaRPr lang="en-AU" sz="1000" dirty="0">
+              <a:solidFill>
+                <a:srgbClr val="000000"/>
+              </a:solidFill>
+              <a:latin typeface="Arial" panose="020B0604020202020204" pitchFamily="34" charset="0"/>
+              <a:ea typeface="Calibri" panose="020F0502020204030204" pitchFamily="34" charset="0"/>
+              <a:cs typeface="Times New Roman" panose="02020603050405020304" pitchFamily="18" charset="0"/>
+            </a:endParaRPr>
           </a:p>
           <a:p>
             <a:pPr marL="171450" indent="-171450">

</xml_diff>